<commit_message>
First base version of scooter service
</commit_message>
<xml_diff>
--- a/documentation/Presentation.pptx
+++ b/documentation/Presentation.pptx
@@ -5,10 +5,10 @@
     <p:sldMasterId id="2147483667" r:id="rId2"/>
   </p:sldMasterIdLst>
   <p:notesMasterIdLst>
-    <p:notesMasterId r:id="rId28"/>
+    <p:notesMasterId r:id="rId32"/>
   </p:notesMasterIdLst>
   <p:handoutMasterIdLst>
-    <p:handoutMasterId r:id="rId29"/>
+    <p:handoutMasterId r:id="rId33"/>
   </p:handoutMasterIdLst>
   <p:sldIdLst>
     <p:sldId id="257" r:id="rId3"/>
@@ -31,11 +31,15 @@
     <p:sldId id="302" r:id="rId20"/>
     <p:sldId id="300" r:id="rId21"/>
     <p:sldId id="301" r:id="rId22"/>
-    <p:sldId id="274" r:id="rId23"/>
-    <p:sldId id="303" r:id="rId24"/>
-    <p:sldId id="279" r:id="rId25"/>
-    <p:sldId id="288" r:id="rId26"/>
-    <p:sldId id="269" r:id="rId27"/>
+    <p:sldId id="304" r:id="rId23"/>
+    <p:sldId id="305" r:id="rId24"/>
+    <p:sldId id="306" r:id="rId25"/>
+    <p:sldId id="307" r:id="rId26"/>
+    <p:sldId id="274" r:id="rId27"/>
+    <p:sldId id="303" r:id="rId28"/>
+    <p:sldId id="279" r:id="rId29"/>
+    <p:sldId id="288" r:id="rId30"/>
+    <p:sldId id="269" r:id="rId31"/>
   </p:sldIdLst>
   <p:sldSz cx="9144000" cy="5143500" type="screen16x9"/>
   <p:notesSz cx="6858000" cy="9144000"/>
@@ -159,6 +163,10 @@
             <p14:sldId id="302"/>
             <p14:sldId id="300"/>
             <p14:sldId id="301"/>
+            <p14:sldId id="304"/>
+            <p14:sldId id="305"/>
+            <p14:sldId id="306"/>
+            <p14:sldId id="307"/>
             <p14:sldId id="274"/>
             <p14:sldId id="303"/>
             <p14:sldId id="279"/>
@@ -1422,7 +1430,7 @@
                 </a:schemeClr>
               </a:solidFill>
             </a:rPr>
-            <a:t>MVP</a:t>
+            <a:t>MVP &amp; Team Leader</a:t>
           </a:r>
           <a:endParaRPr lang="en-US" sz="900" dirty="0">
             <a:solidFill>
@@ -1473,38 +1481,26 @@
         <a:lstStyle/>
         <a:p>
           <a:r>
-            <a:rPr lang="pt-BR" sz="900" dirty="0" smtClean="0">
+            <a:rPr lang="en-US" sz="800" b="0" i="0" dirty="0" smtClean="0">
               <a:solidFill>
                 <a:schemeClr val="bg1">
                   <a:lumMod val="50000"/>
                 </a:schemeClr>
               </a:solidFill>
             </a:rPr>
-            <a:t>2001</a:t>
+            <a:t>2000</a:t>
           </a:r>
         </a:p>
         <a:p>
           <a:r>
-            <a:rPr lang="pt-BR" sz="800" dirty="0" smtClean="0">
+            <a:rPr lang="en-US" sz="800" b="0" i="0" dirty="0" smtClean="0">
               <a:solidFill>
                 <a:schemeClr val="bg1">
                   <a:lumMod val="50000"/>
                 </a:schemeClr>
               </a:solidFill>
             </a:rPr>
-            <a:t>Starts</a:t>
-          </a:r>
-        </a:p>
-        <a:p>
-          <a:r>
-            <a:rPr lang="pt-BR" sz="800" dirty="0" smtClean="0">
-              <a:solidFill>
-                <a:schemeClr val="bg1">
-                  <a:lumMod val="50000"/>
-                </a:schemeClr>
-              </a:solidFill>
-            </a:rPr>
-            <a:t>University</a:t>
+            <a:t>Telecom Technician</a:t>
           </a:r>
           <a:endParaRPr lang="en-US" sz="800" dirty="0">
             <a:solidFill>
@@ -1538,6 +1534,88 @@
         </a:p>
       </dgm:t>
     </dgm:pt>
+    <dgm:pt modelId="{2CC8774E-37F3-464D-AE15-4A5D6A317FD6}">
+      <dgm:prSet phldrT="[Text]" custT="1"/>
+      <dgm:spPr>
+        <a:ln w="9525">
+          <a:solidFill>
+            <a:schemeClr val="bg1">
+              <a:lumMod val="75000"/>
+            </a:schemeClr>
+          </a:solidFill>
+          <a:prstDash val="dash"/>
+        </a:ln>
+      </dgm:spPr>
+      <dgm:t>
+        <a:bodyPr/>
+        <a:lstStyle/>
+        <a:p>
+          <a:r>
+            <a:rPr lang="pt-BR" sz="900" dirty="0" smtClean="0">
+              <a:solidFill>
+                <a:schemeClr val="bg1">
+                  <a:lumMod val="50000"/>
+                </a:schemeClr>
+              </a:solidFill>
+            </a:rPr>
+            <a:t>2001</a:t>
+          </a:r>
+        </a:p>
+        <a:p>
+          <a:r>
+            <a:rPr lang="pt-BR" sz="800" dirty="0" smtClean="0">
+              <a:solidFill>
+                <a:schemeClr val="bg1">
+                  <a:lumMod val="50000"/>
+                </a:schemeClr>
+              </a:solidFill>
+            </a:rPr>
+            <a:t>Starts</a:t>
+          </a:r>
+        </a:p>
+        <a:p>
+          <a:r>
+            <a:rPr lang="pt-BR" sz="700" dirty="0" smtClean="0">
+              <a:solidFill>
+                <a:schemeClr val="bg1">
+                  <a:lumMod val="50000"/>
+                </a:schemeClr>
+              </a:solidFill>
+            </a:rPr>
+            <a:t>University</a:t>
+          </a:r>
+          <a:endParaRPr lang="en-US" sz="700" dirty="0">
+            <a:solidFill>
+              <a:schemeClr val="bg1">
+                <a:lumMod val="50000"/>
+              </a:schemeClr>
+            </a:solidFill>
+          </a:endParaRPr>
+        </a:p>
+      </dgm:t>
+    </dgm:pt>
+    <dgm:pt modelId="{A06CC03E-A729-4B01-863C-1B3771135144}" type="parTrans" cxnId="{0B7B704C-E024-4821-B35F-7E3E5847A8AD}">
+      <dgm:prSet/>
+      <dgm:spPr/>
+      <dgm:t>
+        <a:bodyPr/>
+        <a:lstStyle/>
+        <a:p>
+          <a:endParaRPr lang="en-US"/>
+        </a:p>
+      </dgm:t>
+    </dgm:pt>
+    <dgm:pt modelId="{89352768-B7AB-4E76-A6C6-0680FA7F1EF1}" type="sibTrans" cxnId="{0B7B704C-E024-4821-B35F-7E3E5847A8AD}">
+      <dgm:prSet/>
+      <dgm:spPr/>
+      <dgm:t>
+        <a:bodyPr/>
+        <a:lstStyle/>
+        <a:p>
+          <a:endParaRPr lang="en-US"/>
+        </a:p>
+      </dgm:t>
+    </dgm:pt>
     <dgm:pt modelId="{D98EF816-E991-4EB7-A8ED-5A6B3AFE13BB}" type="pres">
       <dgm:prSet presAssocID="{3FBAF132-6BA6-45FB-BE0F-F7F7D0DD9F4E}" presName="Name0" presStyleCnt="0">
         <dgm:presLayoutVars>
@@ -1559,11 +1637,24 @@
       <dgm:spPr/>
     </dgm:pt>
     <dgm:pt modelId="{A2B158C6-6A45-4A74-AD05-46EDE3C484F6}" type="pres">
-      <dgm:prSet presAssocID="{AD528BF3-8AF3-450F-92F8-492153267BE2}" presName="bgChev" presStyleLbl="node1" presStyleIdx="0" presStyleCnt="7" custLinFactY="100000" custLinFactNeighborX="9703" custLinFactNeighborY="111440"/>
-      <dgm:spPr/>
+      <dgm:prSet presAssocID="{AD528BF3-8AF3-450F-92F8-492153267BE2}" presName="bgChev" presStyleLbl="node1" presStyleIdx="0" presStyleCnt="8" custLinFactY="100000" custLinFactNeighborX="2778" custLinFactNeighborY="154931"/>
+      <dgm:spPr>
+        <a:solidFill>
+          <a:schemeClr val="bg1">
+            <a:lumMod val="50000"/>
+          </a:schemeClr>
+        </a:solidFill>
+      </dgm:spPr>
+      <dgm:t>
+        <a:bodyPr/>
+        <a:lstStyle/>
+        <a:p>
+          <a:endParaRPr lang="en-US"/>
+        </a:p>
+      </dgm:t>
     </dgm:pt>
     <dgm:pt modelId="{D5BE2241-66D3-43A7-8956-799E6E0BC027}" type="pres">
-      <dgm:prSet presAssocID="{AD528BF3-8AF3-450F-92F8-492153267BE2}" presName="txNode" presStyleLbl="fgAcc1" presStyleIdx="0" presStyleCnt="7" custScaleX="131570" custScaleY="173216" custLinFactY="206945" custLinFactNeighborX="-1720" custLinFactNeighborY="300000">
+      <dgm:prSet presAssocID="{AD528BF3-8AF3-450F-92F8-492153267BE2}" presName="txNode" presStyleLbl="fgAcc1" presStyleIdx="0" presStyleCnt="8" custScaleX="131570" custScaleY="173216" custLinFactY="200000" custLinFactNeighborX="-14228" custLinFactNeighborY="298471">
         <dgm:presLayoutVars>
           <dgm:bulletEnabled val="1"/>
         </dgm:presLayoutVars>
@@ -1581,12 +1672,53 @@
       <dgm:prSet presAssocID="{2297F1B7-DA38-45ED-802C-2D6C7D370973}" presName="compositeSpace" presStyleCnt="0"/>
       <dgm:spPr/>
     </dgm:pt>
+    <dgm:pt modelId="{FB035B25-DEDB-4F33-935F-7BA531BBAE5A}" type="pres">
+      <dgm:prSet presAssocID="{2CC8774E-37F3-464D-AE15-4A5D6A317FD6}" presName="composite" presStyleCnt="0"/>
+      <dgm:spPr/>
+    </dgm:pt>
+    <dgm:pt modelId="{0A89CB5A-AEE1-4EBB-9BD7-F3EB22851D57}" type="pres">
+      <dgm:prSet presAssocID="{2CC8774E-37F3-464D-AE15-4A5D6A317FD6}" presName="bgChev" presStyleLbl="node1" presStyleIdx="1" presStyleCnt="8" custLinFactY="60040" custLinFactNeighborX="-4057" custLinFactNeighborY="100000"/>
+      <dgm:spPr>
+        <a:solidFill>
+          <a:schemeClr val="accent4">
+            <a:lumMod val="40000"/>
+            <a:lumOff val="60000"/>
+          </a:schemeClr>
+        </a:solidFill>
+      </dgm:spPr>
+      <dgm:t>
+        <a:bodyPr/>
+        <a:lstStyle/>
+        <a:p>
+          <a:endParaRPr lang="en-US"/>
+        </a:p>
+      </dgm:t>
+    </dgm:pt>
+    <dgm:pt modelId="{A7B1AF0B-9D17-4176-9A9C-38EB3F5D11B0}" type="pres">
+      <dgm:prSet presAssocID="{2CC8774E-37F3-464D-AE15-4A5D6A317FD6}" presName="txNode" presStyleLbl="fgAcc1" presStyleIdx="1" presStyleCnt="8" custScaleY="211066" custLinFactY="100000" custLinFactNeighborX="-3541" custLinFactNeighborY="171859">
+        <dgm:presLayoutVars>
+          <dgm:bulletEnabled val="1"/>
+        </dgm:presLayoutVars>
+      </dgm:prSet>
+      <dgm:spPr/>
+      <dgm:t>
+        <a:bodyPr/>
+        <a:lstStyle/>
+        <a:p>
+          <a:endParaRPr lang="en-US"/>
+        </a:p>
+      </dgm:t>
+    </dgm:pt>
+    <dgm:pt modelId="{D8CC2A73-3087-4FD5-842C-E2C1AA5AD2FB}" type="pres">
+      <dgm:prSet presAssocID="{89352768-B7AB-4E76-A6C6-0680FA7F1EF1}" presName="compositeSpace" presStyleCnt="0"/>
+      <dgm:spPr/>
+    </dgm:pt>
     <dgm:pt modelId="{F577AD39-128A-4DB3-BEE3-D0580CE7F32A}" type="pres">
       <dgm:prSet presAssocID="{0975D220-3F1D-4B2A-ADBD-92CFAA409B31}" presName="composite" presStyleCnt="0"/>
       <dgm:spPr/>
     </dgm:pt>
     <dgm:pt modelId="{BBCFD0CF-2AB3-4CB7-9737-1A5598CF8784}" type="pres">
-      <dgm:prSet presAssocID="{0975D220-3F1D-4B2A-ADBD-92CFAA409B31}" presName="bgChev" presStyleLbl="node1" presStyleIdx="1" presStyleCnt="7" custLinFactNeighborY="95756"/>
+      <dgm:prSet presAssocID="{0975D220-3F1D-4B2A-ADBD-92CFAA409B31}" presName="bgChev" presStyleLbl="node1" presStyleIdx="2" presStyleCnt="8" custLinFactNeighborY="95756"/>
       <dgm:spPr>
         <a:solidFill>
           <a:srgbClr val="00B050"/>
@@ -1594,7 +1726,7 @@
       </dgm:spPr>
     </dgm:pt>
     <dgm:pt modelId="{26C0EEFD-2595-4AB0-8EA4-3A4AB15D9D9F}" type="pres">
-      <dgm:prSet presAssocID="{0975D220-3F1D-4B2A-ADBD-92CFAA409B31}" presName="txNode" presStyleLbl="fgAcc1" presStyleIdx="1" presStyleCnt="7" custScaleY="194560" custLinFactY="-100000" custLinFactNeighborX="-26071" custLinFactNeighborY="-157186">
+      <dgm:prSet presAssocID="{0975D220-3F1D-4B2A-ADBD-92CFAA409B31}" presName="txNode" presStyleLbl="fgAcc1" presStyleIdx="2" presStyleCnt="8" custScaleY="103146" custLinFactY="63149" custLinFactNeighborX="-3361" custLinFactNeighborY="100000">
         <dgm:presLayoutVars>
           <dgm:bulletEnabled val="1"/>
         </dgm:presLayoutVars>
@@ -1617,7 +1749,7 @@
       <dgm:spPr/>
     </dgm:pt>
     <dgm:pt modelId="{AEAB4218-8035-4C7C-B07B-0BE746CEFE17}" type="pres">
-      <dgm:prSet presAssocID="{E41B49C4-DAD6-4A0C-8974-1768191F96A0}" presName="bgChev" presStyleLbl="node1" presStyleIdx="2" presStyleCnt="7"/>
+      <dgm:prSet presAssocID="{E41B49C4-DAD6-4A0C-8974-1768191F96A0}" presName="bgChev" presStyleLbl="node1" presStyleIdx="3" presStyleCnt="8" custScaleY="107627" custLinFactNeighborY="-11037"/>
       <dgm:spPr>
         <a:solidFill>
           <a:schemeClr val="accent6">
@@ -1627,7 +1759,7 @@
       </dgm:spPr>
     </dgm:pt>
     <dgm:pt modelId="{D6039280-1B68-4D37-AFF6-C6CB45275841}" type="pres">
-      <dgm:prSet presAssocID="{E41B49C4-DAD6-4A0C-8974-1768191F96A0}" presName="txNode" presStyleLbl="fgAcc1" presStyleIdx="2" presStyleCnt="7" custScaleY="166512" custLinFactNeighborX="-1339" custLinFactNeighborY="83256">
+      <dgm:prSet presAssocID="{E41B49C4-DAD6-4A0C-8974-1768191F96A0}" presName="txNode" presStyleLbl="fgAcc1" presStyleIdx="3" presStyleCnt="8" custScaleY="107762" custLinFactNeighborX="-3083" custLinFactNeighborY="59450">
         <dgm:presLayoutVars>
           <dgm:bulletEnabled val="1"/>
         </dgm:presLayoutVars>
@@ -1650,7 +1782,7 @@
       <dgm:spPr/>
     </dgm:pt>
     <dgm:pt modelId="{1CB2B5E0-B6F0-4F09-AD95-BE05B2BEEF43}" type="pres">
-      <dgm:prSet presAssocID="{3F57059B-DA89-415E-989D-68EBDE411D29}" presName="bgChev" presStyleLbl="node1" presStyleIdx="3" presStyleCnt="7"/>
+      <dgm:prSet presAssocID="{3F57059B-DA89-415E-989D-68EBDE411D29}" presName="bgChev" presStyleLbl="node1" presStyleIdx="4" presStyleCnt="8"/>
       <dgm:spPr>
         <a:solidFill>
           <a:schemeClr val="accent6">
@@ -1660,7 +1792,7 @@
       </dgm:spPr>
     </dgm:pt>
     <dgm:pt modelId="{882D8ECD-9245-4AFA-BA43-100AC2EBAE56}" type="pres">
-      <dgm:prSet presAssocID="{3F57059B-DA89-415E-989D-68EBDE411D29}" presName="txNode" presStyleLbl="fgAcc1" presStyleIdx="3" presStyleCnt="7" custScaleY="166512" custLinFactNeighborY="83256">
+      <dgm:prSet presAssocID="{3F57059B-DA89-415E-989D-68EBDE411D29}" presName="txNode" presStyleLbl="fgAcc1" presStyleIdx="4" presStyleCnt="8" custScaleX="93764" custScaleY="134815" custLinFactNeighborX="-5592" custLinFactNeighborY="79753">
         <dgm:presLayoutVars>
           <dgm:bulletEnabled val="1"/>
         </dgm:presLayoutVars>
@@ -1683,7 +1815,7 @@
       <dgm:spPr/>
     </dgm:pt>
     <dgm:pt modelId="{B9E54093-5DCC-4102-83E9-7B92D2DC7B50}" type="pres">
-      <dgm:prSet presAssocID="{7480D80E-6CB6-4742-86A7-24A15585A386}" presName="bgChev" presStyleLbl="node1" presStyleIdx="4" presStyleCnt="7"/>
+      <dgm:prSet presAssocID="{7480D80E-6CB6-4742-86A7-24A15585A386}" presName="bgChev" presStyleLbl="node1" presStyleIdx="5" presStyleCnt="8"/>
       <dgm:spPr>
         <a:solidFill>
           <a:schemeClr val="accent6">
@@ -1693,7 +1825,7 @@
       </dgm:spPr>
     </dgm:pt>
     <dgm:pt modelId="{53B2F2FC-9730-430E-A12F-7CA23C85FBFF}" type="pres">
-      <dgm:prSet presAssocID="{7480D80E-6CB6-4742-86A7-24A15585A386}" presName="txNode" presStyleLbl="fgAcc1" presStyleIdx="4" presStyleCnt="7" custScaleY="166512" custLinFactNeighborY="83256">
+      <dgm:prSet presAssocID="{7480D80E-6CB6-4742-86A7-24A15585A386}" presName="txNode" presStyleLbl="fgAcc1" presStyleIdx="5" presStyleCnt="8" custScaleX="95577" custScaleY="135712" custLinFactNeighborX="-2142" custLinFactNeighborY="79529">
         <dgm:presLayoutVars>
           <dgm:bulletEnabled val="1"/>
         </dgm:presLayoutVars>
@@ -1716,7 +1848,7 @@
       <dgm:spPr/>
     </dgm:pt>
     <dgm:pt modelId="{2139C77C-3A89-4BDA-B798-B4F292225138}" type="pres">
-      <dgm:prSet presAssocID="{813B2B90-F4D1-4F57-8F35-B0829535FD78}" presName="bgChev" presStyleLbl="node1" presStyleIdx="5" presStyleCnt="7" custScaleY="100881" custLinFactY="-5393" custLinFactNeighborX="4449" custLinFactNeighborY="-100000"/>
+      <dgm:prSet presAssocID="{813B2B90-F4D1-4F57-8F35-B0829535FD78}" presName="bgChev" presStyleLbl="node1" presStyleIdx="6" presStyleCnt="8" custScaleY="100881" custLinFactY="-5393" custLinFactNeighborX="4449" custLinFactNeighborY="-100000"/>
       <dgm:spPr>
         <a:solidFill>
           <a:schemeClr val="accent2">
@@ -1726,7 +1858,7 @@
       </dgm:spPr>
     </dgm:pt>
     <dgm:pt modelId="{F09C1E16-67DD-470B-ACB5-2832B092913D}" type="pres">
-      <dgm:prSet presAssocID="{813B2B90-F4D1-4F57-8F35-B0829535FD78}" presName="txNode" presStyleLbl="fgAcc1" presStyleIdx="5" presStyleCnt="7" custScaleX="129113" custScaleY="209349" custLinFactY="-200000" custLinFactNeighborX="-18918" custLinFactNeighborY="-234289">
+      <dgm:prSet presAssocID="{813B2B90-F4D1-4F57-8F35-B0829535FD78}" presName="txNode" presStyleLbl="fgAcc1" presStyleIdx="6" presStyleCnt="8" custScaleX="135987" custScaleY="209349" custLinFactY="-200000" custLinFactNeighborX="-6505" custLinFactNeighborY="-234765">
         <dgm:presLayoutVars>
           <dgm:bulletEnabled val="1"/>
         </dgm:presLayoutVars>
@@ -1749,7 +1881,7 @@
       <dgm:spPr/>
     </dgm:pt>
     <dgm:pt modelId="{1B334896-982D-49E0-86DD-27BFE895239F}" type="pres">
-      <dgm:prSet presAssocID="{3F99930D-1B1E-401C-8940-8AFD556A5259}" presName="bgChev" presStyleLbl="node1" presStyleIdx="6" presStyleCnt="7" custLinFactY="-100000" custLinFactNeighborX="-10518" custLinFactNeighborY="-108897"/>
+      <dgm:prSet presAssocID="{3F99930D-1B1E-401C-8940-8AFD556A5259}" presName="bgChev" presStyleLbl="node1" presStyleIdx="7" presStyleCnt="8" custLinFactY="-100000" custLinFactNeighborX="-10518" custLinFactNeighborY="-108897"/>
       <dgm:spPr>
         <a:solidFill>
           <a:srgbClr val="FF0000"/>
@@ -1757,7 +1889,7 @@
       </dgm:spPr>
     </dgm:pt>
     <dgm:pt modelId="{68241A61-48FB-4C05-A2D5-FA6C50320AE1}" type="pres">
-      <dgm:prSet presAssocID="{3F99930D-1B1E-401C-8940-8AFD556A5259}" presName="txNode" presStyleLbl="fgAcc1" presStyleIdx="6" presStyleCnt="7" custScaleY="154830" custLinFactY="32754" custLinFactNeighborX="-33992" custLinFactNeighborY="100000">
+      <dgm:prSet presAssocID="{3F99930D-1B1E-401C-8940-8AFD556A5259}" presName="txNode" presStyleLbl="fgAcc1" presStyleIdx="7" presStyleCnt="8" custScaleY="267515" custLinFactY="64167" custLinFactNeighborX="-41237" custLinFactNeighborY="100000">
         <dgm:presLayoutVars>
           <dgm:bulletEnabled val="1"/>
         </dgm:presLayoutVars>
@@ -1773,46 +1905,52 @@
     </dgm:pt>
   </dgm:ptLst>
   <dgm:cxnLst>
-    <dgm:cxn modelId="{8CD06533-B227-475C-9004-6AEC9CBE39F9}" srcId="{3FBAF132-6BA6-45FB-BE0F-F7F7D0DD9F4E}" destId="{0975D220-3F1D-4B2A-ADBD-92CFAA409B31}" srcOrd="1" destOrd="0" parTransId="{56FC6522-15ED-438F-94AC-BC1BBE92897D}" sibTransId="{222C6A30-5D3D-4D3A-8697-E84665B8772D}"/>
-    <dgm:cxn modelId="{B4F7F984-3B29-4735-9C9B-D810C5C9D3E5}" type="presOf" srcId="{0975D220-3F1D-4B2A-ADBD-92CFAA409B31}" destId="{26C0EEFD-2595-4AB0-8EA4-3A4AB15D9D9F}" srcOrd="0" destOrd="0" presId="urn:microsoft.com/office/officeart/2005/8/layout/chevronAccent+Icon"/>
-    <dgm:cxn modelId="{4A48189C-6526-4D0A-B02C-07491534889C}" srcId="{3FBAF132-6BA6-45FB-BE0F-F7F7D0DD9F4E}" destId="{3F57059B-DA89-415E-989D-68EBDE411D29}" srcOrd="3" destOrd="0" parTransId="{BA9830C7-A57F-47CC-B94B-30C8F695350F}" sibTransId="{B17C7E0C-9B56-49DB-9009-2CFE808C9BA7}"/>
-    <dgm:cxn modelId="{D2FFBC4A-A016-4D7D-8F30-DED106CDD2FA}" type="presOf" srcId="{E41B49C4-DAD6-4A0C-8974-1768191F96A0}" destId="{D6039280-1B68-4D37-AFF6-C6CB45275841}" srcOrd="0" destOrd="0" presId="urn:microsoft.com/office/officeart/2005/8/layout/chevronAccent+Icon"/>
-    <dgm:cxn modelId="{96A4831F-981B-4F43-9AA8-FD55DB651FFA}" type="presOf" srcId="{3FBAF132-6BA6-45FB-BE0F-F7F7D0DD9F4E}" destId="{D98EF816-E991-4EB7-A8ED-5A6B3AFE13BB}" srcOrd="0" destOrd="0" presId="urn:microsoft.com/office/officeart/2005/8/layout/chevronAccent+Icon"/>
+    <dgm:cxn modelId="{35371016-4C8F-44C5-A52C-1BEEFCD8D95F}" type="presOf" srcId="{7480D80E-6CB6-4742-86A7-24A15585A386}" destId="{53B2F2FC-9730-430E-A12F-7CA23C85FBFF}" srcOrd="0" destOrd="0" presId="urn:microsoft.com/office/officeart/2005/8/layout/chevronAccent+Icon"/>
+    <dgm:cxn modelId="{CD0F192B-9531-4E7C-830F-B651230463B3}" srcId="{3FBAF132-6BA6-45FB-BE0F-F7F7D0DD9F4E}" destId="{AD528BF3-8AF3-450F-92F8-492153267BE2}" srcOrd="0" destOrd="0" parTransId="{0A4C6BFE-C308-4A8F-B408-8DCB2D9CD3B8}" sibTransId="{2297F1B7-DA38-45ED-802C-2D6C7D370973}"/>
+    <dgm:cxn modelId="{F3817B01-41A2-460B-9995-B5C768185EA0}" srcId="{3FBAF132-6BA6-45FB-BE0F-F7F7D0DD9F4E}" destId="{813B2B90-F4D1-4F57-8F35-B0829535FD78}" srcOrd="6" destOrd="0" parTransId="{B1AB105C-1215-40AD-86C3-5B4A51560B71}" sibTransId="{AEC81595-8B07-480A-AA56-755C5AE4C1B3}"/>
     <dgm:cxn modelId="{88406487-567E-4856-9324-C83F60D99653}" type="presOf" srcId="{3F57059B-DA89-415E-989D-68EBDE411D29}" destId="{882D8ECD-9245-4AFA-BA43-100AC2EBAE56}" srcOrd="0" destOrd="0" presId="urn:microsoft.com/office/officeart/2005/8/layout/chevronAccent+Icon"/>
     <dgm:cxn modelId="{EAF1F64E-8676-4029-A1C7-791C2E44DC44}" type="presOf" srcId="{AD528BF3-8AF3-450F-92F8-492153267BE2}" destId="{D5BE2241-66D3-43A7-8956-799E6E0BC027}" srcOrd="0" destOrd="0" presId="urn:microsoft.com/office/officeart/2005/8/layout/chevronAccent+Icon"/>
     <dgm:cxn modelId="{D41668ED-BEEC-4695-A6CE-BE9531C6A5A2}" type="presOf" srcId="{3F99930D-1B1E-401C-8940-8AFD556A5259}" destId="{68241A61-48FB-4C05-A2D5-FA6C50320AE1}" srcOrd="0" destOrd="0" presId="urn:microsoft.com/office/officeart/2005/8/layout/chevronAccent+Icon"/>
-    <dgm:cxn modelId="{F3817B01-41A2-460B-9995-B5C768185EA0}" srcId="{3FBAF132-6BA6-45FB-BE0F-F7F7D0DD9F4E}" destId="{813B2B90-F4D1-4F57-8F35-B0829535FD78}" srcOrd="5" destOrd="0" parTransId="{B1AB105C-1215-40AD-86C3-5B4A51560B71}" sibTransId="{AEC81595-8B07-480A-AA56-755C5AE4C1B3}"/>
-    <dgm:cxn modelId="{35371016-4C8F-44C5-A52C-1BEEFCD8D95F}" type="presOf" srcId="{7480D80E-6CB6-4742-86A7-24A15585A386}" destId="{53B2F2FC-9730-430E-A12F-7CA23C85FBFF}" srcOrd="0" destOrd="0" presId="urn:microsoft.com/office/officeart/2005/8/layout/chevronAccent+Icon"/>
-    <dgm:cxn modelId="{661120E4-A8E2-46FD-8488-F8E2263E1586}" srcId="{3FBAF132-6BA6-45FB-BE0F-F7F7D0DD9F4E}" destId="{3F99930D-1B1E-401C-8940-8AFD556A5259}" srcOrd="6" destOrd="0" parTransId="{97FA187C-E475-4954-9E29-4C04EDE9CF82}" sibTransId="{5EF13537-7F37-4F92-8B83-E7E385347A65}"/>
+    <dgm:cxn modelId="{70B66073-CB8A-4B97-88E4-0257C315B1F7}" srcId="{3FBAF132-6BA6-45FB-BE0F-F7F7D0DD9F4E}" destId="{E41B49C4-DAD6-4A0C-8974-1768191F96A0}" srcOrd="3" destOrd="0" parTransId="{5EFB7379-3A3E-4E5F-85D3-42C230999D44}" sibTransId="{F2CCCED7-A565-4EAA-9FA9-7D5E95EC9F9D}"/>
+    <dgm:cxn modelId="{E4A15A80-4FB8-4BE3-A929-D0E081C25251}" type="presOf" srcId="{2CC8774E-37F3-464D-AE15-4A5D6A317FD6}" destId="{A7B1AF0B-9D17-4176-9A9C-38EB3F5D11B0}" srcOrd="0" destOrd="0" presId="urn:microsoft.com/office/officeart/2005/8/layout/chevronAccent+Icon"/>
+    <dgm:cxn modelId="{661120E4-A8E2-46FD-8488-F8E2263E1586}" srcId="{3FBAF132-6BA6-45FB-BE0F-F7F7D0DD9F4E}" destId="{3F99930D-1B1E-401C-8940-8AFD556A5259}" srcOrd="7" destOrd="0" parTransId="{97FA187C-E475-4954-9E29-4C04EDE9CF82}" sibTransId="{5EF13537-7F37-4F92-8B83-E7E385347A65}"/>
+    <dgm:cxn modelId="{4A48189C-6526-4D0A-B02C-07491534889C}" srcId="{3FBAF132-6BA6-45FB-BE0F-F7F7D0DD9F4E}" destId="{3F57059B-DA89-415E-989D-68EBDE411D29}" srcOrd="4" destOrd="0" parTransId="{BA9830C7-A57F-47CC-B94B-30C8F695350F}" sibTransId="{B17C7E0C-9B56-49DB-9009-2CFE808C9BA7}"/>
+    <dgm:cxn modelId="{677F63E9-D717-4C41-81FA-2766AF03B947}" srcId="{3FBAF132-6BA6-45FB-BE0F-F7F7D0DD9F4E}" destId="{7480D80E-6CB6-4742-86A7-24A15585A386}" srcOrd="5" destOrd="0" parTransId="{C9348670-83D9-4F2E-AE53-D29BA54E7E4C}" sibTransId="{C0069D91-34AF-4459-A004-E321F54C7FBC}"/>
     <dgm:cxn modelId="{3211D128-4423-4AEE-B476-DBCB53059F49}" type="presOf" srcId="{813B2B90-F4D1-4F57-8F35-B0829535FD78}" destId="{F09C1E16-67DD-470B-ACB5-2832B092913D}" srcOrd="0" destOrd="0" presId="urn:microsoft.com/office/officeart/2005/8/layout/chevronAccent+Icon"/>
-    <dgm:cxn modelId="{677F63E9-D717-4C41-81FA-2766AF03B947}" srcId="{3FBAF132-6BA6-45FB-BE0F-F7F7D0DD9F4E}" destId="{7480D80E-6CB6-4742-86A7-24A15585A386}" srcOrd="4" destOrd="0" parTransId="{C9348670-83D9-4F2E-AE53-D29BA54E7E4C}" sibTransId="{C0069D91-34AF-4459-A004-E321F54C7FBC}"/>
-    <dgm:cxn modelId="{CD0F192B-9531-4E7C-830F-B651230463B3}" srcId="{3FBAF132-6BA6-45FB-BE0F-F7F7D0DD9F4E}" destId="{AD528BF3-8AF3-450F-92F8-492153267BE2}" srcOrd="0" destOrd="0" parTransId="{0A4C6BFE-C308-4A8F-B408-8DCB2D9CD3B8}" sibTransId="{2297F1B7-DA38-45ED-802C-2D6C7D370973}"/>
-    <dgm:cxn modelId="{70B66073-CB8A-4B97-88E4-0257C315B1F7}" srcId="{3FBAF132-6BA6-45FB-BE0F-F7F7D0DD9F4E}" destId="{E41B49C4-DAD6-4A0C-8974-1768191F96A0}" srcOrd="2" destOrd="0" parTransId="{5EFB7379-3A3E-4E5F-85D3-42C230999D44}" sibTransId="{F2CCCED7-A565-4EAA-9FA9-7D5E95EC9F9D}"/>
+    <dgm:cxn modelId="{D2FFBC4A-A016-4D7D-8F30-DED106CDD2FA}" type="presOf" srcId="{E41B49C4-DAD6-4A0C-8974-1768191F96A0}" destId="{D6039280-1B68-4D37-AFF6-C6CB45275841}" srcOrd="0" destOrd="0" presId="urn:microsoft.com/office/officeart/2005/8/layout/chevronAccent+Icon"/>
+    <dgm:cxn modelId="{8CD06533-B227-475C-9004-6AEC9CBE39F9}" srcId="{3FBAF132-6BA6-45FB-BE0F-F7F7D0DD9F4E}" destId="{0975D220-3F1D-4B2A-ADBD-92CFAA409B31}" srcOrd="2" destOrd="0" parTransId="{56FC6522-15ED-438F-94AC-BC1BBE92897D}" sibTransId="{222C6A30-5D3D-4D3A-8697-E84665B8772D}"/>
+    <dgm:cxn modelId="{0B7B704C-E024-4821-B35F-7E3E5847A8AD}" srcId="{3FBAF132-6BA6-45FB-BE0F-F7F7D0DD9F4E}" destId="{2CC8774E-37F3-464D-AE15-4A5D6A317FD6}" srcOrd="1" destOrd="0" parTransId="{A06CC03E-A729-4B01-863C-1B3771135144}" sibTransId="{89352768-B7AB-4E76-A6C6-0680FA7F1EF1}"/>
+    <dgm:cxn modelId="{96A4831F-981B-4F43-9AA8-FD55DB651FFA}" type="presOf" srcId="{3FBAF132-6BA6-45FB-BE0F-F7F7D0DD9F4E}" destId="{D98EF816-E991-4EB7-A8ED-5A6B3AFE13BB}" srcOrd="0" destOrd="0" presId="urn:microsoft.com/office/officeart/2005/8/layout/chevronAccent+Icon"/>
+    <dgm:cxn modelId="{B4F7F984-3B29-4735-9C9B-D810C5C9D3E5}" type="presOf" srcId="{0975D220-3F1D-4B2A-ADBD-92CFAA409B31}" destId="{26C0EEFD-2595-4AB0-8EA4-3A4AB15D9D9F}" srcOrd="0" destOrd="0" presId="urn:microsoft.com/office/officeart/2005/8/layout/chevronAccent+Icon"/>
     <dgm:cxn modelId="{4F311A77-60F4-4CE8-B737-02114A053893}" type="presParOf" srcId="{D98EF816-E991-4EB7-A8ED-5A6B3AFE13BB}" destId="{9F1AC8ED-0B9F-4A90-A33F-FA2C954F6ACE}" srcOrd="0" destOrd="0" presId="urn:microsoft.com/office/officeart/2005/8/layout/chevronAccent+Icon"/>
     <dgm:cxn modelId="{C5BB4B93-CF1E-4492-8802-1E4F4D8E3DD4}" type="presParOf" srcId="{9F1AC8ED-0B9F-4A90-A33F-FA2C954F6ACE}" destId="{A2B158C6-6A45-4A74-AD05-46EDE3C484F6}" srcOrd="0" destOrd="0" presId="urn:microsoft.com/office/officeart/2005/8/layout/chevronAccent+Icon"/>
     <dgm:cxn modelId="{8E94C364-380C-443C-8D2C-CA362DCFE83D}" type="presParOf" srcId="{9F1AC8ED-0B9F-4A90-A33F-FA2C954F6ACE}" destId="{D5BE2241-66D3-43A7-8956-799E6E0BC027}" srcOrd="1" destOrd="0" presId="urn:microsoft.com/office/officeart/2005/8/layout/chevronAccent+Icon"/>
     <dgm:cxn modelId="{4086FA27-3822-4BF5-82C6-B7A8C08676B6}" type="presParOf" srcId="{D98EF816-E991-4EB7-A8ED-5A6B3AFE13BB}" destId="{6B75E740-3875-4F8B-AC09-C71C3097B6D2}" srcOrd="1" destOrd="0" presId="urn:microsoft.com/office/officeart/2005/8/layout/chevronAccent+Icon"/>
-    <dgm:cxn modelId="{F2DA474F-A30C-422B-B929-40639B7869FF}" type="presParOf" srcId="{D98EF816-E991-4EB7-A8ED-5A6B3AFE13BB}" destId="{F577AD39-128A-4DB3-BEE3-D0580CE7F32A}" srcOrd="2" destOrd="0" presId="urn:microsoft.com/office/officeart/2005/8/layout/chevronAccent+Icon"/>
+    <dgm:cxn modelId="{552078F3-A828-4679-8F61-32B36A48BBA7}" type="presParOf" srcId="{D98EF816-E991-4EB7-A8ED-5A6B3AFE13BB}" destId="{FB035B25-DEDB-4F33-935F-7BA531BBAE5A}" srcOrd="2" destOrd="0" presId="urn:microsoft.com/office/officeart/2005/8/layout/chevronAccent+Icon"/>
+    <dgm:cxn modelId="{4CCB37AB-B7AB-4C3D-B62E-1A4D516E4835}" type="presParOf" srcId="{FB035B25-DEDB-4F33-935F-7BA531BBAE5A}" destId="{0A89CB5A-AEE1-4EBB-9BD7-F3EB22851D57}" srcOrd="0" destOrd="0" presId="urn:microsoft.com/office/officeart/2005/8/layout/chevronAccent+Icon"/>
+    <dgm:cxn modelId="{4B6C2817-E290-435A-AC84-0BA1A78D7D8D}" type="presParOf" srcId="{FB035B25-DEDB-4F33-935F-7BA531BBAE5A}" destId="{A7B1AF0B-9D17-4176-9A9C-38EB3F5D11B0}" srcOrd="1" destOrd="0" presId="urn:microsoft.com/office/officeart/2005/8/layout/chevronAccent+Icon"/>
+    <dgm:cxn modelId="{77D31E3D-F41B-4E86-819D-5F80F1321808}" type="presParOf" srcId="{D98EF816-E991-4EB7-A8ED-5A6B3AFE13BB}" destId="{D8CC2A73-3087-4FD5-842C-E2C1AA5AD2FB}" srcOrd="3" destOrd="0" presId="urn:microsoft.com/office/officeart/2005/8/layout/chevronAccent+Icon"/>
+    <dgm:cxn modelId="{F2DA474F-A30C-422B-B929-40639B7869FF}" type="presParOf" srcId="{D98EF816-E991-4EB7-A8ED-5A6B3AFE13BB}" destId="{F577AD39-128A-4DB3-BEE3-D0580CE7F32A}" srcOrd="4" destOrd="0" presId="urn:microsoft.com/office/officeart/2005/8/layout/chevronAccent+Icon"/>
     <dgm:cxn modelId="{E92C100F-CE02-43BE-B590-CDBD3B21013C}" type="presParOf" srcId="{F577AD39-128A-4DB3-BEE3-D0580CE7F32A}" destId="{BBCFD0CF-2AB3-4CB7-9737-1A5598CF8784}" srcOrd="0" destOrd="0" presId="urn:microsoft.com/office/officeart/2005/8/layout/chevronAccent+Icon"/>
     <dgm:cxn modelId="{EBA3A13A-145F-40D8-A023-A60C86C10914}" type="presParOf" srcId="{F577AD39-128A-4DB3-BEE3-D0580CE7F32A}" destId="{26C0EEFD-2595-4AB0-8EA4-3A4AB15D9D9F}" srcOrd="1" destOrd="0" presId="urn:microsoft.com/office/officeart/2005/8/layout/chevronAccent+Icon"/>
-    <dgm:cxn modelId="{FB10DD6A-3DDF-4890-85E4-F878C4081AE6}" type="presParOf" srcId="{D98EF816-E991-4EB7-A8ED-5A6B3AFE13BB}" destId="{8E61D227-E69E-4A9F-9893-981462DFCEEF}" srcOrd="3" destOrd="0" presId="urn:microsoft.com/office/officeart/2005/8/layout/chevronAccent+Icon"/>
-    <dgm:cxn modelId="{37D64977-EF99-419D-A6D5-9549624B1CF5}" type="presParOf" srcId="{D98EF816-E991-4EB7-A8ED-5A6B3AFE13BB}" destId="{CB55AC4B-60B6-41EB-9405-98916FC6B910}" srcOrd="4" destOrd="0" presId="urn:microsoft.com/office/officeart/2005/8/layout/chevronAccent+Icon"/>
+    <dgm:cxn modelId="{FB10DD6A-3DDF-4890-85E4-F878C4081AE6}" type="presParOf" srcId="{D98EF816-E991-4EB7-A8ED-5A6B3AFE13BB}" destId="{8E61D227-E69E-4A9F-9893-981462DFCEEF}" srcOrd="5" destOrd="0" presId="urn:microsoft.com/office/officeart/2005/8/layout/chevronAccent+Icon"/>
+    <dgm:cxn modelId="{37D64977-EF99-419D-A6D5-9549624B1CF5}" type="presParOf" srcId="{D98EF816-E991-4EB7-A8ED-5A6B3AFE13BB}" destId="{CB55AC4B-60B6-41EB-9405-98916FC6B910}" srcOrd="6" destOrd="0" presId="urn:microsoft.com/office/officeart/2005/8/layout/chevronAccent+Icon"/>
     <dgm:cxn modelId="{28EED97B-5BFA-4ED9-B635-8563A4FEADB5}" type="presParOf" srcId="{CB55AC4B-60B6-41EB-9405-98916FC6B910}" destId="{AEAB4218-8035-4C7C-B07B-0BE746CEFE17}" srcOrd="0" destOrd="0" presId="urn:microsoft.com/office/officeart/2005/8/layout/chevronAccent+Icon"/>
     <dgm:cxn modelId="{71AF5889-8685-4F30-80DC-8EAAAC844BA9}" type="presParOf" srcId="{CB55AC4B-60B6-41EB-9405-98916FC6B910}" destId="{D6039280-1B68-4D37-AFF6-C6CB45275841}" srcOrd="1" destOrd="0" presId="urn:microsoft.com/office/officeart/2005/8/layout/chevronAccent+Icon"/>
-    <dgm:cxn modelId="{8368A1CA-91A9-4FF9-897B-2EF26D2DF0F2}" type="presParOf" srcId="{D98EF816-E991-4EB7-A8ED-5A6B3AFE13BB}" destId="{8948F501-596E-4281-AD1C-A6D0E97A3932}" srcOrd="5" destOrd="0" presId="urn:microsoft.com/office/officeart/2005/8/layout/chevronAccent+Icon"/>
-    <dgm:cxn modelId="{172DC018-9ED3-4A33-8DC1-DA1CAD3F8137}" type="presParOf" srcId="{D98EF816-E991-4EB7-A8ED-5A6B3AFE13BB}" destId="{BD6BAE59-E528-4F2F-8A23-3D9B72302A69}" srcOrd="6" destOrd="0" presId="urn:microsoft.com/office/officeart/2005/8/layout/chevronAccent+Icon"/>
+    <dgm:cxn modelId="{8368A1CA-91A9-4FF9-897B-2EF26D2DF0F2}" type="presParOf" srcId="{D98EF816-E991-4EB7-A8ED-5A6B3AFE13BB}" destId="{8948F501-596E-4281-AD1C-A6D0E97A3932}" srcOrd="7" destOrd="0" presId="urn:microsoft.com/office/officeart/2005/8/layout/chevronAccent+Icon"/>
+    <dgm:cxn modelId="{172DC018-9ED3-4A33-8DC1-DA1CAD3F8137}" type="presParOf" srcId="{D98EF816-E991-4EB7-A8ED-5A6B3AFE13BB}" destId="{BD6BAE59-E528-4F2F-8A23-3D9B72302A69}" srcOrd="8" destOrd="0" presId="urn:microsoft.com/office/officeart/2005/8/layout/chevronAccent+Icon"/>
     <dgm:cxn modelId="{D878BC87-2CB2-4CF4-91CF-769EA0336EB5}" type="presParOf" srcId="{BD6BAE59-E528-4F2F-8A23-3D9B72302A69}" destId="{1CB2B5E0-B6F0-4F09-AD95-BE05B2BEEF43}" srcOrd="0" destOrd="0" presId="urn:microsoft.com/office/officeart/2005/8/layout/chevronAccent+Icon"/>
     <dgm:cxn modelId="{FEE86019-02D4-4410-B21C-9637292CCCC4}" type="presParOf" srcId="{BD6BAE59-E528-4F2F-8A23-3D9B72302A69}" destId="{882D8ECD-9245-4AFA-BA43-100AC2EBAE56}" srcOrd="1" destOrd="0" presId="urn:microsoft.com/office/officeart/2005/8/layout/chevronAccent+Icon"/>
-    <dgm:cxn modelId="{58038072-B1D5-4082-9BC1-5348B96FCD78}" type="presParOf" srcId="{D98EF816-E991-4EB7-A8ED-5A6B3AFE13BB}" destId="{4AB7F2F6-730B-4679-97A5-BE594E342BBF}" srcOrd="7" destOrd="0" presId="urn:microsoft.com/office/officeart/2005/8/layout/chevronAccent+Icon"/>
-    <dgm:cxn modelId="{2F8A7636-4F05-42D4-8CA1-ABB30B63C1AF}" type="presParOf" srcId="{D98EF816-E991-4EB7-A8ED-5A6B3AFE13BB}" destId="{1526088C-34AB-4245-AAE2-0D139730183F}" srcOrd="8" destOrd="0" presId="urn:microsoft.com/office/officeart/2005/8/layout/chevronAccent+Icon"/>
+    <dgm:cxn modelId="{58038072-B1D5-4082-9BC1-5348B96FCD78}" type="presParOf" srcId="{D98EF816-E991-4EB7-A8ED-5A6B3AFE13BB}" destId="{4AB7F2F6-730B-4679-97A5-BE594E342BBF}" srcOrd="9" destOrd="0" presId="urn:microsoft.com/office/officeart/2005/8/layout/chevronAccent+Icon"/>
+    <dgm:cxn modelId="{2F8A7636-4F05-42D4-8CA1-ABB30B63C1AF}" type="presParOf" srcId="{D98EF816-E991-4EB7-A8ED-5A6B3AFE13BB}" destId="{1526088C-34AB-4245-AAE2-0D139730183F}" srcOrd="10" destOrd="0" presId="urn:microsoft.com/office/officeart/2005/8/layout/chevronAccent+Icon"/>
     <dgm:cxn modelId="{FC3183FD-33CF-4ED1-8C4F-C3626365B706}" type="presParOf" srcId="{1526088C-34AB-4245-AAE2-0D139730183F}" destId="{B9E54093-5DCC-4102-83E9-7B92D2DC7B50}" srcOrd="0" destOrd="0" presId="urn:microsoft.com/office/officeart/2005/8/layout/chevronAccent+Icon"/>
     <dgm:cxn modelId="{BACD14E3-D24F-4119-AD2D-3EBD1D37EA02}" type="presParOf" srcId="{1526088C-34AB-4245-AAE2-0D139730183F}" destId="{53B2F2FC-9730-430E-A12F-7CA23C85FBFF}" srcOrd="1" destOrd="0" presId="urn:microsoft.com/office/officeart/2005/8/layout/chevronAccent+Icon"/>
-    <dgm:cxn modelId="{1116FA2F-AA5C-44E8-AF84-56E3D782ECF2}" type="presParOf" srcId="{D98EF816-E991-4EB7-A8ED-5A6B3AFE13BB}" destId="{FCD3E610-158D-4E45-8453-BFB9DF7BB5BF}" srcOrd="9" destOrd="0" presId="urn:microsoft.com/office/officeart/2005/8/layout/chevronAccent+Icon"/>
-    <dgm:cxn modelId="{608FFA76-E21A-42D4-888A-92FEC9C0A7D7}" type="presParOf" srcId="{D98EF816-E991-4EB7-A8ED-5A6B3AFE13BB}" destId="{00BFB424-0251-4568-AF4E-0500BC34ABB2}" srcOrd="10" destOrd="0" presId="urn:microsoft.com/office/officeart/2005/8/layout/chevronAccent+Icon"/>
+    <dgm:cxn modelId="{1116FA2F-AA5C-44E8-AF84-56E3D782ECF2}" type="presParOf" srcId="{D98EF816-E991-4EB7-A8ED-5A6B3AFE13BB}" destId="{FCD3E610-158D-4E45-8453-BFB9DF7BB5BF}" srcOrd="11" destOrd="0" presId="urn:microsoft.com/office/officeart/2005/8/layout/chevronAccent+Icon"/>
+    <dgm:cxn modelId="{608FFA76-E21A-42D4-888A-92FEC9C0A7D7}" type="presParOf" srcId="{D98EF816-E991-4EB7-A8ED-5A6B3AFE13BB}" destId="{00BFB424-0251-4568-AF4E-0500BC34ABB2}" srcOrd="12" destOrd="0" presId="urn:microsoft.com/office/officeart/2005/8/layout/chevronAccent+Icon"/>
     <dgm:cxn modelId="{6119865D-D270-40B5-8238-87B95D872C7D}" type="presParOf" srcId="{00BFB424-0251-4568-AF4E-0500BC34ABB2}" destId="{2139C77C-3A89-4BDA-B798-B4F292225138}" srcOrd="0" destOrd="0" presId="urn:microsoft.com/office/officeart/2005/8/layout/chevronAccent+Icon"/>
     <dgm:cxn modelId="{2AA58AD5-9058-4400-9405-8EED0FDFB5D9}" type="presParOf" srcId="{00BFB424-0251-4568-AF4E-0500BC34ABB2}" destId="{F09C1E16-67DD-470B-ACB5-2832B092913D}" srcOrd="1" destOrd="0" presId="urn:microsoft.com/office/officeart/2005/8/layout/chevronAccent+Icon"/>
-    <dgm:cxn modelId="{7979AC44-A84D-4F97-99DD-1ADA62178830}" type="presParOf" srcId="{D98EF816-E991-4EB7-A8ED-5A6B3AFE13BB}" destId="{E66256B3-7FEA-40F5-A284-25F66C5494A5}" srcOrd="11" destOrd="0" presId="urn:microsoft.com/office/officeart/2005/8/layout/chevronAccent+Icon"/>
-    <dgm:cxn modelId="{ED8F5AFE-A431-495A-8413-ADF84E505EAB}" type="presParOf" srcId="{D98EF816-E991-4EB7-A8ED-5A6B3AFE13BB}" destId="{0826D856-7DD5-447E-82D3-D88EC65AC8C1}" srcOrd="12" destOrd="0" presId="urn:microsoft.com/office/officeart/2005/8/layout/chevronAccent+Icon"/>
+    <dgm:cxn modelId="{7979AC44-A84D-4F97-99DD-1ADA62178830}" type="presParOf" srcId="{D98EF816-E991-4EB7-A8ED-5A6B3AFE13BB}" destId="{E66256B3-7FEA-40F5-A284-25F66C5494A5}" srcOrd="13" destOrd="0" presId="urn:microsoft.com/office/officeart/2005/8/layout/chevronAccent+Icon"/>
+    <dgm:cxn modelId="{ED8F5AFE-A431-495A-8413-ADF84E505EAB}" type="presParOf" srcId="{D98EF816-E991-4EB7-A8ED-5A6B3AFE13BB}" destId="{0826D856-7DD5-447E-82D3-D88EC65AC8C1}" srcOrd="14" destOrd="0" presId="urn:microsoft.com/office/officeart/2005/8/layout/chevronAccent+Icon"/>
     <dgm:cxn modelId="{EF77B211-4414-4E83-8E35-B0838DBD3C62}" type="presParOf" srcId="{0826D856-7DD5-447E-82D3-D88EC65AC8C1}" destId="{1B334896-982D-49E0-86DD-27BFE895239F}" srcOrd="0" destOrd="0" presId="urn:microsoft.com/office/officeart/2005/8/layout/chevronAccent+Icon"/>
     <dgm:cxn modelId="{5528DC63-1AE7-441A-9698-ADF42C1E37D2}" type="presParOf" srcId="{0826D856-7DD5-447E-82D3-D88EC65AC8C1}" destId="{68241A61-48FB-4C05-A2D5-FA6C50320AE1}" srcOrd="1" destOrd="0" presId="urn:microsoft.com/office/officeart/2005/8/layout/chevronAccent+Icon"/>
   </dgm:cxnLst>
@@ -1841,8 +1979,8 @@
       </dsp:nvSpPr>
       <dsp:spPr>
         <a:xfrm>
-          <a:off x="75277" y="2422105"/>
-          <a:ext cx="740717" cy="285916"/>
+          <a:off x="24896" y="2475354"/>
+          <a:ext cx="784633" cy="302868"/>
         </a:xfrm>
         <a:prstGeom prst="chevron">
           <a:avLst>
@@ -1850,11 +1988,8 @@
           </a:avLst>
         </a:prstGeom>
         <a:solidFill>
-          <a:schemeClr val="accent1">
-            <a:hueOff val="0"/>
-            <a:satOff val="0"/>
-            <a:lumOff val="0"/>
-            <a:alphaOff val="0"/>
+          <a:schemeClr val="bg1">
+            <a:lumMod val="50000"/>
           </a:schemeClr>
         </a:solidFill>
         <a:ln w="38100" cap="flat" cmpd="sng" algn="ctr">
@@ -1898,8 +2033,173 @@
       </dsp:nvSpPr>
       <dsp:spPr>
         <a:xfrm>
-          <a:off x="91437" y="3233814"/>
-          <a:ext cx="822963" cy="495253"/>
+          <a:off x="13474" y="3177804"/>
+          <a:ext cx="871756" cy="524617"/>
+        </a:xfrm>
+        <a:prstGeom prst="roundRect">
+          <a:avLst>
+            <a:gd name="adj" fmla="val 10000"/>
+          </a:avLst>
+        </a:prstGeom>
+        <a:solidFill>
+          <a:schemeClr val="lt1">
+            <a:alpha val="90000"/>
+            <a:hueOff val="0"/>
+            <a:satOff val="0"/>
+            <a:lumOff val="0"/>
+            <a:alphaOff val="0"/>
+          </a:schemeClr>
+        </a:solidFill>
+        <a:ln w="9525" cap="flat" cmpd="sng" algn="ctr">
+          <a:solidFill>
+            <a:schemeClr val="bg1">
+              <a:lumMod val="75000"/>
+            </a:schemeClr>
+          </a:solidFill>
+          <a:prstDash val="dash"/>
+        </a:ln>
+        <a:effectLst/>
+      </dsp:spPr>
+      <dsp:style>
+        <a:lnRef idx="2">
+          <a:scrgbClr r="0" g="0" b="0"/>
+        </a:lnRef>
+        <a:fillRef idx="1">
+          <a:scrgbClr r="0" g="0" b="0"/>
+        </a:fillRef>
+        <a:effectRef idx="0">
+          <a:scrgbClr r="0" g="0" b="0"/>
+        </a:effectRef>
+        <a:fontRef idx="minor"/>
+      </dsp:style>
+      <dsp:txBody>
+        <a:bodyPr spcFirstLastPara="0" vert="horz" wrap="square" lIns="56896" tIns="56896" rIns="56896" bIns="56896" numCol="1" spcCol="1270" anchor="ctr" anchorCtr="0">
+          <a:noAutofit/>
+        </a:bodyPr>
+        <a:lstStyle/>
+        <a:p>
+          <a:pPr lvl="0" algn="ctr" defTabSz="355600">
+            <a:lnSpc>
+              <a:spcPct val="90000"/>
+            </a:lnSpc>
+            <a:spcBef>
+              <a:spcPct val="0"/>
+            </a:spcBef>
+            <a:spcAft>
+              <a:spcPct val="35000"/>
+            </a:spcAft>
+          </a:pPr>
+          <a:r>
+            <a:rPr lang="en-US" sz="800" b="0" i="0" kern="1200" dirty="0" smtClean="0">
+              <a:solidFill>
+                <a:schemeClr val="bg1">
+                  <a:lumMod val="50000"/>
+                </a:schemeClr>
+              </a:solidFill>
+            </a:rPr>
+            <a:t>2000</a:t>
+          </a:r>
+        </a:p>
+        <a:p>
+          <a:pPr lvl="0" algn="ctr" defTabSz="355600">
+            <a:lnSpc>
+              <a:spcPct val="90000"/>
+            </a:lnSpc>
+            <a:spcBef>
+              <a:spcPct val="0"/>
+            </a:spcBef>
+            <a:spcAft>
+              <a:spcPct val="35000"/>
+            </a:spcAft>
+          </a:pPr>
+          <a:r>
+            <a:rPr lang="en-US" sz="800" b="0" i="0" kern="1200" dirty="0" smtClean="0">
+              <a:solidFill>
+                <a:schemeClr val="bg1">
+                  <a:lumMod val="50000"/>
+                </a:schemeClr>
+              </a:solidFill>
+            </a:rPr>
+            <a:t>Telecom Technician</a:t>
+          </a:r>
+          <a:endParaRPr lang="en-US" sz="800" kern="1200" dirty="0">
+            <a:solidFill>
+              <a:schemeClr val="bg1">
+                <a:lumMod val="50000"/>
+              </a:schemeClr>
+            </a:solidFill>
+          </a:endParaRPr>
+        </a:p>
+      </dsp:txBody>
+      <dsp:txXfrm>
+        <a:off x="28840" y="3193170"/>
+        <a:ext cx="841024" cy="493885"/>
+      </dsp:txXfrm>
+    </dsp:sp>
+    <dsp:sp modelId="{0A89CB5A-AEE1-4EBB-9BD7-F3EB22851D57}">
+      <dsp:nvSpPr>
+        <dsp:cNvPr id="0" name=""/>
+        <dsp:cNvSpPr/>
+      </dsp:nvSpPr>
+      <dsp:spPr>
+        <a:xfrm>
+          <a:off x="972080" y="2187959"/>
+          <a:ext cx="784633" cy="302868"/>
+        </a:xfrm>
+        <a:prstGeom prst="chevron">
+          <a:avLst>
+            <a:gd name="adj" fmla="val 40000"/>
+          </a:avLst>
+        </a:prstGeom>
+        <a:solidFill>
+          <a:schemeClr val="accent4">
+            <a:lumMod val="40000"/>
+            <a:lumOff val="60000"/>
+          </a:schemeClr>
+        </a:solidFill>
+        <a:ln w="38100" cap="flat" cmpd="sng" algn="ctr">
+          <a:solidFill>
+            <a:schemeClr val="lt1">
+              <a:hueOff val="0"/>
+              <a:satOff val="0"/>
+              <a:lumOff val="0"/>
+              <a:alphaOff val="0"/>
+            </a:schemeClr>
+          </a:solidFill>
+          <a:prstDash val="solid"/>
+        </a:ln>
+        <a:effectLst>
+          <a:outerShdw blurRad="40000" dist="20000" dir="5400000" rotWithShape="0">
+            <a:srgbClr val="000000">
+              <a:alpha val="38000"/>
+            </a:srgbClr>
+          </a:outerShdw>
+        </a:effectLst>
+      </dsp:spPr>
+      <dsp:style>
+        <a:lnRef idx="3">
+          <a:scrgbClr r="0" g="0" b="0"/>
+        </a:lnRef>
+        <a:fillRef idx="1">
+          <a:scrgbClr r="0" g="0" b="0"/>
+        </a:fillRef>
+        <a:effectRef idx="1">
+          <a:scrgbClr r="0" g="0" b="0"/>
+        </a:effectRef>
+        <a:fontRef idx="minor">
+          <a:schemeClr val="lt1"/>
+        </a:fontRef>
+      </dsp:style>
+    </dsp:sp>
+    <dsp:sp modelId="{A7B1AF0B-9D17-4176-9A9C-38EB3F5D11B0}">
+      <dsp:nvSpPr>
+        <dsp:cNvPr id="0" name=""/>
+        <dsp:cNvSpPr/>
+      </dsp:nvSpPr>
+      <dsp:spPr>
+        <a:xfrm>
+          <a:off x="1189687" y="2434149"/>
+          <a:ext cx="662579" cy="639252"/>
         </a:xfrm>
         <a:prstGeom prst="roundRect">
           <a:avLst>
@@ -2001,7 +2301,7 @@
             </a:spcAft>
           </a:pPr>
           <a:r>
-            <a:rPr lang="pt-BR" sz="800" kern="1200" dirty="0" smtClean="0">
+            <a:rPr lang="pt-BR" sz="700" kern="1200" dirty="0" smtClean="0">
               <a:solidFill>
                 <a:schemeClr val="bg1">
                   <a:lumMod val="50000"/>
@@ -2010,7 +2310,7 @@
             </a:rPr>
             <a:t>University</a:t>
           </a:r>
-          <a:endParaRPr lang="en-US" sz="800" kern="1200" dirty="0">
+          <a:endParaRPr lang="en-US" sz="700" kern="1200" dirty="0">
             <a:solidFill>
               <a:schemeClr val="bg1">
                 <a:lumMod val="50000"/>
@@ -2020,8 +2320,8 @@
         </a:p>
       </dsp:txBody>
       <dsp:txXfrm>
-        <a:off x="105942" y="3248319"/>
-        <a:ext cx="793953" cy="466243"/>
+        <a:off x="1208410" y="2452872"/>
+        <a:ext cx="625133" cy="601806"/>
       </dsp:txXfrm>
     </dsp:sp>
     <dsp:sp modelId="{BBCFD0CF-2AB3-4CB7-9737-1A5598CF8784}">
@@ -2031,8 +2331,8 @@
       </dsp:nvSpPr>
       <dsp:spPr>
         <a:xfrm>
-          <a:off x="948204" y="2091344"/>
-          <a:ext cx="740717" cy="285916"/>
+          <a:off x="1900139" y="2028739"/>
+          <a:ext cx="784633" cy="302868"/>
         </a:xfrm>
         <a:prstGeom prst="chevron">
           <a:avLst>
@@ -2083,8 +2383,8 @@
       </dsp:nvSpPr>
       <dsp:spPr>
         <a:xfrm>
-          <a:off x="982656" y="1018521"/>
-          <a:ext cx="625494" cy="556280"/>
+          <a:off x="2087106" y="2303805"/>
+          <a:ext cx="662579" cy="312396"/>
         </a:xfrm>
         <a:prstGeom prst="roundRect">
           <a:avLst>
@@ -2182,8 +2482,8 @@
         </a:p>
       </dsp:txBody>
       <dsp:txXfrm>
-        <a:off x="998949" y="1034814"/>
-        <a:ext cx="592908" cy="523694"/>
+        <a:off x="2096256" y="2312955"/>
+        <a:ext cx="644279" cy="294096"/>
       </dsp:txXfrm>
     </dsp:sp>
     <dsp:sp modelId="{AEAB4218-8035-4C7C-B07B-0BE746CEFE17}">
@@ -2193,8 +2493,8 @@
       </dsp:nvSpPr>
       <dsp:spPr>
         <a:xfrm>
-          <a:off x="1794268" y="1817562"/>
-          <a:ext cx="740717" cy="285916"/>
+          <a:off x="2796366" y="1696027"/>
+          <a:ext cx="784633" cy="325968"/>
         </a:xfrm>
         <a:prstGeom prst="chevron">
           <a:avLst>
@@ -2247,8 +2547,8 @@
       </dsp:nvSpPr>
       <dsp:spPr>
         <a:xfrm>
-          <a:off x="1983417" y="2032000"/>
-          <a:ext cx="625494" cy="476086"/>
+          <a:off x="2985174" y="1985023"/>
+          <a:ext cx="662579" cy="326377"/>
         </a:xfrm>
         <a:prstGeom prst="roundRect">
           <a:avLst>
@@ -2346,8 +2646,8 @@
         </a:p>
       </dsp:txBody>
       <dsp:txXfrm>
-        <a:off x="1997361" y="2045944"/>
-        <a:ext cx="597606" cy="448198"/>
+        <a:off x="2994733" y="1994582"/>
+        <a:ext cx="643461" cy="307259"/>
       </dsp:txXfrm>
     </dsp:sp>
     <dsp:sp modelId="{1CB2B5E0-B6F0-4F09-AD95-BE05B2BEEF43}">
@@ -2357,8 +2657,8 @@
       </dsp:nvSpPr>
       <dsp:spPr>
         <a:xfrm>
-          <a:off x="2640332" y="1817562"/>
-          <a:ext cx="740717" cy="285916"/>
+          <a:off x="3692592" y="1714746"/>
+          <a:ext cx="784633" cy="302868"/>
         </a:xfrm>
         <a:prstGeom prst="chevron">
           <a:avLst>
@@ -2411,8 +2711,8 @@
       </dsp:nvSpPr>
       <dsp:spPr>
         <a:xfrm>
-          <a:off x="2837857" y="2032000"/>
-          <a:ext cx="625494" cy="476086"/>
+          <a:off x="3885435" y="1979288"/>
+          <a:ext cx="621261" cy="408312"/>
         </a:xfrm>
         <a:prstGeom prst="roundRect">
           <a:avLst>
@@ -2510,8 +2810,8 @@
         </a:p>
       </dsp:txBody>
       <dsp:txXfrm>
-        <a:off x="2851801" y="2045944"/>
-        <a:ext cx="597606" cy="448198"/>
+        <a:off x="3897394" y="1991247"/>
+        <a:ext cx="597343" cy="384394"/>
       </dsp:txXfrm>
     </dsp:sp>
     <dsp:sp modelId="{B9E54093-5DCC-4102-83E9-7B92D2DC7B50}">
@@ -2521,8 +2821,8 @@
       </dsp:nvSpPr>
       <dsp:spPr>
         <a:xfrm>
-          <a:off x="3486396" y="1817562"/>
-          <a:ext cx="740717" cy="285916"/>
+          <a:off x="4568159" y="1714066"/>
+          <a:ext cx="784633" cy="302868"/>
         </a:xfrm>
         <a:prstGeom prst="chevron">
           <a:avLst>
@@ -2575,8 +2875,8 @@
       </dsp:nvSpPr>
       <dsp:spPr>
         <a:xfrm>
-          <a:off x="3683921" y="2032000"/>
-          <a:ext cx="625494" cy="476086"/>
+          <a:off x="4777855" y="1976572"/>
+          <a:ext cx="633273" cy="411029"/>
         </a:xfrm>
         <a:prstGeom prst="roundRect">
           <a:avLst>
@@ -2674,8 +2974,8 @@
         </a:p>
       </dsp:txBody>
       <dsp:txXfrm>
-        <a:off x="3697865" y="2045944"/>
-        <a:ext cx="597606" cy="448198"/>
+        <a:off x="4789894" y="1988611"/>
+        <a:ext cx="609195" cy="386951"/>
       </dsp:txXfrm>
     </dsp:sp>
     <dsp:sp modelId="{2139C77C-3A89-4BDA-B798-B4F292225138}">
@@ -2685,8 +2985,8 @@
       </dsp:nvSpPr>
       <dsp:spPr>
         <a:xfrm>
-          <a:off x="4365415" y="1514966"/>
-          <a:ext cx="740717" cy="288435"/>
+          <a:off x="5484641" y="1382711"/>
+          <a:ext cx="784633" cy="305536"/>
         </a:xfrm>
         <a:prstGeom prst="chevron">
           <a:avLst>
@@ -2739,8 +3039,8 @@
       </dsp:nvSpPr>
       <dsp:spPr>
         <a:xfrm>
-          <a:off x="4320603" y="491011"/>
-          <a:ext cx="807595" cy="598564"/>
+          <a:off x="5496646" y="296606"/>
+          <a:ext cx="901022" cy="634052"/>
         </a:xfrm>
         <a:prstGeom prst="roundRect">
           <a:avLst>
@@ -2838,8 +3138,8 @@
         </a:p>
       </dsp:txBody>
       <dsp:txXfrm>
-        <a:off x="4338134" y="508542"/>
-        <a:ext cx="772533" cy="563502"/>
+        <a:off x="5515217" y="315177"/>
+        <a:ext cx="863880" cy="596910"/>
       </dsp:txXfrm>
     </dsp:sp>
     <dsp:sp modelId="{1B334896-982D-49E0-86DD-27BFE895239F}">
@@ -2849,8 +3149,8 @@
       </dsp:nvSpPr>
       <dsp:spPr>
         <a:xfrm>
-          <a:off x="5191666" y="1220290"/>
-          <a:ext cx="740717" cy="285916"/>
+          <a:off x="6382652" y="1070564"/>
+          <a:ext cx="784633" cy="302868"/>
         </a:xfrm>
         <a:prstGeom prst="chevron">
           <a:avLst>
@@ -2901,8 +3201,8 @@
       </dsp:nvSpPr>
       <dsp:spPr>
         <a:xfrm>
-          <a:off x="5254481" y="2190223"/>
-          <a:ext cx="625494" cy="442685"/>
+          <a:off x="6401188" y="2022500"/>
+          <a:ext cx="662579" cy="810219"/>
         </a:xfrm>
         <a:prstGeom prst="roundRect">
           <a:avLst>
@@ -2988,7 +3288,7 @@
                 </a:schemeClr>
               </a:solidFill>
             </a:rPr>
-            <a:t>MVP</a:t>
+            <a:t>MVP &amp; Team Leader</a:t>
           </a:r>
           <a:endParaRPr lang="en-US" sz="900" kern="1200" dirty="0">
             <a:solidFill>
@@ -3000,8 +3300,8 @@
         </a:p>
       </dsp:txBody>
       <dsp:txXfrm>
-        <a:off x="5267447" y="2203189"/>
-        <a:ext cx="599562" cy="416753"/>
+        <a:off x="6420594" y="2041906"/>
+        <a:ext cx="623767" cy="771407"/>
       </dsp:txXfrm>
     </dsp:sp>
   </dsp:spTree>
@@ -4285,7 +4585,7 @@
           <a:p>
             <a:fld id="{63772A03-8192-4C8E-851E-DA871DEC8922}" type="datetimeFigureOut">
               <a:rPr lang="fr-FR" smtClean="0"/>
-              <a:t>22/09/2020</a:t>
+              <a:t>23/09/2020</a:t>
             </a:fld>
             <a:endParaRPr lang="fr-FR"/>
           </a:p>
@@ -4455,7 +4755,7 @@
             <a:fld id="{D680E798-53FF-4C51-A981-953463752515}" type="datetimeFigureOut">
               <a:rPr lang="fr-FR" smtClean="0"/>
               <a:pPr/>
-              <a:t>22/09/2020</a:t>
+              <a:t>23/09/2020</a:t>
             </a:fld>
             <a:endParaRPr lang="fr-FR" dirty="0"/>
           </a:p>
@@ -15535,7 +15835,7 @@
           <a:lstStyle/>
           <a:p>
             <a:r>
-              <a:rPr lang="fr-FR"/>
+              <a:rPr lang="fr-FR" dirty="0"/>
               <a:t>Date</a:t>
             </a:r>
           </a:p>
@@ -15557,7 +15857,7 @@
           <a:lstStyle/>
           <a:p>
             <a:r>
-              <a:rPr lang="en-US"/>
+              <a:rPr lang="en-US" dirty="0"/>
               <a:t>Presentation title</a:t>
             </a:r>
             <a:endParaRPr lang="fr-FR" dirty="0"/>
@@ -15612,10 +15912,10 @@
           <a:p>
             <a:pPr lvl="1"/>
             <a:r>
-              <a:rPr lang="fr-FR" dirty="0" smtClean="0"/>
+              <a:rPr lang="fr-FR" i="1" dirty="0" smtClean="0"/>
               <a:t>By André Raiça Silva</a:t>
             </a:r>
-            <a:endParaRPr lang="fr-FR" dirty="0"/>
+            <a:endParaRPr lang="fr-FR" i="1" dirty="0"/>
           </a:p>
         </p:txBody>
       </p:sp>
@@ -16306,7 +16606,15 @@
           <a:p>
             <a:r>
               <a:rPr lang="en-US" b="1" dirty="0" smtClean="0"/>
-              <a:t>The Challenge Architectural Statements:</a:t>
+              <a:t>The Architecture </a:t>
+            </a:r>
+            <a:r>
+              <a:rPr lang="en-US" b="1" dirty="0"/>
+              <a:t>Challenge </a:t>
+            </a:r>
+            <a:r>
+              <a:rPr lang="en-US" b="1" dirty="0" smtClean="0"/>
+              <a:t>Statements:</a:t>
             </a:r>
           </a:p>
           <a:p>
@@ -16540,8 +16848,12 @@
           <a:lstStyle/>
           <a:p>
             <a:r>
+              <a:rPr lang="en-US" b="1" dirty="0" smtClean="0"/>
+              <a:t>Current </a:t>
+            </a:r>
+            <a:r>
               <a:rPr lang="en-US" b="1" dirty="0"/>
-              <a:t>Main Problems Definition</a:t>
+              <a:t>Problems Definition</a:t>
             </a:r>
             <a:r>
               <a:rPr lang="en-US" b="1" dirty="0" smtClean="0"/>
@@ -16574,7 +16886,15 @@
             </a:pPr>
             <a:r>
               <a:rPr lang="en-US" sz="1200" dirty="0"/>
-              <a:t>Too much effort and expensive costs to create &amp; scale Windows Virtual Machine (VM)</a:t>
+              <a:t>Too much effort and expensive costs to create &amp; scale </a:t>
+            </a:r>
+            <a:r>
+              <a:rPr lang="en-US" sz="1200" dirty="0" smtClean="0"/>
+              <a:t>to Windows </a:t>
+            </a:r>
+            <a:r>
+              <a:rPr lang="en-US" sz="1200" dirty="0"/>
+              <a:t>Virtual Machine (VM)</a:t>
             </a:r>
           </a:p>
           <a:p>
@@ -16618,6 +16938,19 @@
             <a:r>
               <a:rPr lang="en-US" sz="1200" dirty="0" smtClean="0"/>
               <a:t>resource</a:t>
+            </a:r>
+          </a:p>
+          <a:p>
+            <a:pPr marL="171450" lvl="0" indent="-171450">
+              <a:spcBef>
+                <a:spcPts val="1200"/>
+              </a:spcBef>
+              <a:buFont typeface="Wingdings" panose="05000000000000000000" pitchFamily="2" charset="2"/>
+              <a:buChar char="§"/>
+            </a:pPr>
+            <a:r>
+              <a:rPr lang="en-US" sz="1200" dirty="0" smtClean="0"/>
+              <a:t>High dependency of all components</a:t>
             </a:r>
             <a:endParaRPr lang="en-US" dirty="0"/>
           </a:p>
@@ -16799,11 +17132,19 @@
           <a:p>
             <a:r>
               <a:rPr lang="en-US" dirty="0"/>
-              <a:t>The proposal includes to migrate the currently technology for</a:t>
+              <a:t>The proposal includes </a:t>
             </a:r>
             <a:r>
               <a:rPr lang="en-US" dirty="0" smtClean="0"/>
-              <a:t>:</a:t>
+              <a:t>the migration of the current </a:t>
+            </a:r>
+            <a:r>
+              <a:rPr lang="en-US" dirty="0"/>
+              <a:t>technology </a:t>
+            </a:r>
+            <a:r>
+              <a:rPr lang="en-US" dirty="0" smtClean="0"/>
+              <a:t>to:</a:t>
             </a:r>
           </a:p>
           <a:p>
@@ -16844,7 +17185,7 @@
           <p:nvPr>
             <p:extLst>
               <p:ext uri="{D42A27DB-BD31-4B8C-83A1-F6EECF244321}">
-                <p14:modId xmlns:p14="http://schemas.microsoft.com/office/powerpoint/2010/main" val="3548648345"/>
+                <p14:modId xmlns:p14="http://schemas.microsoft.com/office/powerpoint/2010/main" val="1475478784"/>
               </p:ext>
             </p:extLst>
           </p:nvPr>
@@ -17048,13 +17389,22 @@
                         <a:t>Microsoft </a:t>
                       </a:r>
                       <a:r>
-                        <a:rPr lang="en-US" sz="1200" dirty="0" err="1">
+                        <a:rPr lang="en-US" sz="1200" dirty="0" err="1" smtClean="0">
                           <a:ln>
                             <a:noFill/>
                           </a:ln>
                           <a:effectLst/>
                         </a:rPr>
-                        <a:t>.net</a:t>
+                        <a:t>.Net</a:t>
+                      </a:r>
+                      <a:r>
+                        <a:rPr lang="en-US" sz="1200" dirty="0" smtClean="0">
+                          <a:ln>
+                            <a:noFill/>
+                          </a:ln>
+                          <a:effectLst/>
+                        </a:rPr>
+                        <a:t> </a:t>
                       </a:r>
                       <a:r>
                         <a:rPr lang="en-US" sz="1200" dirty="0">
@@ -17063,7 +17413,7 @@
                           </a:ln>
                           <a:effectLst/>
                         </a:rPr>
-                        <a:t> Core 3.1</a:t>
+                        <a:t>Core 3.1</a:t>
                       </a:r>
                       <a:endParaRPr lang="en-US" sz="1100" dirty="0">
                         <a:ln>
@@ -17837,12 +18187,16 @@
               <a:t>Microsoft </a:t>
             </a:r>
             <a:r>
-              <a:rPr lang="en-US" sz="1000" b="1" dirty="0" err="1"/>
-              <a:t>.net</a:t>
+              <a:rPr lang="en-US" sz="1000" b="1" dirty="0" err="1" smtClean="0"/>
+              <a:t>.Net</a:t>
+            </a:r>
+            <a:r>
+              <a:rPr lang="en-US" sz="1000" b="1" dirty="0" smtClean="0"/>
+              <a:t> </a:t>
             </a:r>
             <a:r>
               <a:rPr lang="en-US" sz="1000" b="1" dirty="0"/>
-              <a:t> Core</a:t>
+              <a:t>Core</a:t>
             </a:r>
           </a:p>
           <a:p>
@@ -17851,9 +18205,10 @@
               <a:buChar char="§"/>
             </a:pPr>
             <a:r>
-              <a:rPr lang="en-US" sz="1000" dirty="0"/>
-              <a:t>Improved Performance</a:t>
-            </a:r>
+              <a:rPr lang="en-US" sz="1000" dirty="0" smtClean="0"/>
+              <a:t>Improve Performance and it is easy to scale</a:t>
+            </a:r>
+            <a:endParaRPr lang="en-US" sz="1000" dirty="0"/>
           </a:p>
           <a:p>
             <a:pPr marL="171450" lvl="0" indent="-171450" algn="just">
@@ -17862,8 +18217,21 @@
             </a:pPr>
             <a:r>
               <a:rPr lang="en-US" sz="1000" dirty="0"/>
-              <a:t>Cross Platform – Able to run easy in cloud environments</a:t>
-            </a:r>
+              <a:t>Cross Platform – Able to run </a:t>
+            </a:r>
+            <a:r>
+              <a:rPr lang="en-US" sz="1000" dirty="0" smtClean="0"/>
+              <a:t>easily </a:t>
+            </a:r>
+            <a:r>
+              <a:rPr lang="en-US" sz="1000" dirty="0"/>
+              <a:t>in cloud </a:t>
+            </a:r>
+            <a:r>
+              <a:rPr lang="en-US" sz="1000" dirty="0" smtClean="0"/>
+              <a:t>containers</a:t>
+            </a:r>
+            <a:endParaRPr lang="en-US" sz="1000" dirty="0"/>
           </a:p>
           <a:p>
             <a:pPr marL="171450" lvl="0" indent="-171450" algn="just">
@@ -17872,8 +18240,13 @@
             </a:pPr>
             <a:r>
               <a:rPr lang="en-US" sz="1000" dirty="0"/>
-              <a:t>Open Source community support</a:t>
-            </a:r>
+              <a:t>Open Source community </a:t>
+            </a:r>
+            <a:r>
+              <a:rPr lang="en-US" sz="1000" dirty="0" smtClean="0"/>
+              <a:t>support</a:t>
+            </a:r>
+            <a:endParaRPr lang="en-US" sz="1000" dirty="0"/>
           </a:p>
           <a:p>
             <a:pPr marL="171450" lvl="0" indent="-171450" algn="just">
@@ -17908,7 +18281,15 @@
             </a:pPr>
             <a:r>
               <a:rPr lang="en-US" sz="1000" dirty="0"/>
-              <a:t>It is a micro ORM that makes the performance higher</a:t>
+              <a:t>It is a micro </a:t>
+            </a:r>
+            <a:r>
+              <a:rPr lang="en-US" sz="1000" dirty="0" smtClean="0"/>
+              <a:t>ORM, making </a:t>
+            </a:r>
+            <a:r>
+              <a:rPr lang="en-US" sz="1000" dirty="0"/>
+              <a:t>the performance higher</a:t>
             </a:r>
           </a:p>
           <a:p>
@@ -17921,7 +18302,6 @@
               <a:rPr lang="en-US" sz="1000" b="1" dirty="0"/>
               <a:t>Docker</a:t>
             </a:r>
-            <a:endParaRPr lang="en-US" sz="1000" b="1" dirty="0"/>
           </a:p>
           <a:p>
             <a:pPr lvl="1" algn="just">
@@ -17929,8 +18309,12 @@
               <a:buChar char="§"/>
             </a:pPr>
             <a:r>
+              <a:rPr lang="en-US" sz="1000" dirty="0" smtClean="0"/>
+              <a:t>Enables </a:t>
+            </a:r>
+            <a:r>
               <a:rPr lang="en-US" sz="1000" dirty="0"/>
-              <a:t>Docker enables more efficient use of system resources. </a:t>
+              <a:t>more efficient use of system resources. </a:t>
             </a:r>
           </a:p>
           <a:p>
@@ -17939,9 +18323,18 @@
               <a:buChar char="§"/>
             </a:pPr>
             <a:r>
+              <a:rPr lang="en-US" sz="1000" dirty="0" smtClean="0"/>
+              <a:t>Faster </a:t>
+            </a:r>
+            <a:r>
               <a:rPr lang="en-US" sz="1000" dirty="0"/>
-              <a:t>Docker enables faster software delivery cycles. ...</a:t>
-            </a:r>
+              <a:t>software delivery cycles</a:t>
+            </a:r>
+            <a:r>
+              <a:rPr lang="en-US" sz="1000" dirty="0" smtClean="0"/>
+              <a:t>.</a:t>
+            </a:r>
+            <a:endParaRPr lang="en-US" sz="1000" dirty="0"/>
           </a:p>
           <a:p>
             <a:pPr lvl="1" algn="just">
@@ -17949,9 +18342,18 @@
               <a:buChar char="§"/>
             </a:pPr>
             <a:r>
+              <a:rPr lang="en-US" sz="1000" dirty="0" smtClean="0"/>
+              <a:t>Enables </a:t>
+            </a:r>
+            <a:r>
               <a:rPr lang="en-US" sz="1000" dirty="0"/>
-              <a:t>Docker enables application portability. ...</a:t>
-            </a:r>
+              <a:t>application portability</a:t>
+            </a:r>
+            <a:r>
+              <a:rPr lang="en-US" sz="1000" dirty="0" smtClean="0"/>
+              <a:t>.</a:t>
+            </a:r>
+            <a:endParaRPr lang="en-US" sz="1000" dirty="0"/>
           </a:p>
           <a:p>
             <a:pPr lvl="1" algn="just">
@@ -17960,7 +18362,15 @@
             </a:pPr>
             <a:r>
               <a:rPr lang="en-US" sz="1000" dirty="0"/>
-              <a:t>Docker shines for micro-services architecture</a:t>
+              <a:t>Docker </a:t>
+            </a:r>
+            <a:r>
+              <a:rPr lang="en-US" sz="1000" dirty="0" smtClean="0"/>
+              <a:t>is great </a:t>
+            </a:r>
+            <a:r>
+              <a:rPr lang="en-US" sz="1000" dirty="0"/>
+              <a:t>for micro-services architecture</a:t>
             </a:r>
             <a:r>
               <a:rPr lang="en-US" sz="1000" dirty="0" smtClean="0"/>
@@ -17977,60 +18387,6 @@
             <a:r>
               <a:rPr lang="en-US" sz="1000" b="1" dirty="0" smtClean="0"/>
               <a:t>Kubernetes</a:t>
-            </a:r>
-            <a:endParaRPr lang="en-US" sz="1000" b="1" dirty="0"/>
-          </a:p>
-          <a:p>
-            <a:pPr lvl="1" algn="just">
-              <a:buFont typeface="Wingdings" panose="05000000000000000000" pitchFamily="2" charset="2"/>
-              <a:buChar char="§"/>
-            </a:pPr>
-            <a:r>
-              <a:rPr lang="en-US" sz="1000" dirty="0"/>
-              <a:t>is a portable, extensible, open-source platform for managing containerized workloads and services. It has a large, rapidly growing ecosystem, turning the application widely available</a:t>
-            </a:r>
-            <a:r>
-              <a:rPr lang="en-US" sz="1000" dirty="0" smtClean="0"/>
-              <a:t>.</a:t>
-            </a:r>
-            <a:endParaRPr lang="en-US" sz="1000" dirty="0"/>
-          </a:p>
-        </p:txBody>
-      </p:sp>
-      <p:sp>
-        <p:nvSpPr>
-          <p:cNvPr id="9" name="Text Placeholder 1"/>
-          <p:cNvSpPr>
-            <a:spLocks noGrp="1"/>
-          </p:cNvSpPr>
-          <p:nvPr>
-            <p:ph type="body" sz="quarter" idx="13"/>
-          </p:nvPr>
-        </p:nvSpPr>
-        <p:spPr>
-          <a:xfrm>
-            <a:off x="4648200" y="895350"/>
-            <a:ext cx="4171189" cy="3657600"/>
-          </a:xfrm>
-          <a:ln>
-            <a:noFill/>
-          </a:ln>
-        </p:spPr>
-        <p:txBody>
-          <a:bodyPr/>
-          <a:lstStyle/>
-          <a:p>
-            <a:endParaRPr lang="en-US" b="1" dirty="0" smtClean="0"/>
-          </a:p>
-          <a:p>
-            <a:pPr lvl="0"/>
-            <a:endParaRPr lang="en-US" sz="1000" dirty="0" smtClean="0"/>
-          </a:p>
-          <a:p>
-            <a:pPr lvl="0"/>
-            <a:r>
-              <a:rPr lang="en-US" sz="1000" b="1" dirty="0" smtClean="0"/>
-              <a:t>Angular</a:t>
             </a:r>
             <a:endParaRPr lang="en-US" sz="1000" b="1" dirty="0"/>
           </a:p>
@@ -18040,9 +18396,14 @@
               <a:buChar char="§"/>
             </a:pPr>
             <a:r>
+              <a:rPr lang="en-US" sz="1000" dirty="0" smtClean="0"/>
+              <a:t>It is </a:t>
+            </a:r>
+            <a:r>
               <a:rPr lang="en-US" sz="1000" dirty="0"/>
-              <a:t>It is a modern UI, attends the performance needs</a:t>
-            </a:r>
+              <a:t>a portable, extensible, open-source platform for managing containerized workloads and services. </a:t>
+            </a:r>
+            <a:endParaRPr lang="en-US" sz="1000" dirty="0" smtClean="0"/>
           </a:p>
           <a:p>
             <a:pPr lvl="1">
@@ -18050,19 +18411,57 @@
               <a:buChar char="§"/>
             </a:pPr>
             <a:r>
+              <a:rPr lang="en-US" sz="1000" dirty="0" smtClean="0"/>
+              <a:t>It </a:t>
+            </a:r>
+            <a:r>
               <a:rPr lang="en-US" sz="1000" dirty="0"/>
-              <a:t>Uses Type Script, a typed JavaScript easy to maintain the code</a:t>
-            </a:r>
-          </a:p>
-          <a:p>
+              <a:t>has a large, rapidly growing ecosystem, turning the application widely available</a:t>
+            </a:r>
+            <a:r>
+              <a:rPr lang="en-US" sz="1000" dirty="0" smtClean="0"/>
+              <a:t>.</a:t>
+            </a:r>
             <a:endParaRPr lang="en-US" sz="1000" dirty="0"/>
           </a:p>
+        </p:txBody>
+      </p:sp>
+      <p:sp>
+        <p:nvSpPr>
+          <p:cNvPr id="9" name="Text Placeholder 1"/>
+          <p:cNvSpPr>
+            <a:spLocks noGrp="1"/>
+          </p:cNvSpPr>
+          <p:nvPr>
+            <p:ph type="body" sz="quarter" idx="13"/>
+          </p:nvPr>
+        </p:nvSpPr>
+        <p:spPr>
+          <a:xfrm>
+            <a:off x="4648200" y="819150"/>
+            <a:ext cx="4171189" cy="3733800"/>
+          </a:xfrm>
+          <a:ln>
+            <a:noFill/>
+          </a:ln>
+        </p:spPr>
+        <p:txBody>
+          <a:bodyPr/>
+          <a:lstStyle/>
+          <a:p>
+            <a:endParaRPr lang="en-US" b="1" dirty="0" smtClean="0"/>
+          </a:p>
           <a:p>
             <a:pPr lvl="0"/>
-            <a:r>
-              <a:rPr lang="en-US" sz="1000" b="1" dirty="0"/>
-              <a:t>Microsoft SQL Server Azure</a:t>
-            </a:r>
+            <a:endParaRPr lang="en-US" sz="1000" dirty="0" smtClean="0"/>
+          </a:p>
+          <a:p>
+            <a:pPr lvl="0"/>
+            <a:r>
+              <a:rPr lang="en-US" sz="1000" b="1" dirty="0" smtClean="0"/>
+              <a:t>Angular</a:t>
+            </a:r>
+            <a:endParaRPr lang="en-US" sz="1000" b="1" dirty="0"/>
           </a:p>
           <a:p>
             <a:pPr lvl="1">
@@ -18071,13 +18470,16 @@
             </a:pPr>
             <a:r>
               <a:rPr lang="en-US" sz="1000" dirty="0"/>
-              <a:t>There are many options as Oracle, MySQL, </a:t>
-            </a:r>
-            <a:r>
-              <a:rPr lang="en-US" sz="1000" dirty="0" err="1"/>
-              <a:t>etc</a:t>
-            </a:r>
-            <a:endParaRPr lang="en-US" sz="1000" dirty="0"/>
+              <a:t>It is a modern UI, </a:t>
+            </a:r>
+            <a:r>
+              <a:rPr lang="en-US" sz="1000" dirty="0" smtClean="0"/>
+              <a:t>attending </a:t>
+            </a:r>
+            <a:r>
+              <a:rPr lang="en-US" sz="1000" dirty="0"/>
+              <a:t>the performance needs</a:t>
+            </a:r>
           </a:p>
           <a:p>
             <a:pPr lvl="1">
@@ -18085,23 +18487,18 @@
               <a:buChar char="§"/>
             </a:pPr>
             <a:r>
-              <a:rPr lang="en-US" sz="1000" dirty="0" err="1"/>
-              <a:t>SQLServer</a:t>
-            </a:r>
-            <a:r>
               <a:rPr lang="en-US" sz="1000" dirty="0"/>
-              <a:t> is a Microsoft database on azure and it attends the performance needs</a:t>
-            </a:r>
+              <a:t>Uses Type Script, a typed JavaScript easy to maintain the code</a:t>
+            </a:r>
+          </a:p>
+          <a:p>
+            <a:endParaRPr lang="en-US" sz="1000" dirty="0"/>
           </a:p>
           <a:p>
             <a:pPr lvl="0"/>
-            <a:endParaRPr lang="en-US" sz="1000" dirty="0" smtClean="0"/>
-          </a:p>
-          <a:p>
-            <a:pPr lvl="0"/>
-            <a:r>
-              <a:rPr lang="en-US" sz="1000" b="1" dirty="0" smtClean="0"/>
-              <a:t>Windows Azure</a:t>
+            <a:r>
+              <a:rPr lang="en-US" sz="1000" b="1" dirty="0"/>
+              <a:t>Microsoft SQL Server Azure</a:t>
             </a:r>
           </a:p>
           <a:p>
@@ -18110,13 +18507,22 @@
               <a:buChar char="§"/>
             </a:pPr>
             <a:r>
+              <a:rPr lang="en-US" sz="1000" dirty="0"/>
+              <a:t>There are many options as Oracle, MySQL, </a:t>
+            </a:r>
+            <a:r>
+              <a:rPr lang="en-US" sz="1000" dirty="0" err="1" smtClean="0"/>
+              <a:t>CosmosDB</a:t>
+            </a:r>
+            <a:r>
               <a:rPr lang="en-US" sz="1000" dirty="0" smtClean="0"/>
-              <a:t>There </a:t>
-            </a:r>
-            <a:r>
-              <a:rPr lang="en-US" sz="1000" dirty="0"/>
-              <a:t>are many cloud platforms to choose as AWS, Google Cloud, etc. </a:t>
-            </a:r>
+              <a:t>, </a:t>
+            </a:r>
+            <a:r>
+              <a:rPr lang="en-US" sz="1000" dirty="0" err="1" smtClean="0"/>
+              <a:t>etc</a:t>
+            </a:r>
+            <a:endParaRPr lang="en-US" sz="1000" dirty="0"/>
           </a:p>
           <a:p>
             <a:pPr lvl="1">
@@ -18124,8 +18530,12 @@
               <a:buChar char="§"/>
             </a:pPr>
             <a:r>
+              <a:rPr lang="en-US" sz="1000" dirty="0" err="1"/>
+              <a:t>SQLServer</a:t>
+            </a:r>
+            <a:r>
               <a:rPr lang="en-US" sz="1000" dirty="0"/>
-              <a:t>The cloud environment allows us to manage our resource easy, paying just when It is in use.</a:t>
+              <a:t> is a Microsoft database on azure and it attends the performance needs</a:t>
             </a:r>
           </a:p>
           <a:p>
@@ -18136,11 +18546,7 @@
             <a:pPr lvl="0"/>
             <a:r>
               <a:rPr lang="en-US" sz="1000" b="1" dirty="0" smtClean="0"/>
-              <a:t>Service </a:t>
-            </a:r>
-            <a:r>
-              <a:rPr lang="en-US" sz="1000" b="1" dirty="0"/>
-              <a:t>BUS Azure</a:t>
+              <a:t>Windows Azure</a:t>
             </a:r>
           </a:p>
           <a:p>
@@ -18149,18 +18555,12 @@
               <a:buChar char="§"/>
             </a:pPr>
             <a:r>
+              <a:rPr lang="en-US" sz="1000" dirty="0" smtClean="0"/>
+              <a:t>There </a:t>
+            </a:r>
+            <a:r>
               <a:rPr lang="en-US" sz="1000" dirty="0"/>
-              <a:t>There is an excellent management of dead letters and panel</a:t>
-            </a:r>
-          </a:p>
-          <a:p>
-            <a:pPr lvl="1" algn="just">
-              <a:buFont typeface="Wingdings" panose="05000000000000000000" pitchFamily="2" charset="2"/>
-              <a:buChar char="§"/>
-            </a:pPr>
-            <a:r>
-              <a:rPr lang="en-US" sz="1000" dirty="0"/>
-              <a:t>It is a queue to communicate between the domains</a:t>
+              <a:t>are many cloud platforms to choose as AWS, Google Cloud, etc. </a:t>
             </a:r>
           </a:p>
           <a:p>
@@ -18170,7 +18570,30 @@
             </a:pPr>
             <a:r>
               <a:rPr lang="en-US" sz="1000" dirty="0"/>
-              <a:t>Maintain each domain isolated</a:t>
+              <a:t>The cloud environment allows us to manage our resource easy, paying just when </a:t>
+            </a:r>
+            <a:r>
+              <a:rPr lang="en-US" sz="1000" dirty="0" smtClean="0"/>
+              <a:t>it </a:t>
+            </a:r>
+            <a:r>
+              <a:rPr lang="en-US" sz="1000" dirty="0"/>
+              <a:t>is in use.</a:t>
+            </a:r>
+          </a:p>
+          <a:p>
+            <a:pPr lvl="0"/>
+            <a:endParaRPr lang="en-US" sz="1000" dirty="0" smtClean="0"/>
+          </a:p>
+          <a:p>
+            <a:pPr lvl="0"/>
+            <a:r>
+              <a:rPr lang="en-US" sz="1000" b="1" dirty="0" smtClean="0"/>
+              <a:t>Microsoft Service </a:t>
+            </a:r>
+            <a:r>
+              <a:rPr lang="en-US" sz="1000" b="1" dirty="0"/>
+              <a:t>BUS Azure</a:t>
             </a:r>
           </a:p>
           <a:p>
@@ -18180,11 +18603,77 @@
             </a:pPr>
             <a:r>
               <a:rPr lang="en-US" sz="1000" dirty="0"/>
-              <a:t>Guarantee that the micro-services down, it will wait to process the information </a:t>
+              <a:t>It is a </a:t>
             </a:r>
             <a:r>
               <a:rPr lang="en-US" sz="1000" dirty="0" smtClean="0"/>
-              <a:t>later</a:t>
+              <a:t>choice of queue </a:t>
+            </a:r>
+            <a:r>
+              <a:rPr lang="en-US" sz="1000" dirty="0"/>
+              <a:t>to communicate between the </a:t>
+            </a:r>
+            <a:r>
+              <a:rPr lang="en-US" sz="1000" dirty="0" smtClean="0"/>
+              <a:t>domains</a:t>
+            </a:r>
+          </a:p>
+          <a:p>
+            <a:pPr lvl="1">
+              <a:buFont typeface="Wingdings" panose="05000000000000000000" pitchFamily="2" charset="2"/>
+              <a:buChar char="§"/>
+            </a:pPr>
+            <a:r>
+              <a:rPr lang="en-US" sz="1000" dirty="0" smtClean="0"/>
+              <a:t>There </a:t>
+            </a:r>
+            <a:r>
+              <a:rPr lang="en-US" sz="1000" dirty="0"/>
+              <a:t>is an excellent management </a:t>
+            </a:r>
+            <a:r>
+              <a:rPr lang="en-US" sz="1000" dirty="0" smtClean="0"/>
+              <a:t>panel and full control of “dead letters“</a:t>
+            </a:r>
+          </a:p>
+          <a:p>
+            <a:pPr lvl="1">
+              <a:buFont typeface="Wingdings" panose="05000000000000000000" pitchFamily="2" charset="2"/>
+              <a:buChar char="§"/>
+            </a:pPr>
+            <a:r>
+              <a:rPr lang="en-US" sz="1000" dirty="0" smtClean="0"/>
+              <a:t>Maintain </a:t>
+            </a:r>
+            <a:r>
+              <a:rPr lang="en-US" sz="1000" dirty="0"/>
+              <a:t>each domain isolated</a:t>
+            </a:r>
+          </a:p>
+          <a:p>
+            <a:pPr lvl="1">
+              <a:buFont typeface="Wingdings" panose="05000000000000000000" pitchFamily="2" charset="2"/>
+              <a:buChar char="§"/>
+            </a:pPr>
+            <a:r>
+              <a:rPr lang="en-US" sz="1000" dirty="0" smtClean="0"/>
+              <a:t>It Guarantees </a:t>
+            </a:r>
+            <a:r>
+              <a:rPr lang="en-US" sz="1000" dirty="0"/>
+              <a:t>that </a:t>
+            </a:r>
+            <a:r>
+              <a:rPr lang="en-US" sz="1000" dirty="0" smtClean="0"/>
+              <a:t>if one micro-services is </a:t>
+            </a:r>
+            <a:r>
+              <a:rPr lang="en-US" sz="1000" dirty="0"/>
+              <a:t>down, it will </a:t>
+            </a:r>
+            <a:r>
+              <a:rPr lang="en-US" sz="1000" dirty="0" smtClean="0"/>
+              <a:t>maintain the information to be processed later</a:t>
             </a:r>
           </a:p>
           <a:p>
@@ -18417,25 +18906,11 @@
             </a:pPr>
             <a:r>
               <a:rPr lang="en-US" dirty="0"/>
-              <a:t>It is a group of techniques to make your code near from the business language, broken it in specific domains, making possible to identify boundaries and </a:t>
+              <a:t>It is a </a:t>
             </a:r>
             <a:r>
               <a:rPr lang="en-US" dirty="0" smtClean="0"/>
-              <a:t>micro-services</a:t>
-            </a:r>
-          </a:p>
-          <a:p>
-            <a:endParaRPr lang="en-US" dirty="0"/>
-          </a:p>
-          <a:p>
-            <a:pPr lvl="0"/>
-            <a:r>
-              <a:rPr lang="en-US" b="1" dirty="0" smtClean="0"/>
-              <a:t> Domain </a:t>
-            </a:r>
-            <a:r>
-              <a:rPr lang="en-US" b="1" dirty="0"/>
-              <a:t>Events</a:t>
+              <a:t>concept that the structure and language of software code should match the business domain</a:t>
             </a:r>
           </a:p>
           <a:p>
@@ -18444,26 +18919,38 @@
               <a:buChar char="ü"/>
             </a:pPr>
             <a:r>
+              <a:rPr lang="en-US" dirty="0" smtClean="0"/>
+              <a:t>Being close for business language, it turns easier to separate some appointments in </a:t>
+            </a:r>
+            <a:r>
               <a:rPr lang="en-US" dirty="0"/>
-              <a:t>Some action will have a reaction to do something related from </a:t>
+              <a:t>specific domains, making </a:t>
             </a:r>
             <a:r>
               <a:rPr lang="en-US" dirty="0" smtClean="0"/>
-              <a:t>it</a:t>
-            </a:r>
-          </a:p>
-          <a:p>
-            <a:endParaRPr lang="en-US" dirty="0" smtClean="0"/>
+              <a:t>it possible </a:t>
+            </a:r>
+            <a:r>
+              <a:rPr lang="en-US" dirty="0"/>
+              <a:t>to identify boundaries and </a:t>
+            </a:r>
+            <a:r>
+              <a:rPr lang="en-US" dirty="0" smtClean="0"/>
+              <a:t>micro-services</a:t>
+            </a:r>
+          </a:p>
+          <a:p>
+            <a:endParaRPr lang="en-US" dirty="0"/>
           </a:p>
           <a:p>
             <a:pPr lvl="0"/>
             <a:r>
               <a:rPr lang="en-US" b="1" dirty="0" smtClean="0"/>
-              <a:t> Test Driven Development (TDD</a:t>
+              <a:t> Domain </a:t>
             </a:r>
             <a:r>
               <a:rPr lang="en-US" b="1" dirty="0"/>
-              <a:t>)</a:t>
+              <a:t>Events</a:t>
             </a:r>
           </a:p>
           <a:p>
@@ -18473,22 +18960,53 @@
             </a:pPr>
             <a:r>
               <a:rPr lang="en-US" dirty="0" smtClean="0"/>
-              <a:t>Guarantee the application test coverage before developing a new feature</a:t>
-            </a:r>
-            <a:endParaRPr lang="en-US" dirty="0"/>
-          </a:p>
-          <a:p>
-            <a:endParaRPr lang="en-US" dirty="0"/>
+              <a:t>Some domain actions </a:t>
+            </a:r>
+            <a:r>
+              <a:rPr lang="en-US" dirty="0"/>
+              <a:t>will </a:t>
+            </a:r>
+            <a:r>
+              <a:rPr lang="en-US" dirty="0" smtClean="0"/>
+              <a:t>start a chain of </a:t>
+            </a:r>
+            <a:r>
+              <a:rPr lang="en-US" dirty="0"/>
+              <a:t>reaction </a:t>
+            </a:r>
+            <a:r>
+              <a:rPr lang="en-US" dirty="0" smtClean="0"/>
+              <a:t>asynchronously to </a:t>
+            </a:r>
+            <a:r>
+              <a:rPr lang="en-US" dirty="0"/>
+              <a:t>do </a:t>
+            </a:r>
+            <a:r>
+              <a:rPr lang="en-US" dirty="0" smtClean="0"/>
+              <a:t>something related </a:t>
+            </a:r>
+            <a:r>
+              <a:rPr lang="en-US" dirty="0"/>
+              <a:t>from </a:t>
+            </a:r>
+            <a:r>
+              <a:rPr lang="en-US" dirty="0" smtClean="0"/>
+              <a:t>it</a:t>
+            </a:r>
+          </a:p>
+          <a:p>
+            <a:endParaRPr lang="en-US" dirty="0" smtClean="0"/>
           </a:p>
           <a:p>
             <a:pPr lvl="0"/>
             <a:r>
               <a:rPr lang="en-US" b="1" dirty="0" smtClean="0"/>
-              <a:t> Azure Service Bus </a:t>
+              <a:t> Test Driven Development (TDD</a:t>
             </a:r>
             <a:r>
               <a:rPr lang="en-US" b="1" dirty="0"/>
-              <a:t>as queue</a:t>
+              <a:t>)</a:t>
             </a:r>
           </a:p>
           <a:p>
@@ -18497,8 +19015,23 @@
               <a:buChar char="ü"/>
             </a:pPr>
             <a:r>
-              <a:rPr lang="en-US" dirty="0"/>
-              <a:t>In case of unavailable service, the queue will guarantee the communication, keeping the micro-services working independently </a:t>
+              <a:rPr lang="en-US" dirty="0" smtClean="0"/>
+              <a:t>It Guarantees the application test coverage before and during a developing of a new feature</a:t>
+            </a:r>
+            <a:endParaRPr lang="en-US" dirty="0"/>
+          </a:p>
+          <a:p>
+            <a:endParaRPr lang="en-US" dirty="0"/>
+          </a:p>
+          <a:p>
+            <a:pPr lvl="0"/>
+            <a:r>
+              <a:rPr lang="en-US" b="1" dirty="0" smtClean="0"/>
+              <a:t> Azure Service Bus </a:t>
+            </a:r>
+            <a:r>
+              <a:rPr lang="en-US" b="1" dirty="0"/>
+              <a:t>as queue</a:t>
             </a:r>
           </a:p>
           <a:p>
@@ -18508,11 +19041,45 @@
             </a:pPr>
             <a:r>
               <a:rPr lang="en-US" dirty="0"/>
-              <a:t>The Azure Service Bus has a dead letter and retry schemas in case of exception on service before Pop</a:t>
+              <a:t>In case of unavailable service, the queue will guarantee the </a:t>
             </a:r>
             <a:r>
               <a:rPr lang="en-US" dirty="0" smtClean="0"/>
-              <a:t>.</a:t>
+              <a:t>communication between the services, </a:t>
+            </a:r>
+            <a:r>
+              <a:rPr lang="en-US" dirty="0"/>
+              <a:t>keeping </a:t>
+            </a:r>
+            <a:r>
+              <a:rPr lang="en-US" dirty="0" smtClean="0"/>
+              <a:t>each </a:t>
+            </a:r>
+            <a:r>
+              <a:rPr lang="en-US" dirty="0"/>
+              <a:t>micro-services working independently </a:t>
+            </a:r>
+          </a:p>
+          <a:p>
+            <a:pPr marL="171450" indent="-171450">
+              <a:buFont typeface="Wingdings" panose="05000000000000000000" pitchFamily="2" charset="2"/>
+              <a:buChar char="ü"/>
+            </a:pPr>
+            <a:r>
+              <a:rPr lang="en-US" dirty="0"/>
+              <a:t>The Azure Service Bus has </a:t>
+            </a:r>
+            <a:r>
+              <a:rPr lang="en-US" dirty="0" smtClean="0"/>
+              <a:t>a great “dead letter” retry schema </a:t>
+            </a:r>
+            <a:r>
+              <a:rPr lang="en-US" dirty="0"/>
+              <a:t>in case of </a:t>
+            </a:r>
+            <a:r>
+              <a:rPr lang="en-US" dirty="0" smtClean="0"/>
+              <a:t>application exception or instability</a:t>
             </a:r>
           </a:p>
           <a:p>
@@ -18539,12 +19106,8 @@
               <a:buChar char="ü"/>
             </a:pPr>
             <a:r>
-              <a:rPr lang="en-US" dirty="0"/>
-              <a:t>In this case will be executed in time to </a:t>
-            </a:r>
-            <a:r>
               <a:rPr lang="en-US" dirty="0" smtClean="0"/>
-              <a:t>time using CRON expression</a:t>
+              <a:t>Using it the job cans be constantly executed using CRON expression on cloud</a:t>
             </a:r>
             <a:endParaRPr lang="en-US" dirty="0"/>
           </a:p>
@@ -18728,7 +19291,7 @@
           <a:p>
             <a:r>
               <a:rPr lang="en-US" b="1" dirty="0"/>
-              <a:t>What is the main </a:t>
+              <a:t>What is the </a:t>
             </a:r>
             <a:r>
               <a:rPr lang="en-US" b="1" dirty="0" smtClean="0"/>
@@ -18776,7 +19339,23 @@
             </a:pPr>
             <a:r>
               <a:rPr lang="en-US" sz="1200" dirty="0"/>
-              <a:t>Easy to scale to support an elevate web traffic and data</a:t>
+              <a:t>Easy to </a:t>
+            </a:r>
+            <a:r>
+              <a:rPr lang="en-US" sz="1200" dirty="0" smtClean="0"/>
+              <a:t>scale the application </a:t>
+            </a:r>
+            <a:r>
+              <a:rPr lang="en-US" sz="1200" dirty="0"/>
+              <a:t>to </a:t>
+            </a:r>
+            <a:r>
+              <a:rPr lang="en-US" sz="1200" dirty="0" smtClean="0"/>
+              <a:t>support </a:t>
+            </a:r>
+            <a:r>
+              <a:rPr lang="en-US" sz="1200" dirty="0"/>
+              <a:t>elevate web traffic and data</a:t>
             </a:r>
           </a:p>
           <a:p>
@@ -18789,7 +19368,15 @@
             </a:pPr>
             <a:r>
               <a:rPr lang="en-US" sz="1200" dirty="0"/>
-              <a:t>Easier to increase new features on code</a:t>
+              <a:t>Easier to increase new </a:t>
+            </a:r>
+            <a:r>
+              <a:rPr lang="en-US" sz="1200" dirty="0" smtClean="0"/>
+              <a:t>features and fix bugs </a:t>
+            </a:r>
+            <a:r>
+              <a:rPr lang="en-US" sz="1200" dirty="0"/>
+              <a:t>on code</a:t>
             </a:r>
           </a:p>
           <a:p>
@@ -18827,8 +19414,12 @@
               <a:buChar char="§"/>
             </a:pPr>
             <a:r>
+              <a:rPr lang="en-US" sz="1200" dirty="0" smtClean="0"/>
+              <a:t>Lower and controlled costs </a:t>
+            </a:r>
+            <a:r>
               <a:rPr lang="en-US" sz="1200" dirty="0"/>
-              <a:t>Lower cost using the pay-per-use on </a:t>
+              <a:t>using the pay-per-use on </a:t>
             </a:r>
             <a:r>
               <a:rPr lang="en-US" sz="1200" dirty="0" smtClean="0"/>
@@ -19069,8 +19660,13 @@
             </a:pPr>
             <a:r>
               <a:rPr lang="en-US" sz="1200" dirty="0"/>
-              <a:t>Each domain will work independently</a:t>
-            </a:r>
+              <a:t>Each domain will work </a:t>
+            </a:r>
+            <a:r>
+              <a:rPr lang="en-US" sz="1200" dirty="0" smtClean="0"/>
+              <a:t>independently inside containers</a:t>
+            </a:r>
+            <a:endParaRPr lang="en-US" sz="1200" dirty="0"/>
           </a:p>
           <a:p>
             <a:pPr marL="171450" lvl="0" indent="-171450">
@@ -19082,13 +19678,8 @@
             </a:pPr>
             <a:r>
               <a:rPr lang="en-US" sz="1200" dirty="0"/>
-              <a:t>The relation between the domains will be the queue, working asynchronous as well its </a:t>
-            </a:r>
-            <a:r>
-              <a:rPr lang="en-US" sz="1200" dirty="0" smtClean="0"/>
-              <a:t>invokes</a:t>
-            </a:r>
-            <a:endParaRPr lang="en-US" sz="1200" dirty="0"/>
+              <a:t>The relationship between the domains is the queue, working asynchronously when it is invoked</a:t>
+            </a:r>
           </a:p>
         </p:txBody>
       </p:sp>
@@ -19134,7 +19725,31 @@
             </a:r>
             <a:r>
               <a:rPr lang="en-US" dirty="0"/>
-              <a:t>identified domain will become micro-services making possible to scale it on the cloud</a:t>
+              <a:t>identified </a:t>
+            </a:r>
+            <a:r>
+              <a:rPr lang="en-US" dirty="0" smtClean="0"/>
+              <a:t>domains </a:t>
+            </a:r>
+            <a:r>
+              <a:rPr lang="en-US" dirty="0"/>
+              <a:t>will become </a:t>
+            </a:r>
+            <a:r>
+              <a:rPr lang="en-US" dirty="0" smtClean="0"/>
+              <a:t>micro-services, </a:t>
+            </a:r>
+            <a:r>
+              <a:rPr lang="en-US" dirty="0"/>
+              <a:t>making </a:t>
+            </a:r>
+            <a:r>
+              <a:rPr lang="en-US" dirty="0" smtClean="0"/>
+              <a:t>it possible to be scaled on </a:t>
+            </a:r>
+            <a:r>
+              <a:rPr lang="en-US" dirty="0"/>
+              <a:t>the cloud</a:t>
             </a:r>
           </a:p>
           <a:p>
@@ -19173,7 +19788,7 @@
           <a:p>
             <a:pPr marL="171450" lvl="0" indent="-171450">
               <a:spcBef>
-                <a:spcPts val="1200"/>
+                <a:spcPts val="600"/>
               </a:spcBef>
               <a:buFont typeface="Wingdings" panose="05000000000000000000" pitchFamily="2" charset="2"/>
               <a:buChar char="§"/>
@@ -19186,7 +19801,7 @@
           <a:p>
             <a:pPr marL="171450" lvl="0" indent="-171450">
               <a:spcBef>
-                <a:spcPts val="1200"/>
+                <a:spcPts val="600"/>
               </a:spcBef>
               <a:buFont typeface="Wingdings" panose="05000000000000000000" pitchFamily="2" charset="2"/>
               <a:buChar char="§"/>
@@ -19329,7 +19944,6 @@
               <a:rPr lang="fr-FR" dirty="0"/>
               <a:t> Solution</a:t>
             </a:r>
-            <a:endParaRPr lang="fr-FR" dirty="0"/>
           </a:p>
         </p:txBody>
       </p:sp>
@@ -19620,7 +20234,7 @@
           <a:lstStyle/>
           <a:p>
             <a:r>
-              <a:rPr lang="fr-FR"/>
+              <a:rPr lang="fr-FR" dirty="0"/>
               <a:t>Date</a:t>
             </a:r>
           </a:p>
@@ -19642,7 +20256,7 @@
           <a:lstStyle/>
           <a:p>
             <a:r>
-              <a:rPr lang="en-US"/>
+              <a:rPr lang="en-US" dirty="0"/>
               <a:t>Presentation title</a:t>
             </a:r>
             <a:endParaRPr lang="fr-FR" dirty="0"/>
@@ -19715,19 +20329,15 @@
           <a:p>
             <a:r>
               <a:rPr lang="fr-FR" dirty="0" err="1" smtClean="0"/>
-              <a:t>Turnning</a:t>
+              <a:t>Making</a:t>
             </a:r>
             <a:r>
               <a:rPr lang="fr-FR" dirty="0" smtClean="0"/>
               <a:t> a </a:t>
             </a:r>
             <a:r>
-              <a:rPr lang="fr-FR" dirty="0" err="1"/>
-              <a:t>S</a:t>
-            </a:r>
-            <a:r>
-              <a:rPr lang="fr-FR" dirty="0" err="1" smtClean="0"/>
-              <a:t>cable</a:t>
+              <a:rPr lang="en-US" dirty="0" smtClean="0"/>
+              <a:t>Scalable</a:t>
             </a:r>
             <a:r>
               <a:rPr lang="fr-FR" dirty="0" smtClean="0"/>
@@ -19738,18 +20348,18 @@
           <a:p>
             <a:pPr lvl="1"/>
             <a:r>
-              <a:rPr lang="fr-FR" dirty="0" smtClean="0"/>
+              <a:rPr lang="fr-FR" i="1" dirty="0" smtClean="0"/>
               <a:t>Scooter </a:t>
             </a:r>
             <a:r>
-              <a:rPr lang="fr-FR" dirty="0" err="1" smtClean="0"/>
+              <a:rPr lang="fr-FR" i="1" dirty="0" err="1" smtClean="0"/>
               <a:t>Rental</a:t>
             </a:r>
             <a:r>
-              <a:rPr lang="fr-FR" dirty="0" smtClean="0"/>
-              <a:t> Case</a:t>
-            </a:r>
-            <a:endParaRPr lang="fr-FR" dirty="0"/>
+              <a:rPr lang="fr-FR" i="1" dirty="0" smtClean="0"/>
+              <a:t> – Business Case</a:t>
+            </a:r>
+            <a:endParaRPr lang="fr-FR" i="1" dirty="0"/>
           </a:p>
         </p:txBody>
       </p:sp>
@@ -19883,7 +20493,6 @@
               <a:rPr lang="fr-FR" dirty="0"/>
               <a:t> Solution</a:t>
             </a:r>
-            <a:endParaRPr lang="fr-FR" dirty="0"/>
           </a:p>
         </p:txBody>
       </p:sp>
@@ -20289,12 +20898,8 @@
           <a:lstStyle/>
           <a:p>
             <a:r>
-              <a:rPr lang="fr-FR" dirty="0"/>
-              <a:t>4</a:t>
-            </a:r>
-            <a:r>
               <a:rPr lang="fr-FR" dirty="0" smtClean="0"/>
-              <a:t>.</a:t>
+              <a:t>4.</a:t>
             </a:r>
             <a:endParaRPr lang="fr-FR" dirty="0"/>
           </a:p>
@@ -20386,15 +20991,20 @@
           <a:p>
             <a:r>
               <a:rPr lang="fr-FR" dirty="0"/>
-              <a:t>Proof of Concepts</a:t>
-            </a:r>
+              <a:t>Scalability </a:t>
+            </a:r>
+            <a:r>
+              <a:rPr lang="fr-FR" dirty="0" err="1"/>
+              <a:t>strategy</a:t>
+            </a:r>
+            <a:endParaRPr lang="fr-FR" dirty="0"/>
           </a:p>
         </p:txBody>
       </p:sp>
     </p:spTree>
     <p:extLst>
       <p:ext uri="{BB962C8B-B14F-4D97-AF65-F5344CB8AC3E}">
-        <p14:creationId xmlns:p14="http://schemas.microsoft.com/office/powerpoint/2010/main" val="4169145694"/>
+        <p14:creationId xmlns:p14="http://schemas.microsoft.com/office/powerpoint/2010/main" val="3116050496"/>
       </p:ext>
     </p:extLst>
   </p:cSld>
@@ -20445,7 +21055,7 @@
           <a:p>
             <a:r>
               <a:rPr lang="it-IT" dirty="0" smtClean="0"/>
-              <a:t>Proof of Concepts</a:t>
+              <a:t>Container Structure History</a:t>
             </a:r>
             <a:endParaRPr lang="fr-FR" dirty="0"/>
           </a:p>
@@ -20489,8 +21099,12 @@
           <a:lstStyle/>
           <a:p>
             <a:r>
-              <a:rPr lang="fr-FR" dirty="0" smtClean="0"/>
-              <a:t>The Challenge – Proof of Concepts</a:t>
+              <a:rPr lang="fr-FR" dirty="0"/>
+              <a:t>Scalability </a:t>
+            </a:r>
+            <a:r>
+              <a:rPr lang="fr-FR" dirty="0" err="1"/>
+              <a:t>strategy</a:t>
             </a:r>
             <a:endParaRPr lang="fr-FR" dirty="0"/>
           </a:p>
@@ -20522,7 +21136,7 @@
       </p:sp>
       <p:sp>
         <p:nvSpPr>
-          <p:cNvPr id="2" name="Text Placeholder 1"/>
+          <p:cNvPr id="14" name="Text Placeholder 1"/>
           <p:cNvSpPr>
             <a:spLocks noGrp="1"/>
           </p:cNvSpPr>
@@ -20532,8 +21146,8 @@
         </p:nvSpPr>
         <p:spPr>
           <a:xfrm>
-            <a:off x="322019" y="1112077"/>
-            <a:ext cx="8273341" cy="251805"/>
+            <a:off x="215522" y="4324350"/>
+            <a:ext cx="8463207" cy="228600"/>
           </a:xfrm>
           <a:ln>
             <a:noFill/>
@@ -20543,125 +21157,46 @@
           <a:bodyPr/>
           <a:lstStyle/>
           <a:p>
-            <a:r>
-              <a:rPr lang="en-US" b="1" dirty="0" smtClean="0"/>
-              <a:t>Source code and documentation:</a:t>
-            </a:r>
-            <a:endParaRPr lang="en-US" b="1" dirty="0"/>
-          </a:p>
-          <a:p>
-            <a:endParaRPr lang="en-US" dirty="0" smtClean="0"/>
-          </a:p>
-          <a:p>
-            <a:endParaRPr lang="en-US" dirty="0" smtClean="0"/>
-          </a:p>
-        </p:txBody>
-      </p:sp>
-      <p:sp>
-        <p:nvSpPr>
-          <p:cNvPr id="8" name="Text Placeholder 1"/>
-          <p:cNvSpPr>
-            <a:spLocks noGrp="1"/>
-          </p:cNvSpPr>
-          <p:nvPr>
-            <p:ph type="body" sz="quarter" idx="13"/>
-          </p:nvPr>
-        </p:nvSpPr>
-        <p:spPr>
-          <a:xfrm>
-            <a:off x="322019" y="1830065"/>
-            <a:ext cx="8463207" cy="1122685"/>
-          </a:xfrm>
-          <a:ln>
-            <a:noFill/>
-          </a:ln>
-        </p:spPr>
-        <p:txBody>
-          <a:bodyPr/>
-          <a:lstStyle/>
-          <a:p>
-            <a:r>
-              <a:rPr lang="en-US" b="1" dirty="0"/>
-              <a:t>Proposal</a:t>
-            </a:r>
-          </a:p>
-          <a:p>
-            <a:r>
-              <a:rPr lang="en-US" u="sng" dirty="0">
-                <a:hlinkClick r:id="rId2"/>
-              </a:rPr>
-              <a:t>https://github.com/andreraica/ScooterRental</a:t>
-            </a:r>
-            <a:endParaRPr lang="en-US" dirty="0"/>
-          </a:p>
-          <a:p>
-            <a:r>
-              <a:rPr lang="en-US" dirty="0"/>
-              <a:t> </a:t>
-            </a:r>
-          </a:p>
-          <a:p>
-            <a:r>
-              <a:rPr lang="en-US" b="1" dirty="0"/>
-              <a:t>Legacy</a:t>
-            </a:r>
-          </a:p>
-          <a:p>
-            <a:r>
-              <a:rPr lang="en-US" u="sng" dirty="0">
-                <a:hlinkClick r:id="rId3"/>
-              </a:rPr>
-              <a:t>https://github.com/andreraica/ScooterRental/tree/master/legacy</a:t>
-            </a:r>
-            <a:endParaRPr lang="en-US" dirty="0"/>
+            <a:pPr lvl="0" algn="r">
+              <a:spcBef>
+                <a:spcPts val="600"/>
+              </a:spcBef>
+            </a:pPr>
+            <a:r>
+              <a:rPr lang="en-US" sz="900" dirty="0"/>
+              <a:t>https://kubernetes.io/docs/concepts/overview/what-is-kubernetes/</a:t>
+            </a:r>
           </a:p>
         </p:txBody>
       </p:sp>
       <p:pic>
         <p:nvPicPr>
-          <p:cNvPr id="7170" name="Picture 2" descr="GitHub Logos and Usage · GitHub"/>
+          <p:cNvPr id="18" name="Picture 17"/>
           <p:cNvPicPr>
-            <a:picLocks noChangeAspect="1" noChangeArrowheads="1"/>
+            <a:picLocks noChangeAspect="1"/>
           </p:cNvPicPr>
           <p:nvPr/>
         </p:nvPicPr>
         <p:blipFill>
-          <a:blip r:embed="rId4" cstate="print">
-            <a:extLst>
-              <a:ext uri="{28A0092B-C50C-407E-A947-70E740481C1C}">
-                <a14:useLocalDpi xmlns:a14="http://schemas.microsoft.com/office/drawing/2010/main" val="0"/>
-              </a:ext>
-            </a:extLst>
-          </a:blip>
-          <a:srcRect/>
+          <a:blip r:embed="rId2"/>
           <a:stretch>
             <a:fillRect/>
           </a:stretch>
         </p:blipFill>
-        <p:spPr bwMode="auto">
-          <a:xfrm>
-            <a:off x="6477000" y="1017426"/>
-            <a:ext cx="1935324" cy="1935324"/>
+        <p:spPr>
+          <a:xfrm>
+            <a:off x="510421" y="1123950"/>
+            <a:ext cx="7776449" cy="2824163"/>
           </a:xfrm>
           <a:prstGeom prst="rect">
             <a:avLst/>
           </a:prstGeom>
-          <a:noFill/>
-          <a:extLst>
-            <a:ext uri="{909E8E84-426E-40DD-AFC4-6F175D3DCCD1}">
-              <a14:hiddenFill xmlns:a14="http://schemas.microsoft.com/office/drawing/2010/main">
-                <a:solidFill>
-                  <a:srgbClr val="FFFFFF"/>
-                </a:solidFill>
-              </a14:hiddenFill>
-            </a:ext>
-          </a:extLst>
         </p:spPr>
       </p:pic>
     </p:spTree>
     <p:extLst>
       <p:ext uri="{BB962C8B-B14F-4D97-AF65-F5344CB8AC3E}">
-        <p14:creationId xmlns:p14="http://schemas.microsoft.com/office/powerpoint/2010/main" val="1082275313"/>
+        <p14:creationId xmlns:p14="http://schemas.microsoft.com/office/powerpoint/2010/main" val="1252438390"/>
       </p:ext>
     </p:extLst>
   </p:cSld>
@@ -20697,7 +21232,7 @@
       </p:grpSpPr>
       <p:sp>
         <p:nvSpPr>
-          <p:cNvPr id="24" name="Titre 23"/>
+          <p:cNvPr id="7" name="Titre 6"/>
           <p:cNvSpPr>
             <a:spLocks noGrp="1"/>
           </p:cNvSpPr>
@@ -20705,14 +21240,68 @@
             <p:ph type="title"/>
           </p:nvPr>
         </p:nvSpPr>
+        <p:spPr>
+          <a:xfrm>
+            <a:off x="358776" y="438663"/>
+            <a:ext cx="8426450" cy="372908"/>
+          </a:xfrm>
+        </p:spPr>
+        <p:txBody>
+          <a:bodyPr/>
+          <a:lstStyle/>
+          <a:p>
+            <a:r>
+              <a:rPr lang="it-IT" dirty="0" smtClean="0"/>
+              <a:t>Kubernetes Cluster</a:t>
+            </a:r>
+            <a:endParaRPr lang="fr-FR" dirty="0"/>
+          </a:p>
+        </p:txBody>
+      </p:sp>
+      <p:sp>
+        <p:nvSpPr>
+          <p:cNvPr id="3" name="Espace réservé de la date 2"/>
+          <p:cNvSpPr>
+            <a:spLocks noGrp="1"/>
+          </p:cNvSpPr>
+          <p:nvPr>
+            <p:ph type="dt" sz="half" idx="10"/>
+          </p:nvPr>
+        </p:nvSpPr>
         <p:spPr/>
         <p:txBody>
           <a:bodyPr/>
           <a:lstStyle/>
           <a:p>
             <a:r>
-              <a:rPr lang="fr-FR" dirty="0" smtClean="0"/>
-              <a:t>5.</a:t>
+              <a:rPr lang="fr-FR"/>
+              <a:t>Date</a:t>
+            </a:r>
+          </a:p>
+        </p:txBody>
+      </p:sp>
+      <p:sp>
+        <p:nvSpPr>
+          <p:cNvPr id="4" name="Espace réservé du pied de page 3"/>
+          <p:cNvSpPr>
+            <a:spLocks noGrp="1"/>
+          </p:cNvSpPr>
+          <p:nvPr>
+            <p:ph type="ftr" sz="quarter" idx="11"/>
+          </p:nvPr>
+        </p:nvSpPr>
+        <p:spPr/>
+        <p:txBody>
+          <a:bodyPr/>
+          <a:lstStyle/>
+          <a:p>
+            <a:r>
+              <a:rPr lang="fr-FR" dirty="0"/>
+              <a:t>Scalability </a:t>
+            </a:r>
+            <a:r>
+              <a:rPr lang="fr-FR" dirty="0" err="1"/>
+              <a:t>strategy</a:t>
             </a:r>
             <a:endParaRPr lang="fr-FR" dirty="0"/>
           </a:p>
@@ -20720,12 +21309,12 @@
       </p:sp>
       <p:sp>
         <p:nvSpPr>
-          <p:cNvPr id="2" name="Espace réservé de la date 1"/>
-          <p:cNvSpPr>
-            <a:spLocks noGrp="1"/>
-          </p:cNvSpPr>
-          <p:nvPr>
-            <p:ph type="dt" sz="half" idx="10"/>
+          <p:cNvPr id="5" name="Espace réservé du numéro de diapositive 4"/>
+          <p:cNvSpPr>
+            <a:spLocks noGrp="1"/>
+          </p:cNvSpPr>
+          <p:nvPr>
+            <p:ph type="sldNum" sz="quarter" idx="12"/>
           </p:nvPr>
         </p:nvSpPr>
         <p:spPr/>
@@ -20733,63 +21322,18 @@
           <a:bodyPr/>
           <a:lstStyle/>
           <a:p>
-            <a:r>
-              <a:rPr lang="fr-FR" noProof="0"/>
-              <a:t>Date</a:t>
-            </a:r>
-          </a:p>
-        </p:txBody>
-      </p:sp>
-      <p:sp>
-        <p:nvSpPr>
-          <p:cNvPr id="4" name="Espace réservé du pied de page 3"/>
-          <p:cNvSpPr>
-            <a:spLocks noGrp="1"/>
-          </p:cNvSpPr>
-          <p:nvPr>
-            <p:ph type="ftr" sz="quarter" idx="11"/>
-          </p:nvPr>
-        </p:nvSpPr>
-        <p:spPr/>
-        <p:txBody>
-          <a:bodyPr/>
-          <a:lstStyle/>
-          <a:p>
-            <a:r>
-              <a:rPr lang="en-US" noProof="0"/>
-              <a:t>Presentation title</a:t>
-            </a:r>
-            <a:endParaRPr lang="fr-FR" noProof="0"/>
-          </a:p>
-        </p:txBody>
-      </p:sp>
-      <p:sp>
-        <p:nvSpPr>
-          <p:cNvPr id="3" name="Espace réservé du numéro de diapositive 2"/>
-          <p:cNvSpPr>
-            <a:spLocks noGrp="1"/>
-          </p:cNvSpPr>
-          <p:nvPr>
-            <p:ph type="sldNum" sz="quarter" idx="12"/>
-          </p:nvPr>
-        </p:nvSpPr>
-        <p:spPr/>
-        <p:txBody>
-          <a:bodyPr/>
-          <a:lstStyle/>
-          <a:p>
-            <a:fld id="{733122C9-A0B9-462F-8757-0847AD287B63}" type="slidenum">
-              <a:rPr lang="fr-FR" noProof="0" smtClean="0"/>
+            <a:fld id="{10C140CD-8AED-46FF-A9A2-77308F3F39AE}" type="slidenum">
+              <a:rPr lang="fr-FR" smtClean="0"/>
               <a:pPr/>
               <a:t>23</a:t>
             </a:fld>
-            <a:endParaRPr lang="fr-FR" noProof="0"/>
-          </a:p>
-        </p:txBody>
-      </p:sp>
-      <p:sp>
-        <p:nvSpPr>
-          <p:cNvPr id="25" name="Espace réservé du texte 24"/>
+            <a:endParaRPr lang="fr-FR" dirty="0"/>
+          </a:p>
+        </p:txBody>
+      </p:sp>
+      <p:sp>
+        <p:nvSpPr>
+          <p:cNvPr id="14" name="Text Placeholder 1"/>
           <p:cNvSpPr>
             <a:spLocks noGrp="1"/>
           </p:cNvSpPr>
@@ -20797,23 +21341,59 @@
             <p:ph type="body" sz="quarter" idx="13"/>
           </p:nvPr>
         </p:nvSpPr>
-        <p:spPr/>
+        <p:spPr>
+          <a:xfrm>
+            <a:off x="215522" y="4324350"/>
+            <a:ext cx="8463207" cy="228600"/>
+          </a:xfrm>
+          <a:ln>
+            <a:noFill/>
+          </a:ln>
+        </p:spPr>
         <p:txBody>
           <a:bodyPr/>
           <a:lstStyle/>
           <a:p>
-            <a:r>
-              <a:rPr lang="it-IT" dirty="0"/>
-              <a:t>Appreciation</a:t>
-            </a:r>
-            <a:endParaRPr lang="fr-FR" dirty="0"/>
-          </a:p>
-        </p:txBody>
-      </p:sp>
+            <a:pPr lvl="0" algn="r">
+              <a:spcBef>
+                <a:spcPts val="600"/>
+              </a:spcBef>
+            </a:pPr>
+            <a:r>
+              <a:rPr lang="en-US" sz="900" dirty="0"/>
+              <a:t>https://kubernetes.io/docs/concepts/overview/what-is-kubernetes/</a:t>
+            </a:r>
+          </a:p>
+        </p:txBody>
+      </p:sp>
+      <p:pic>
+        <p:nvPicPr>
+          <p:cNvPr id="2" name="Picture 1"/>
+          <p:cNvPicPr>
+            <a:picLocks noChangeAspect="1"/>
+          </p:cNvPicPr>
+          <p:nvPr/>
+        </p:nvPicPr>
+        <p:blipFill>
+          <a:blip r:embed="rId2"/>
+          <a:stretch>
+            <a:fillRect/>
+          </a:stretch>
+        </p:blipFill>
+        <p:spPr>
+          <a:xfrm>
+            <a:off x="990600" y="811571"/>
+            <a:ext cx="7046104" cy="3287243"/>
+          </a:xfrm>
+          <a:prstGeom prst="rect">
+            <a:avLst/>
+          </a:prstGeom>
+        </p:spPr>
+      </p:pic>
     </p:spTree>
     <p:extLst>
       <p:ext uri="{BB962C8B-B14F-4D97-AF65-F5344CB8AC3E}">
-        <p14:creationId xmlns:p14="http://schemas.microsoft.com/office/powerpoint/2010/main" val="774974030"/>
+        <p14:creationId xmlns:p14="http://schemas.microsoft.com/office/powerpoint/2010/main" val="592138919"/>
       </p:ext>
     </p:extLst>
   </p:cSld>
@@ -20833,6 +21413,14 @@
 <file path=ppt/slides/slide24.xml><?xml version="1.0" encoding="utf-8"?>
 <p:sld xmlns:a="http://schemas.openxmlformats.org/drawingml/2006/main" xmlns:r="http://schemas.openxmlformats.org/officeDocument/2006/relationships" xmlns:p="http://schemas.openxmlformats.org/presentationml/2006/main">
   <p:cSld>
+    <p:bg>
+      <p:bgPr>
+        <a:solidFill>
+          <a:srgbClr val="071A28"/>
+        </a:solidFill>
+        <a:effectLst/>
+      </p:bgPr>
+    </p:bg>
     <p:spTree>
       <p:nvGrpSpPr>
         <p:cNvPr id="1" name=""/>
@@ -20857,14 +21445,19 @@
             <p:ph type="title"/>
           </p:nvPr>
         </p:nvSpPr>
-        <p:spPr/>
+        <p:spPr>
+          <a:xfrm>
+            <a:off x="358776" y="438663"/>
+            <a:ext cx="8426450" cy="532887"/>
+          </a:xfrm>
+        </p:spPr>
         <p:txBody>
           <a:bodyPr/>
           <a:lstStyle/>
           <a:p>
             <a:r>
-              <a:rPr lang="fr-FR" dirty="0" err="1" smtClean="0"/>
-              <a:t>Appreciation</a:t>
+              <a:rPr lang="it-IT" dirty="0" smtClean="0"/>
+              <a:t>How to Run and Scale it?</a:t>
             </a:r>
             <a:endParaRPr lang="fr-FR" dirty="0"/>
           </a:p>
@@ -20908,10 +21501,26 @@
           <a:lstStyle/>
           <a:p>
             <a:r>
-              <a:rPr lang="en-US"/>
-              <a:t>Presentation title</a:t>
-            </a:r>
-            <a:endParaRPr lang="fr-FR" dirty="0"/>
+              <a:rPr lang="fr-FR" dirty="0">
+                <a:solidFill>
+                  <a:schemeClr val="bg1"/>
+                </a:solidFill>
+              </a:rPr>
+              <a:t>Scalability </a:t>
+            </a:r>
+            <a:r>
+              <a:rPr lang="fr-FR" dirty="0" err="1">
+                <a:solidFill>
+                  <a:schemeClr val="bg1"/>
+                </a:solidFill>
+              </a:rPr>
+              <a:t>strategy</a:t>
+            </a:r>
+            <a:endParaRPr lang="fr-FR" dirty="0">
+              <a:solidFill>
+                <a:schemeClr val="bg1"/>
+              </a:solidFill>
+            </a:endParaRPr>
           </a:p>
         </p:txBody>
       </p:sp>
@@ -20931,17 +21540,25 @@
           <a:lstStyle/>
           <a:p>
             <a:fld id="{10C140CD-8AED-46FF-A9A2-77308F3F39AE}" type="slidenum">
-              <a:rPr lang="fr-FR" smtClean="0"/>
+              <a:rPr lang="fr-FR" smtClean="0">
+                <a:solidFill>
+                  <a:schemeClr val="bg1"/>
+                </a:solidFill>
+              </a:rPr>
               <a:pPr/>
               <a:t>24</a:t>
             </a:fld>
-            <a:endParaRPr lang="fr-FR" dirty="0"/>
-          </a:p>
-        </p:txBody>
-      </p:sp>
-      <p:sp>
-        <p:nvSpPr>
-          <p:cNvPr id="9" name="Espace réservé du texte 8"/>
+            <a:endParaRPr lang="fr-FR" dirty="0">
+              <a:solidFill>
+                <a:schemeClr val="bg1"/>
+              </a:solidFill>
+            </a:endParaRPr>
+          </a:p>
+        </p:txBody>
+      </p:sp>
+      <p:sp>
+        <p:nvSpPr>
+          <p:cNvPr id="14" name="Text Placeholder 1"/>
           <p:cNvSpPr>
             <a:spLocks noGrp="1"/>
           </p:cNvSpPr>
@@ -20951,115 +21568,82 @@
         </p:nvSpPr>
         <p:spPr>
           <a:xfrm>
-            <a:off x="339852" y="1047751"/>
-            <a:ext cx="8346947" cy="2362200"/>
-          </a:xfrm>
+            <a:off x="215522" y="4324350"/>
+            <a:ext cx="8463207" cy="228600"/>
+          </a:xfrm>
+          <a:ln>
+            <a:noFill/>
+          </a:ln>
         </p:spPr>
         <p:txBody>
           <a:bodyPr/>
           <a:lstStyle/>
           <a:p>
-            <a:r>
-              <a:rPr lang="fr-FR" dirty="0" err="1" smtClean="0"/>
-              <a:t>Thank</a:t>
-            </a:r>
-            <a:r>
-              <a:rPr lang="fr-FR" dirty="0" smtClean="0"/>
-              <a:t> </a:t>
-            </a:r>
-            <a:r>
-              <a:rPr lang="fr-FR" dirty="0" err="1" smtClean="0"/>
-              <a:t>you</a:t>
-            </a:r>
-            <a:r>
-              <a:rPr lang="fr-FR" dirty="0" smtClean="0"/>
-              <a:t> for the </a:t>
-            </a:r>
-            <a:r>
-              <a:rPr lang="fr-FR" dirty="0" err="1" smtClean="0"/>
-              <a:t>pacient</a:t>
-            </a:r>
-            <a:r>
-              <a:rPr lang="fr-FR" dirty="0" smtClean="0"/>
-              <a:t> and the support </a:t>
-            </a:r>
-            <a:r>
-              <a:rPr lang="fr-FR" dirty="0" err="1" smtClean="0"/>
-              <a:t>from</a:t>
-            </a:r>
-            <a:r>
-              <a:rPr lang="fr-FR" dirty="0" smtClean="0"/>
-              <a:t> all Altran team</a:t>
-            </a:r>
-            <a:endParaRPr lang="fr-FR" dirty="0"/>
-          </a:p>
-          <a:p>
-            <a:endParaRPr lang="fr-FR" dirty="0" smtClean="0"/>
-          </a:p>
-          <a:p>
-            <a:r>
-              <a:rPr lang="fr-FR" dirty="0" err="1" smtClean="0"/>
-              <a:t>Special</a:t>
-            </a:r>
-            <a:r>
-              <a:rPr lang="fr-FR" dirty="0" smtClean="0"/>
-              <a:t> </a:t>
-            </a:r>
-            <a:r>
-              <a:rPr lang="fr-FR" dirty="0" err="1" smtClean="0"/>
-              <a:t>Thanks</a:t>
-            </a:r>
-            <a:endParaRPr lang="fr-FR" dirty="0" smtClean="0"/>
-          </a:p>
-          <a:p>
-            <a:endParaRPr lang="fr-FR" dirty="0" smtClean="0"/>
-          </a:p>
-          <a:p>
-            <a:pPr marL="171450" indent="-171450">
-              <a:buFont typeface="Wingdings" panose="05000000000000000000" pitchFamily="2" charset="2"/>
-              <a:buChar char="Ø"/>
+            <a:pPr lvl="0" algn="r">
+              <a:spcBef>
+                <a:spcPts val="600"/>
+              </a:spcBef>
             </a:pPr>
             <a:r>
-              <a:rPr lang="fr-FR" dirty="0" smtClean="0"/>
-              <a:t>Luis Rocha</a:t>
-            </a:r>
-          </a:p>
-          <a:p>
-            <a:pPr marL="171450" indent="-171450">
-              <a:buFont typeface="Wingdings" panose="05000000000000000000" pitchFamily="2" charset="2"/>
-              <a:buChar char="Ø"/>
-            </a:pPr>
-            <a:r>
-              <a:rPr lang="fr-FR" dirty="0" smtClean="0"/>
-              <a:t>Henrique </a:t>
-            </a:r>
-            <a:r>
-              <a:rPr lang="fr-FR" dirty="0" err="1" smtClean="0"/>
-              <a:t>Miraldo</a:t>
-            </a:r>
-            <a:endParaRPr lang="fr-FR" dirty="0" smtClean="0"/>
-          </a:p>
-          <a:p>
-            <a:pPr marL="171450" indent="-171450">
-              <a:buFont typeface="Wingdings" panose="05000000000000000000" pitchFamily="2" charset="2"/>
-              <a:buChar char="Ø"/>
-            </a:pPr>
-            <a:r>
-              <a:rPr lang="fr-FR" dirty="0" smtClean="0"/>
-              <a:t>Carlos </a:t>
-            </a:r>
-            <a:r>
-              <a:rPr lang="fr-FR" dirty="0" err="1" smtClean="0"/>
-              <a:t>Valente</a:t>
-            </a:r>
-            <a:endParaRPr lang="fr-FR" dirty="0"/>
-          </a:p>
-        </p:txBody>
-      </p:sp>
+              <a:rPr lang="en-US" sz="1000" dirty="0" err="1" smtClean="0"/>
+              <a:t>KodeKloud</a:t>
+            </a:r>
+            <a:endParaRPr lang="en-US" sz="1000" dirty="0"/>
+          </a:p>
+        </p:txBody>
+      </p:sp>
+      <p:pic>
+        <p:nvPicPr>
+          <p:cNvPr id="6" name="Picture 5"/>
+          <p:cNvPicPr>
+            <a:picLocks noChangeAspect="1"/>
+          </p:cNvPicPr>
+          <p:nvPr/>
+        </p:nvPicPr>
+        <p:blipFill>
+          <a:blip r:embed="rId2"/>
+          <a:stretch>
+            <a:fillRect/>
+          </a:stretch>
+        </p:blipFill>
+        <p:spPr>
+          <a:xfrm>
+            <a:off x="540901" y="1047750"/>
+            <a:ext cx="3429000" cy="2819399"/>
+          </a:xfrm>
+          <a:prstGeom prst="rect">
+            <a:avLst/>
+          </a:prstGeom>
+        </p:spPr>
+      </p:pic>
+      <p:pic>
+        <p:nvPicPr>
+          <p:cNvPr id="8" name="Picture 7"/>
+          <p:cNvPicPr>
+            <a:picLocks noChangeAspect="1"/>
+          </p:cNvPicPr>
+          <p:nvPr/>
+        </p:nvPicPr>
+        <p:blipFill>
+          <a:blip r:embed="rId3"/>
+          <a:stretch>
+            <a:fillRect/>
+          </a:stretch>
+        </p:blipFill>
+        <p:spPr>
+          <a:xfrm>
+            <a:off x="4220588" y="1073931"/>
+            <a:ext cx="4648200" cy="2847757"/>
+          </a:xfrm>
+          <a:prstGeom prst="rect">
+            <a:avLst/>
+          </a:prstGeom>
+        </p:spPr>
+      </p:pic>
     </p:spTree>
     <p:extLst>
       <p:ext uri="{BB962C8B-B14F-4D97-AF65-F5344CB8AC3E}">
-        <p14:creationId xmlns:p14="http://schemas.microsoft.com/office/powerpoint/2010/main" val="3488472030"/>
+        <p14:creationId xmlns:p14="http://schemas.microsoft.com/office/powerpoint/2010/main" val="2358713653"/>
       </p:ext>
     </p:extLst>
   </p:cSld>
@@ -21095,6 +21679,33 @@
       </p:grpSpPr>
       <p:sp>
         <p:nvSpPr>
+          <p:cNvPr id="24" name="Titre 23"/>
+          <p:cNvSpPr>
+            <a:spLocks noGrp="1"/>
+          </p:cNvSpPr>
+          <p:nvPr>
+            <p:ph type="title"/>
+          </p:nvPr>
+        </p:nvSpPr>
+        <p:spPr/>
+        <p:txBody>
+          <a:bodyPr/>
+          <a:lstStyle/>
+          <a:p>
+            <a:r>
+              <a:rPr lang="fr-FR" dirty="0"/>
+              <a:t>5</a:t>
+            </a:r>
+            <a:r>
+              <a:rPr lang="fr-FR" dirty="0" smtClean="0"/>
+              <a:t>.</a:t>
+            </a:r>
+            <a:endParaRPr lang="fr-FR" dirty="0"/>
+          </a:p>
+        </p:txBody>
+      </p:sp>
+      <p:sp>
+        <p:nvSpPr>
           <p:cNvPr id="2" name="Espace réservé de la date 1"/>
           <p:cNvSpPr>
             <a:spLocks noGrp="1"/>
@@ -21157,6 +21768,893 @@
               <a:rPr lang="fr-FR" noProof="0" smtClean="0"/>
               <a:pPr/>
               <a:t>25</a:t>
+            </a:fld>
+            <a:endParaRPr lang="fr-FR" noProof="0"/>
+          </a:p>
+        </p:txBody>
+      </p:sp>
+      <p:sp>
+        <p:nvSpPr>
+          <p:cNvPr id="25" name="Espace réservé du texte 24"/>
+          <p:cNvSpPr>
+            <a:spLocks noGrp="1"/>
+          </p:cNvSpPr>
+          <p:nvPr>
+            <p:ph type="body" sz="quarter" idx="13"/>
+          </p:nvPr>
+        </p:nvSpPr>
+        <p:spPr/>
+        <p:txBody>
+          <a:bodyPr/>
+          <a:lstStyle/>
+          <a:p>
+            <a:r>
+              <a:rPr lang="fr-FR" dirty="0"/>
+              <a:t>Proof of Concepts</a:t>
+            </a:r>
+          </a:p>
+        </p:txBody>
+      </p:sp>
+    </p:spTree>
+    <p:extLst>
+      <p:ext uri="{BB962C8B-B14F-4D97-AF65-F5344CB8AC3E}">
+        <p14:creationId xmlns:p14="http://schemas.microsoft.com/office/powerpoint/2010/main" val="4169145694"/>
+      </p:ext>
+    </p:extLst>
+  </p:cSld>
+  <p:clrMapOvr>
+    <a:masterClrMapping/>
+  </p:clrMapOvr>
+  <p:timing>
+    <p:tnLst>
+      <p:par>
+        <p:cTn id="1" dur="indefinite" restart="never" nodeType="tmRoot"/>
+      </p:par>
+    </p:tnLst>
+  </p:timing>
+</p:sld>
+</file>
+
+<file path=ppt/slides/slide26.xml><?xml version="1.0" encoding="utf-8"?>
+<p:sld xmlns:a="http://schemas.openxmlformats.org/drawingml/2006/main" xmlns:r="http://schemas.openxmlformats.org/officeDocument/2006/relationships" xmlns:p="http://schemas.openxmlformats.org/presentationml/2006/main">
+  <p:cSld>
+    <p:spTree>
+      <p:nvGrpSpPr>
+        <p:cNvPr id="1" name=""/>
+        <p:cNvGrpSpPr/>
+        <p:nvPr/>
+      </p:nvGrpSpPr>
+      <p:grpSpPr>
+        <a:xfrm>
+          <a:off x="0" y="0"/>
+          <a:ext cx="0" cy="0"/>
+          <a:chOff x="0" y="0"/>
+          <a:chExt cx="0" cy="0"/>
+        </a:xfrm>
+      </p:grpSpPr>
+      <p:sp>
+        <p:nvSpPr>
+          <p:cNvPr id="7" name="Titre 6"/>
+          <p:cNvSpPr>
+            <a:spLocks noGrp="1"/>
+          </p:cNvSpPr>
+          <p:nvPr>
+            <p:ph type="title"/>
+          </p:nvPr>
+        </p:nvSpPr>
+        <p:spPr/>
+        <p:txBody>
+          <a:bodyPr/>
+          <a:lstStyle/>
+          <a:p>
+            <a:r>
+              <a:rPr lang="it-IT" dirty="0" smtClean="0"/>
+              <a:t>Proof of Concepts</a:t>
+            </a:r>
+            <a:endParaRPr lang="fr-FR" dirty="0"/>
+          </a:p>
+        </p:txBody>
+      </p:sp>
+      <p:sp>
+        <p:nvSpPr>
+          <p:cNvPr id="3" name="Espace réservé de la date 2"/>
+          <p:cNvSpPr>
+            <a:spLocks noGrp="1"/>
+          </p:cNvSpPr>
+          <p:nvPr>
+            <p:ph type="dt" sz="half" idx="10"/>
+          </p:nvPr>
+        </p:nvSpPr>
+        <p:spPr/>
+        <p:txBody>
+          <a:bodyPr/>
+          <a:lstStyle/>
+          <a:p>
+            <a:r>
+              <a:rPr lang="fr-FR"/>
+              <a:t>Date</a:t>
+            </a:r>
+          </a:p>
+        </p:txBody>
+      </p:sp>
+      <p:sp>
+        <p:nvSpPr>
+          <p:cNvPr id="4" name="Espace réservé du pied de page 3"/>
+          <p:cNvSpPr>
+            <a:spLocks noGrp="1"/>
+          </p:cNvSpPr>
+          <p:nvPr>
+            <p:ph type="ftr" sz="quarter" idx="11"/>
+          </p:nvPr>
+        </p:nvSpPr>
+        <p:spPr/>
+        <p:txBody>
+          <a:bodyPr/>
+          <a:lstStyle/>
+          <a:p>
+            <a:r>
+              <a:rPr lang="fr-FR" dirty="0" smtClean="0"/>
+              <a:t>The Challenge – Proof of Concepts</a:t>
+            </a:r>
+            <a:endParaRPr lang="fr-FR" dirty="0"/>
+          </a:p>
+        </p:txBody>
+      </p:sp>
+      <p:sp>
+        <p:nvSpPr>
+          <p:cNvPr id="5" name="Espace réservé du numéro de diapositive 4"/>
+          <p:cNvSpPr>
+            <a:spLocks noGrp="1"/>
+          </p:cNvSpPr>
+          <p:nvPr>
+            <p:ph type="sldNum" sz="quarter" idx="12"/>
+          </p:nvPr>
+        </p:nvSpPr>
+        <p:spPr/>
+        <p:txBody>
+          <a:bodyPr/>
+          <a:lstStyle/>
+          <a:p>
+            <a:fld id="{10C140CD-8AED-46FF-A9A2-77308F3F39AE}" type="slidenum">
+              <a:rPr lang="fr-FR" smtClean="0"/>
+              <a:pPr/>
+              <a:t>26</a:t>
+            </a:fld>
+            <a:endParaRPr lang="fr-FR" dirty="0"/>
+          </a:p>
+        </p:txBody>
+      </p:sp>
+      <p:sp>
+        <p:nvSpPr>
+          <p:cNvPr id="2" name="Text Placeholder 1"/>
+          <p:cNvSpPr>
+            <a:spLocks noGrp="1"/>
+          </p:cNvSpPr>
+          <p:nvPr>
+            <p:ph type="body" sz="quarter" idx="13"/>
+          </p:nvPr>
+        </p:nvSpPr>
+        <p:spPr>
+          <a:xfrm>
+            <a:off x="322019" y="1112077"/>
+            <a:ext cx="4935781" cy="316673"/>
+          </a:xfrm>
+          <a:ln>
+            <a:noFill/>
+          </a:ln>
+        </p:spPr>
+        <p:txBody>
+          <a:bodyPr/>
+          <a:lstStyle/>
+          <a:p>
+            <a:r>
+              <a:rPr lang="en-US" b="1" dirty="0" smtClean="0"/>
+              <a:t>Community Source code and documentation:</a:t>
+            </a:r>
+            <a:endParaRPr lang="en-US" b="1" dirty="0"/>
+          </a:p>
+          <a:p>
+            <a:endParaRPr lang="en-US" dirty="0" smtClean="0"/>
+          </a:p>
+          <a:p>
+            <a:endParaRPr lang="en-US" dirty="0" smtClean="0"/>
+          </a:p>
+        </p:txBody>
+      </p:sp>
+      <p:sp>
+        <p:nvSpPr>
+          <p:cNvPr id="8" name="Text Placeholder 1"/>
+          <p:cNvSpPr>
+            <a:spLocks noGrp="1"/>
+          </p:cNvSpPr>
+          <p:nvPr>
+            <p:ph type="body" sz="quarter" idx="13"/>
+          </p:nvPr>
+        </p:nvSpPr>
+        <p:spPr>
+          <a:xfrm>
+            <a:off x="322019" y="1830065"/>
+            <a:ext cx="8463207" cy="1122685"/>
+          </a:xfrm>
+          <a:ln>
+            <a:noFill/>
+          </a:ln>
+        </p:spPr>
+        <p:txBody>
+          <a:bodyPr/>
+          <a:lstStyle/>
+          <a:p>
+            <a:r>
+              <a:rPr lang="en-US" b="1" dirty="0"/>
+              <a:t>Proposal</a:t>
+            </a:r>
+          </a:p>
+          <a:p>
+            <a:r>
+              <a:rPr lang="en-US" u="sng" dirty="0">
+                <a:hlinkClick r:id="rId2"/>
+              </a:rPr>
+              <a:t>https://github.com/andreraica/ScooterRental</a:t>
+            </a:r>
+            <a:endParaRPr lang="en-US" dirty="0"/>
+          </a:p>
+          <a:p>
+            <a:r>
+              <a:rPr lang="en-US" dirty="0"/>
+              <a:t> </a:t>
+            </a:r>
+          </a:p>
+          <a:p>
+            <a:r>
+              <a:rPr lang="en-US" b="1" dirty="0"/>
+              <a:t>Legacy</a:t>
+            </a:r>
+          </a:p>
+          <a:p>
+            <a:r>
+              <a:rPr lang="en-US" u="sng" dirty="0">
+                <a:hlinkClick r:id="rId3"/>
+              </a:rPr>
+              <a:t>https://github.com/andreraica/ScooterRental/tree/master/legacy</a:t>
+            </a:r>
+            <a:endParaRPr lang="en-US" dirty="0"/>
+          </a:p>
+        </p:txBody>
+      </p:sp>
+      <p:pic>
+        <p:nvPicPr>
+          <p:cNvPr id="7170" name="Picture 2" descr="GitHub Logos and Usage · GitHub"/>
+          <p:cNvPicPr>
+            <a:picLocks noChangeAspect="1" noChangeArrowheads="1"/>
+          </p:cNvPicPr>
+          <p:nvPr/>
+        </p:nvPicPr>
+        <p:blipFill>
+          <a:blip r:embed="rId4" cstate="print">
+            <a:extLst>
+              <a:ext uri="{28A0092B-C50C-407E-A947-70E740481C1C}">
+                <a14:useLocalDpi xmlns:a14="http://schemas.microsoft.com/office/drawing/2010/main" val="0"/>
+              </a:ext>
+            </a:extLst>
+          </a:blip>
+          <a:srcRect/>
+          <a:stretch>
+            <a:fillRect/>
+          </a:stretch>
+        </p:blipFill>
+        <p:spPr bwMode="auto">
+          <a:xfrm>
+            <a:off x="6477000" y="1017426"/>
+            <a:ext cx="1935324" cy="1935324"/>
+          </a:xfrm>
+          <a:prstGeom prst="rect">
+            <a:avLst/>
+          </a:prstGeom>
+          <a:noFill/>
+          <a:extLst>
+            <a:ext uri="{909E8E84-426E-40DD-AFC4-6F175D3DCCD1}">
+              <a14:hiddenFill xmlns:a14="http://schemas.microsoft.com/office/drawing/2010/main">
+                <a:solidFill>
+                  <a:srgbClr val="FFFFFF"/>
+                </a:solidFill>
+              </a14:hiddenFill>
+            </a:ext>
+          </a:extLst>
+        </p:spPr>
+      </p:pic>
+    </p:spTree>
+    <p:extLst>
+      <p:ext uri="{BB962C8B-B14F-4D97-AF65-F5344CB8AC3E}">
+        <p14:creationId xmlns:p14="http://schemas.microsoft.com/office/powerpoint/2010/main" val="1082275313"/>
+      </p:ext>
+    </p:extLst>
+  </p:cSld>
+  <p:clrMapOvr>
+    <a:masterClrMapping/>
+  </p:clrMapOvr>
+  <p:timing>
+    <p:tnLst>
+      <p:par>
+        <p:cTn id="1" dur="indefinite" restart="never" nodeType="tmRoot"/>
+      </p:par>
+    </p:tnLst>
+  </p:timing>
+</p:sld>
+</file>
+
+<file path=ppt/slides/slide27.xml><?xml version="1.0" encoding="utf-8"?>
+<p:sld xmlns:a="http://schemas.openxmlformats.org/drawingml/2006/main" xmlns:r="http://schemas.openxmlformats.org/officeDocument/2006/relationships" xmlns:p="http://schemas.openxmlformats.org/presentationml/2006/main">
+  <p:cSld>
+    <p:spTree>
+      <p:nvGrpSpPr>
+        <p:cNvPr id="1" name=""/>
+        <p:cNvGrpSpPr/>
+        <p:nvPr/>
+      </p:nvGrpSpPr>
+      <p:grpSpPr>
+        <a:xfrm>
+          <a:off x="0" y="0"/>
+          <a:ext cx="0" cy="0"/>
+          <a:chOff x="0" y="0"/>
+          <a:chExt cx="0" cy="0"/>
+        </a:xfrm>
+      </p:grpSpPr>
+      <p:sp>
+        <p:nvSpPr>
+          <p:cNvPr id="24" name="Titre 23"/>
+          <p:cNvSpPr>
+            <a:spLocks noGrp="1"/>
+          </p:cNvSpPr>
+          <p:nvPr>
+            <p:ph type="title"/>
+          </p:nvPr>
+        </p:nvSpPr>
+        <p:spPr/>
+        <p:txBody>
+          <a:bodyPr/>
+          <a:lstStyle/>
+          <a:p>
+            <a:r>
+              <a:rPr lang="fr-FR" dirty="0"/>
+              <a:t>6</a:t>
+            </a:r>
+            <a:r>
+              <a:rPr lang="fr-FR" dirty="0" smtClean="0"/>
+              <a:t>.</a:t>
+            </a:r>
+            <a:endParaRPr lang="fr-FR" dirty="0"/>
+          </a:p>
+        </p:txBody>
+      </p:sp>
+      <p:sp>
+        <p:nvSpPr>
+          <p:cNvPr id="2" name="Espace réservé de la date 1"/>
+          <p:cNvSpPr>
+            <a:spLocks noGrp="1"/>
+          </p:cNvSpPr>
+          <p:nvPr>
+            <p:ph type="dt" sz="half" idx="10"/>
+          </p:nvPr>
+        </p:nvSpPr>
+        <p:spPr/>
+        <p:txBody>
+          <a:bodyPr/>
+          <a:lstStyle/>
+          <a:p>
+            <a:r>
+              <a:rPr lang="fr-FR" noProof="0"/>
+              <a:t>Date</a:t>
+            </a:r>
+          </a:p>
+        </p:txBody>
+      </p:sp>
+      <p:sp>
+        <p:nvSpPr>
+          <p:cNvPr id="4" name="Espace réservé du pied de page 3"/>
+          <p:cNvSpPr>
+            <a:spLocks noGrp="1"/>
+          </p:cNvSpPr>
+          <p:nvPr>
+            <p:ph type="ftr" sz="quarter" idx="11"/>
+          </p:nvPr>
+        </p:nvSpPr>
+        <p:spPr/>
+        <p:txBody>
+          <a:bodyPr/>
+          <a:lstStyle/>
+          <a:p>
+            <a:r>
+              <a:rPr lang="en-US" noProof="0"/>
+              <a:t>Presentation title</a:t>
+            </a:r>
+            <a:endParaRPr lang="fr-FR" noProof="0"/>
+          </a:p>
+        </p:txBody>
+      </p:sp>
+      <p:sp>
+        <p:nvSpPr>
+          <p:cNvPr id="3" name="Espace réservé du numéro de diapositive 2"/>
+          <p:cNvSpPr>
+            <a:spLocks noGrp="1"/>
+          </p:cNvSpPr>
+          <p:nvPr>
+            <p:ph type="sldNum" sz="quarter" idx="12"/>
+          </p:nvPr>
+        </p:nvSpPr>
+        <p:spPr/>
+        <p:txBody>
+          <a:bodyPr/>
+          <a:lstStyle/>
+          <a:p>
+            <a:fld id="{733122C9-A0B9-462F-8757-0847AD287B63}" type="slidenum">
+              <a:rPr lang="fr-FR" noProof="0" smtClean="0"/>
+              <a:pPr/>
+              <a:t>27</a:t>
+            </a:fld>
+            <a:endParaRPr lang="fr-FR" noProof="0"/>
+          </a:p>
+        </p:txBody>
+      </p:sp>
+      <p:sp>
+        <p:nvSpPr>
+          <p:cNvPr id="25" name="Espace réservé du texte 24"/>
+          <p:cNvSpPr>
+            <a:spLocks noGrp="1"/>
+          </p:cNvSpPr>
+          <p:nvPr>
+            <p:ph type="body" sz="quarter" idx="13"/>
+          </p:nvPr>
+        </p:nvSpPr>
+        <p:spPr/>
+        <p:txBody>
+          <a:bodyPr/>
+          <a:lstStyle/>
+          <a:p>
+            <a:r>
+              <a:rPr lang="it-IT" dirty="0"/>
+              <a:t>Appreciation</a:t>
+            </a:r>
+            <a:endParaRPr lang="fr-FR" dirty="0"/>
+          </a:p>
+        </p:txBody>
+      </p:sp>
+    </p:spTree>
+    <p:extLst>
+      <p:ext uri="{BB962C8B-B14F-4D97-AF65-F5344CB8AC3E}">
+        <p14:creationId xmlns:p14="http://schemas.microsoft.com/office/powerpoint/2010/main" val="774974030"/>
+      </p:ext>
+    </p:extLst>
+  </p:cSld>
+  <p:clrMapOvr>
+    <a:masterClrMapping/>
+  </p:clrMapOvr>
+  <p:timing>
+    <p:tnLst>
+      <p:par>
+        <p:cTn id="1" dur="indefinite" restart="never" nodeType="tmRoot"/>
+      </p:par>
+    </p:tnLst>
+  </p:timing>
+</p:sld>
+</file>
+
+<file path=ppt/slides/slide28.xml><?xml version="1.0" encoding="utf-8"?>
+<p:sld xmlns:a="http://schemas.openxmlformats.org/drawingml/2006/main" xmlns:r="http://schemas.openxmlformats.org/officeDocument/2006/relationships" xmlns:p="http://schemas.openxmlformats.org/presentationml/2006/main">
+  <p:cSld>
+    <p:spTree>
+      <p:nvGrpSpPr>
+        <p:cNvPr id="1" name=""/>
+        <p:cNvGrpSpPr/>
+        <p:nvPr/>
+      </p:nvGrpSpPr>
+      <p:grpSpPr>
+        <a:xfrm>
+          <a:off x="0" y="0"/>
+          <a:ext cx="0" cy="0"/>
+          <a:chOff x="0" y="0"/>
+          <a:chExt cx="0" cy="0"/>
+        </a:xfrm>
+      </p:grpSpPr>
+      <p:sp>
+        <p:nvSpPr>
+          <p:cNvPr id="7" name="Titre 6"/>
+          <p:cNvSpPr>
+            <a:spLocks noGrp="1"/>
+          </p:cNvSpPr>
+          <p:nvPr>
+            <p:ph type="title"/>
+          </p:nvPr>
+        </p:nvSpPr>
+        <p:spPr/>
+        <p:txBody>
+          <a:bodyPr/>
+          <a:lstStyle/>
+          <a:p>
+            <a:r>
+              <a:rPr lang="fr-FR" dirty="0" err="1" smtClean="0"/>
+              <a:t>Appreciation</a:t>
+            </a:r>
+            <a:endParaRPr lang="fr-FR" dirty="0"/>
+          </a:p>
+        </p:txBody>
+      </p:sp>
+      <p:sp>
+        <p:nvSpPr>
+          <p:cNvPr id="3" name="Espace réservé de la date 2"/>
+          <p:cNvSpPr>
+            <a:spLocks noGrp="1"/>
+          </p:cNvSpPr>
+          <p:nvPr>
+            <p:ph type="dt" sz="half" idx="10"/>
+          </p:nvPr>
+        </p:nvSpPr>
+        <p:spPr/>
+        <p:txBody>
+          <a:bodyPr/>
+          <a:lstStyle/>
+          <a:p>
+            <a:r>
+              <a:rPr lang="fr-FR"/>
+              <a:t>Date</a:t>
+            </a:r>
+          </a:p>
+        </p:txBody>
+      </p:sp>
+      <p:sp>
+        <p:nvSpPr>
+          <p:cNvPr id="4" name="Espace réservé du pied de page 3"/>
+          <p:cNvSpPr>
+            <a:spLocks noGrp="1"/>
+          </p:cNvSpPr>
+          <p:nvPr>
+            <p:ph type="ftr" sz="quarter" idx="11"/>
+          </p:nvPr>
+        </p:nvSpPr>
+        <p:spPr/>
+        <p:txBody>
+          <a:bodyPr/>
+          <a:lstStyle/>
+          <a:p>
+            <a:r>
+              <a:rPr lang="en-US"/>
+              <a:t>Presentation title</a:t>
+            </a:r>
+            <a:endParaRPr lang="fr-FR" dirty="0"/>
+          </a:p>
+        </p:txBody>
+      </p:sp>
+      <p:sp>
+        <p:nvSpPr>
+          <p:cNvPr id="5" name="Espace réservé du numéro de diapositive 4"/>
+          <p:cNvSpPr>
+            <a:spLocks noGrp="1"/>
+          </p:cNvSpPr>
+          <p:nvPr>
+            <p:ph type="sldNum" sz="quarter" idx="12"/>
+          </p:nvPr>
+        </p:nvSpPr>
+        <p:spPr/>
+        <p:txBody>
+          <a:bodyPr/>
+          <a:lstStyle/>
+          <a:p>
+            <a:fld id="{10C140CD-8AED-46FF-A9A2-77308F3F39AE}" type="slidenum">
+              <a:rPr lang="fr-FR" smtClean="0"/>
+              <a:pPr/>
+              <a:t>28</a:t>
+            </a:fld>
+            <a:endParaRPr lang="fr-FR" dirty="0"/>
+          </a:p>
+        </p:txBody>
+      </p:sp>
+      <p:sp>
+        <p:nvSpPr>
+          <p:cNvPr id="9" name="Espace réservé du texte 8"/>
+          <p:cNvSpPr>
+            <a:spLocks noGrp="1"/>
+          </p:cNvSpPr>
+          <p:nvPr>
+            <p:ph type="body" sz="quarter" idx="13"/>
+          </p:nvPr>
+        </p:nvSpPr>
+        <p:spPr>
+          <a:xfrm>
+            <a:off x="339852" y="1047751"/>
+            <a:ext cx="8346947" cy="2362200"/>
+          </a:xfrm>
+        </p:spPr>
+        <p:txBody>
+          <a:bodyPr/>
+          <a:lstStyle/>
+          <a:p>
+            <a:r>
+              <a:rPr lang="fr-FR" dirty="0" err="1" smtClean="0"/>
+              <a:t>Thank</a:t>
+            </a:r>
+            <a:r>
+              <a:rPr lang="fr-FR" dirty="0" smtClean="0"/>
+              <a:t> </a:t>
+            </a:r>
+            <a:r>
+              <a:rPr lang="fr-FR" dirty="0" err="1" smtClean="0"/>
+              <a:t>you</a:t>
+            </a:r>
+            <a:r>
+              <a:rPr lang="fr-FR" dirty="0" smtClean="0"/>
+              <a:t> for the patient and the support </a:t>
+            </a:r>
+            <a:r>
+              <a:rPr lang="fr-FR" dirty="0" err="1" smtClean="0"/>
+              <a:t>from</a:t>
+            </a:r>
+            <a:r>
+              <a:rPr lang="fr-FR" dirty="0" smtClean="0"/>
+              <a:t> all Altran team</a:t>
+            </a:r>
+            <a:endParaRPr lang="fr-FR" dirty="0"/>
+          </a:p>
+          <a:p>
+            <a:endParaRPr lang="fr-FR" dirty="0" smtClean="0"/>
+          </a:p>
+          <a:p>
+            <a:r>
+              <a:rPr lang="fr-FR" dirty="0" err="1" smtClean="0"/>
+              <a:t>Special</a:t>
+            </a:r>
+            <a:r>
+              <a:rPr lang="fr-FR" dirty="0" smtClean="0"/>
+              <a:t> </a:t>
+            </a:r>
+            <a:r>
+              <a:rPr lang="fr-FR" dirty="0" err="1" smtClean="0"/>
+              <a:t>Thanks</a:t>
+            </a:r>
+            <a:endParaRPr lang="fr-FR" dirty="0" smtClean="0"/>
+          </a:p>
+          <a:p>
+            <a:endParaRPr lang="fr-FR" dirty="0" smtClean="0"/>
+          </a:p>
+          <a:p>
+            <a:pPr marL="171450" indent="-171450">
+              <a:spcBef>
+                <a:spcPts val="600"/>
+              </a:spcBef>
+              <a:buFont typeface="Wingdings" panose="05000000000000000000" pitchFamily="2" charset="2"/>
+              <a:buChar char="Ø"/>
+            </a:pPr>
+            <a:r>
+              <a:rPr lang="fr-FR" sz="2000" dirty="0" smtClean="0">
+                <a:latin typeface="Script MT Bold" panose="03040602040607080904" pitchFamily="66" charset="0"/>
+              </a:rPr>
+              <a:t>Luis Rocha</a:t>
+            </a:r>
+          </a:p>
+          <a:p>
+            <a:pPr marL="171450" indent="-171450">
+              <a:spcBef>
+                <a:spcPts val="600"/>
+              </a:spcBef>
+              <a:buFont typeface="Wingdings" panose="05000000000000000000" pitchFamily="2" charset="2"/>
+              <a:buChar char="Ø"/>
+            </a:pPr>
+            <a:r>
+              <a:rPr lang="fr-FR" sz="2000" dirty="0" smtClean="0">
+                <a:latin typeface="Script MT Bold" panose="03040602040607080904" pitchFamily="66" charset="0"/>
+              </a:rPr>
+              <a:t>Henrique </a:t>
+            </a:r>
+            <a:r>
+              <a:rPr lang="fr-FR" sz="2000" dirty="0" err="1" smtClean="0">
+                <a:latin typeface="Script MT Bold" panose="03040602040607080904" pitchFamily="66" charset="0"/>
+              </a:rPr>
+              <a:t>Miraldo</a:t>
+            </a:r>
+            <a:endParaRPr lang="fr-FR" sz="2000" dirty="0" smtClean="0">
+              <a:latin typeface="Script MT Bold" panose="03040602040607080904" pitchFamily="66" charset="0"/>
+            </a:endParaRPr>
+          </a:p>
+          <a:p>
+            <a:pPr marL="171450" indent="-171450">
+              <a:spcBef>
+                <a:spcPts val="600"/>
+              </a:spcBef>
+              <a:buFont typeface="Wingdings" panose="05000000000000000000" pitchFamily="2" charset="2"/>
+              <a:buChar char="Ø"/>
+            </a:pPr>
+            <a:r>
+              <a:rPr lang="fr-FR" sz="2000" dirty="0" smtClean="0">
+                <a:latin typeface="Script MT Bold" panose="03040602040607080904" pitchFamily="66" charset="0"/>
+              </a:rPr>
+              <a:t>Carlos </a:t>
+            </a:r>
+            <a:r>
+              <a:rPr lang="fr-FR" sz="2000" dirty="0" err="1" smtClean="0">
+                <a:latin typeface="Script MT Bold" panose="03040602040607080904" pitchFamily="66" charset="0"/>
+              </a:rPr>
+              <a:t>Valente</a:t>
+            </a:r>
+            <a:endParaRPr lang="fr-FR" sz="2000" dirty="0" smtClean="0">
+              <a:latin typeface="Script MT Bold" panose="03040602040607080904" pitchFamily="66" charset="0"/>
+            </a:endParaRPr>
+          </a:p>
+          <a:p>
+            <a:pPr marL="171450" indent="-171450">
+              <a:spcBef>
+                <a:spcPts val="600"/>
+              </a:spcBef>
+              <a:buFont typeface="Wingdings" panose="05000000000000000000" pitchFamily="2" charset="2"/>
+              <a:buChar char="Ø"/>
+            </a:pPr>
+            <a:r>
+              <a:rPr lang="fr-FR" sz="1800" dirty="0" smtClean="0">
+                <a:solidFill>
+                  <a:schemeClr val="bg1">
+                    <a:lumMod val="50000"/>
+                  </a:schemeClr>
+                </a:solidFill>
+                <a:latin typeface="Script MT Bold" panose="03040602040607080904" pitchFamily="66" charset="0"/>
+              </a:rPr>
+              <a:t>Altran Team…</a:t>
+            </a:r>
+            <a:endParaRPr lang="fr-FR" sz="1800" dirty="0">
+              <a:solidFill>
+                <a:schemeClr val="bg1">
+                  <a:lumMod val="50000"/>
+                </a:schemeClr>
+              </a:solidFill>
+              <a:latin typeface="Script MT Bold" panose="03040602040607080904" pitchFamily="66" charset="0"/>
+            </a:endParaRPr>
+          </a:p>
+        </p:txBody>
+      </p:sp>
+      <p:pic>
+        <p:nvPicPr>
+          <p:cNvPr id="2" name="Picture 1"/>
+          <p:cNvPicPr>
+            <a:picLocks noChangeAspect="1"/>
+          </p:cNvPicPr>
+          <p:nvPr/>
+        </p:nvPicPr>
+        <p:blipFill>
+          <a:blip r:embed="rId2" cstate="print">
+            <a:extLst>
+              <a:ext uri="{BEBA8EAE-BF5A-486C-A8C5-ECC9F3942E4B}">
+                <a14:imgProps xmlns:a14="http://schemas.microsoft.com/office/drawing/2010/main">
+                  <a14:imgLayer r:embed="rId3">
+                    <a14:imgEffect>
+                      <a14:saturation sat="75000"/>
+                    </a14:imgEffect>
+                  </a14:imgLayer>
+                </a14:imgProps>
+              </a:ext>
+              <a:ext uri="{28A0092B-C50C-407E-A947-70E740481C1C}">
+                <a14:useLocalDpi xmlns:a14="http://schemas.microsoft.com/office/drawing/2010/main" val="0"/>
+              </a:ext>
+            </a:extLst>
+          </a:blip>
+          <a:stretch>
+            <a:fillRect/>
+          </a:stretch>
+        </p:blipFill>
+        <p:spPr>
+          <a:xfrm rot="21232677">
+            <a:off x="3830564" y="1681153"/>
+            <a:ext cx="3506188" cy="2629641"/>
+          </a:xfrm>
+          <a:prstGeom prst="rect">
+            <a:avLst/>
+          </a:prstGeom>
+          <a:effectLst>
+            <a:outerShdw blurRad="177800" dist="50800" dir="5400000" sx="95000" sy="95000" algn="ctr" rotWithShape="0">
+              <a:srgbClr val="000000">
+                <a:alpha val="43000"/>
+              </a:srgbClr>
+            </a:outerShdw>
+            <a:softEdge rad="38100"/>
+          </a:effectLst>
+        </p:spPr>
+      </p:pic>
+    </p:spTree>
+    <p:extLst>
+      <p:ext uri="{BB962C8B-B14F-4D97-AF65-F5344CB8AC3E}">
+        <p14:creationId xmlns:p14="http://schemas.microsoft.com/office/powerpoint/2010/main" val="3488472030"/>
+      </p:ext>
+    </p:extLst>
+  </p:cSld>
+  <p:clrMapOvr>
+    <a:masterClrMapping/>
+  </p:clrMapOvr>
+  <p:timing>
+    <p:tnLst>
+      <p:par>
+        <p:cTn id="1" dur="indefinite" restart="never" nodeType="tmRoot"/>
+      </p:par>
+    </p:tnLst>
+  </p:timing>
+</p:sld>
+</file>
+
+<file path=ppt/slides/slide29.xml><?xml version="1.0" encoding="utf-8"?>
+<p:sld xmlns:a="http://schemas.openxmlformats.org/drawingml/2006/main" xmlns:r="http://schemas.openxmlformats.org/officeDocument/2006/relationships" xmlns:p="http://schemas.openxmlformats.org/presentationml/2006/main">
+  <p:cSld>
+    <p:spTree>
+      <p:nvGrpSpPr>
+        <p:cNvPr id="1" name=""/>
+        <p:cNvGrpSpPr/>
+        <p:nvPr/>
+      </p:nvGrpSpPr>
+      <p:grpSpPr>
+        <a:xfrm>
+          <a:off x="0" y="0"/>
+          <a:ext cx="0" cy="0"/>
+          <a:chOff x="0" y="0"/>
+          <a:chExt cx="0" cy="0"/>
+        </a:xfrm>
+      </p:grpSpPr>
+      <p:sp>
+        <p:nvSpPr>
+          <p:cNvPr id="2" name="Espace réservé de la date 1"/>
+          <p:cNvSpPr>
+            <a:spLocks noGrp="1"/>
+          </p:cNvSpPr>
+          <p:nvPr>
+            <p:ph type="dt" sz="half" idx="10"/>
+          </p:nvPr>
+        </p:nvSpPr>
+        <p:spPr/>
+        <p:txBody>
+          <a:bodyPr/>
+          <a:lstStyle/>
+          <a:p>
+            <a:r>
+              <a:rPr lang="fr-FR" noProof="0"/>
+              <a:t>Date</a:t>
+            </a:r>
+          </a:p>
+        </p:txBody>
+      </p:sp>
+      <p:sp>
+        <p:nvSpPr>
+          <p:cNvPr id="4" name="Espace réservé du pied de page 3"/>
+          <p:cNvSpPr>
+            <a:spLocks noGrp="1"/>
+          </p:cNvSpPr>
+          <p:nvPr>
+            <p:ph type="ftr" sz="quarter" idx="11"/>
+          </p:nvPr>
+        </p:nvSpPr>
+        <p:spPr/>
+        <p:txBody>
+          <a:bodyPr/>
+          <a:lstStyle/>
+          <a:p>
+            <a:r>
+              <a:rPr lang="en-US" noProof="0"/>
+              <a:t>Presentation title</a:t>
+            </a:r>
+            <a:endParaRPr lang="fr-FR" noProof="0"/>
+          </a:p>
+        </p:txBody>
+      </p:sp>
+      <p:sp>
+        <p:nvSpPr>
+          <p:cNvPr id="3" name="Espace réservé du numéro de diapositive 2"/>
+          <p:cNvSpPr>
+            <a:spLocks noGrp="1"/>
+          </p:cNvSpPr>
+          <p:nvPr>
+            <p:ph type="sldNum" sz="quarter" idx="12"/>
+          </p:nvPr>
+        </p:nvSpPr>
+        <p:spPr/>
+        <p:txBody>
+          <a:bodyPr/>
+          <a:lstStyle/>
+          <a:p>
+            <a:fld id="{733122C9-A0B9-462F-8757-0847AD287B63}" type="slidenum">
+              <a:rPr lang="fr-FR" noProof="0" smtClean="0"/>
+              <a:pPr/>
+              <a:t>29</a:t>
             </a:fld>
             <a:endParaRPr lang="fr-FR" noProof="0"/>
           </a:p>
@@ -21262,7 +22760,7 @@
           <a:p>
             <a:r>
               <a:rPr lang="pt-BR" dirty="0" smtClean="0"/>
-              <a:t>Business Case</a:t>
+              <a:t>Topics - Business Case</a:t>
             </a:r>
             <a:endParaRPr lang="fr-FR" dirty="0"/>
           </a:p>
@@ -21343,30 +22841,40 @@
               <a:t>About </a:t>
             </a:r>
             <a:r>
-              <a:rPr lang="fr-FR" dirty="0" err="1" smtClean="0"/>
+              <a:rPr lang="en-US" dirty="0" smtClean="0"/>
               <a:t>Myself</a:t>
             </a:r>
-            <a:endParaRPr lang="fr-FR" dirty="0" smtClean="0"/>
-          </a:p>
-          <a:p>
+          </a:p>
+          <a:p>
+            <a:r>
+              <a:rPr lang="pt-BR" sz="1400" i="1" dirty="0" smtClean="0">
+                <a:solidFill>
+                  <a:schemeClr val="bg1">
+                    <a:lumMod val="50000"/>
+                  </a:schemeClr>
+                </a:solidFill>
+                <a:latin typeface="Corbel Light" panose="020B0303020204020204" pitchFamily="34" charset="0"/>
+              </a:rPr>
+              <a:t>A </a:t>
+            </a:r>
             <a:r>
               <a:rPr lang="pt-BR" sz="1400" i="1" dirty="0">
                 <a:solidFill>
                   <a:schemeClr val="bg1">
-                    <a:lumMod val="65000"/>
+                    <a:lumMod val="50000"/>
                   </a:schemeClr>
                 </a:solidFill>
-                <a:latin typeface="Brush Script MT" panose="03060802040406070304" pitchFamily="66" charset="0"/>
+                <a:latin typeface="Corbel Light" panose="020B0303020204020204" pitchFamily="34" charset="0"/>
               </a:rPr>
-              <a:t>A litlle bit about my career and my experience</a:t>
+              <a:t>litlle bit about my career and my experience</a:t>
             </a:r>
             <a:endParaRPr lang="fr-FR" sz="1400" i="1" dirty="0">
               <a:solidFill>
                 <a:schemeClr val="bg1">
-                  <a:lumMod val="65000"/>
+                  <a:lumMod val="50000"/>
                 </a:schemeClr>
               </a:solidFill>
-              <a:latin typeface="Brush Script MT" panose="03060802040406070304" pitchFamily="66" charset="0"/>
+              <a:latin typeface="Corbel Light" panose="020B0303020204020204" pitchFamily="34" charset="0"/>
             </a:endParaRPr>
           </a:p>
           <a:p>
@@ -21438,20 +22946,20 @@
               <a:rPr lang="it-IT" sz="1400" i="1" dirty="0">
                 <a:solidFill>
                   <a:schemeClr val="bg1">
-                    <a:lumMod val="65000"/>
+                    <a:lumMod val="50000"/>
                   </a:schemeClr>
                 </a:solidFill>
-                <a:latin typeface="Brush Script MT" panose="03060802040406070304" pitchFamily="66" charset="0"/>
+                <a:latin typeface="Corbel Light" panose="020B0303020204020204" pitchFamily="34" charset="0"/>
               </a:rPr>
               <a:t>Business Statements</a:t>
             </a:r>
             <a:endParaRPr lang="fr-FR" sz="1400" i="1" dirty="0">
               <a:solidFill>
                 <a:schemeClr val="bg1">
-                  <a:lumMod val="65000"/>
+                  <a:lumMod val="50000"/>
                 </a:schemeClr>
               </a:solidFill>
-              <a:latin typeface="Brush Script MT" panose="03060802040406070304" pitchFamily="66" charset="0"/>
+              <a:latin typeface="Corbel Light" panose="020B0303020204020204" pitchFamily="34" charset="0"/>
             </a:endParaRPr>
           </a:p>
           <a:p>
@@ -21522,20 +23030,20 @@
               <a:rPr lang="it-IT" sz="1400" i="1" dirty="0">
                 <a:solidFill>
                   <a:schemeClr val="bg1">
-                    <a:lumMod val="65000"/>
+                    <a:lumMod val="50000"/>
                   </a:schemeClr>
                 </a:solidFill>
-                <a:latin typeface="Brush Script MT" panose="03060802040406070304" pitchFamily="66" charset="0"/>
+                <a:latin typeface="Corbel Light" panose="020B0303020204020204" pitchFamily="34" charset="0"/>
               </a:rPr>
               <a:t>Technical Statements</a:t>
             </a:r>
             <a:endParaRPr lang="fr-FR" sz="1400" i="1" dirty="0">
               <a:solidFill>
                 <a:schemeClr val="bg1">
-                  <a:lumMod val="65000"/>
+                  <a:lumMod val="50000"/>
                 </a:schemeClr>
               </a:solidFill>
-              <a:latin typeface="Brush Script MT" panose="03060802040406070304" pitchFamily="66" charset="0"/>
+              <a:latin typeface="Corbel Light" panose="020B0303020204020204" pitchFamily="34" charset="0"/>
             </a:endParaRPr>
           </a:p>
           <a:p>
@@ -21555,7 +23063,7 @@
         </p:nvSpPr>
         <p:spPr>
           <a:xfrm>
-            <a:off x="3398080" y="1428750"/>
+            <a:off x="3555391" y="2338581"/>
             <a:ext cx="432000" cy="432000"/>
           </a:xfrm>
         </p:spPr>
@@ -21564,10 +23072,9 @@
           <a:lstStyle/>
           <a:p>
             <a:r>
-              <a:rPr lang="fr-FR"/>
-              <a:t>4</a:t>
-            </a:r>
-            <a:endParaRPr lang="fr-FR" dirty="0"/>
+              <a:rPr lang="fr-FR" dirty="0"/>
+              <a:t>5</a:t>
+            </a:r>
           </a:p>
         </p:txBody>
       </p:sp>
@@ -21583,8 +23090,8 @@
         </p:nvSpPr>
         <p:spPr>
           <a:xfrm>
-            <a:off x="3881289" y="1536706"/>
-            <a:ext cx="2160000" cy="504825"/>
+            <a:off x="4038600" y="2446537"/>
+            <a:ext cx="2160000" cy="654044"/>
           </a:xfrm>
         </p:spPr>
         <p:txBody>
@@ -21601,86 +23108,75 @@
               <a:rPr lang="fr-FR" sz="1400" i="1" dirty="0">
                 <a:solidFill>
                   <a:schemeClr val="bg1">
-                    <a:lumMod val="65000"/>
+                    <a:lumMod val="50000"/>
                   </a:schemeClr>
                 </a:solidFill>
-                <a:latin typeface="Brush Script MT" panose="03060802040406070304" pitchFamily="66" charset="0"/>
+                <a:latin typeface="Corbel Light" panose="020B0303020204020204" pitchFamily="34" charset="0"/>
               </a:rPr>
               <a:t>The </a:t>
             </a:r>
             <a:r>
-              <a:rPr lang="fr-FR" sz="1400" i="1" dirty="0" err="1" smtClean="0">
+              <a:rPr lang="fr-FR" sz="1400" i="1" dirty="0" smtClean="0">
                 <a:solidFill>
                   <a:schemeClr val="bg1">
-                    <a:lumMod val="65000"/>
+                    <a:lumMod val="50000"/>
                   </a:schemeClr>
                 </a:solidFill>
-                <a:latin typeface="Brush Script MT" panose="03060802040406070304" pitchFamily="66" charset="0"/>
+                <a:latin typeface="Corbel Light" panose="020B0303020204020204" pitchFamily="34" charset="0"/>
               </a:rPr>
-              <a:t>codebase</a:t>
+              <a:t>code base </a:t>
+            </a:r>
+            <a:r>
+              <a:rPr lang="fr-FR" sz="1400" i="1" dirty="0">
+                <a:solidFill>
+                  <a:schemeClr val="bg1">
+                    <a:lumMod val="50000"/>
+                  </a:schemeClr>
+                </a:solidFill>
+                <a:latin typeface="Corbel Light" panose="020B0303020204020204" pitchFamily="34" charset="0"/>
+              </a:rPr>
+              <a:t>solution to check the </a:t>
+            </a:r>
+            <a:r>
+              <a:rPr lang="en-US" sz="1400" i="1" dirty="0" smtClean="0">
+                <a:solidFill>
+                  <a:schemeClr val="bg1">
+                    <a:lumMod val="50000"/>
+                  </a:schemeClr>
+                </a:solidFill>
+                <a:latin typeface="Corbel Light" panose="020B0303020204020204" pitchFamily="34" charset="0"/>
+              </a:rPr>
+              <a:t>proposal</a:t>
             </a:r>
             <a:r>
               <a:rPr lang="fr-FR" sz="1400" i="1" dirty="0" smtClean="0">
                 <a:solidFill>
                   <a:schemeClr val="bg1">
-                    <a:lumMod val="65000"/>
+                    <a:lumMod val="50000"/>
                   </a:schemeClr>
                 </a:solidFill>
-                <a:latin typeface="Brush Script MT" panose="03060802040406070304" pitchFamily="66" charset="0"/>
+                <a:latin typeface="Corbel Light" panose="020B0303020204020204" pitchFamily="34" charset="0"/>
               </a:rPr>
               <a:t> </a:t>
             </a:r>
             <a:r>
-              <a:rPr lang="fr-FR" sz="1400" i="1" dirty="0">
+              <a:rPr lang="fr-FR" sz="1400" i="1" dirty="0" err="1">
                 <a:solidFill>
                   <a:schemeClr val="bg1">
-                    <a:lumMod val="65000"/>
+                    <a:lumMod val="50000"/>
                   </a:schemeClr>
                 </a:solidFill>
-                <a:latin typeface="Brush Script MT" panose="03060802040406070304" pitchFamily="66" charset="0"/>
-              </a:rPr>
-              <a:t>solution to check the </a:t>
-            </a:r>
-            <a:r>
-              <a:rPr lang="en-US" sz="1400" i="1" dirty="0" smtClean="0">
-                <a:solidFill>
-                  <a:schemeClr val="bg1">
-                    <a:lumMod val="65000"/>
-                  </a:schemeClr>
-                </a:solidFill>
-                <a:latin typeface="Brush Script MT" panose="03060802040406070304" pitchFamily="66" charset="0"/>
-              </a:rPr>
-              <a:t>proposal</a:t>
-            </a:r>
-            <a:r>
-              <a:rPr lang="fr-FR" sz="1400" i="1" dirty="0" smtClean="0">
-                <a:solidFill>
-                  <a:schemeClr val="bg1">
-                    <a:lumMod val="65000"/>
-                  </a:schemeClr>
-                </a:solidFill>
-                <a:latin typeface="Brush Script MT" panose="03060802040406070304" pitchFamily="66" charset="0"/>
-              </a:rPr>
-              <a:t> </a:t>
-            </a:r>
-            <a:r>
-              <a:rPr lang="fr-FR" sz="1400" i="1" dirty="0" err="1">
-                <a:solidFill>
-                  <a:schemeClr val="bg1">
-                    <a:lumMod val="65000"/>
-                  </a:schemeClr>
-                </a:solidFill>
-                <a:latin typeface="Brush Script MT" panose="03060802040406070304" pitchFamily="66" charset="0"/>
+                <a:latin typeface="Corbel Light" panose="020B0303020204020204" pitchFamily="34" charset="0"/>
               </a:rPr>
               <a:t>viability</a:t>
             </a:r>
             <a:endParaRPr lang="fr-FR" sz="1400" i="1" dirty="0">
               <a:solidFill>
                 <a:schemeClr val="bg1">
-                  <a:lumMod val="65000"/>
+                  <a:lumMod val="50000"/>
                 </a:schemeClr>
               </a:solidFill>
-              <a:latin typeface="Brush Script MT" panose="03060802040406070304" pitchFamily="66" charset="0"/>
+              <a:latin typeface="Corbel Light" panose="020B0303020204020204" pitchFamily="34" charset="0"/>
             </a:endParaRPr>
           </a:p>
           <a:p>
@@ -21700,7 +23196,7 @@
         </p:nvSpPr>
         <p:spPr>
           <a:xfrm>
-            <a:off x="3398080" y="2339969"/>
+            <a:off x="3555391" y="3249800"/>
             <a:ext cx="432000" cy="432000"/>
           </a:xfrm>
         </p:spPr>
@@ -21710,7 +23206,7 @@
           <a:p>
             <a:r>
               <a:rPr lang="fr-FR" dirty="0"/>
-              <a:t>5</a:t>
+              <a:t>6</a:t>
             </a:r>
           </a:p>
         </p:txBody>
@@ -21727,7 +23223,7 @@
         </p:nvSpPr>
         <p:spPr>
           <a:xfrm>
-            <a:off x="3881289" y="2447925"/>
+            <a:off x="4038600" y="3357756"/>
             <a:ext cx="2160000" cy="504825"/>
           </a:xfrm>
         </p:spPr>
@@ -21745,20 +23241,103 @@
               <a:rPr lang="it-IT" sz="1400" i="1" dirty="0">
                 <a:solidFill>
                   <a:schemeClr val="bg1">
-                    <a:lumMod val="65000"/>
+                    <a:lumMod val="50000"/>
                   </a:schemeClr>
                 </a:solidFill>
-                <a:latin typeface="Brush Script MT" panose="03060802040406070304" pitchFamily="66" charset="0"/>
+                <a:latin typeface="Corbel Light" panose="020B0303020204020204" pitchFamily="34" charset="0"/>
               </a:rPr>
               <a:t>Special Thanks</a:t>
             </a:r>
             <a:endParaRPr lang="fr-FR" sz="1400" i="1" dirty="0">
               <a:solidFill>
                 <a:schemeClr val="bg1">
-                  <a:lumMod val="65000"/>
+                  <a:lumMod val="50000"/>
                 </a:schemeClr>
               </a:solidFill>
-              <a:latin typeface="Brush Script MT" panose="03060802040406070304" pitchFamily="66" charset="0"/>
+              <a:latin typeface="Corbel Light" panose="020B0303020204020204" pitchFamily="34" charset="0"/>
+            </a:endParaRPr>
+          </a:p>
+          <a:p>
+            <a:endParaRPr lang="fr-FR" dirty="0"/>
+          </a:p>
+        </p:txBody>
+      </p:sp>
+      <p:sp>
+        <p:nvSpPr>
+          <p:cNvPr id="16" name="Espace réservé du texte 46"/>
+          <p:cNvSpPr>
+            <a:spLocks noGrp="1"/>
+          </p:cNvSpPr>
+          <p:nvPr>
+            <p:ph type="body" sz="quarter" idx="19"/>
+          </p:nvPr>
+        </p:nvSpPr>
+        <p:spPr>
+          <a:xfrm>
+            <a:off x="3569982" y="1423835"/>
+            <a:ext cx="432000" cy="432000"/>
+          </a:xfrm>
+        </p:spPr>
+        <p:txBody>
+          <a:bodyPr/>
+          <a:lstStyle/>
+          <a:p>
+            <a:r>
+              <a:rPr lang="fr-FR" dirty="0"/>
+              <a:t>4</a:t>
+            </a:r>
+          </a:p>
+        </p:txBody>
+      </p:sp>
+      <p:sp>
+        <p:nvSpPr>
+          <p:cNvPr id="17" name="Espace réservé du texte 65"/>
+          <p:cNvSpPr>
+            <a:spLocks noGrp="1"/>
+          </p:cNvSpPr>
+          <p:nvPr>
+            <p:ph type="body" sz="quarter" idx="20"/>
+          </p:nvPr>
+        </p:nvSpPr>
+        <p:spPr>
+          <a:xfrm>
+            <a:off x="4053191" y="1531791"/>
+            <a:ext cx="2160000" cy="654044"/>
+          </a:xfrm>
+        </p:spPr>
+        <p:txBody>
+          <a:bodyPr/>
+          <a:lstStyle/>
+          <a:p>
+            <a:r>
+              <a:rPr lang="fr-FR" dirty="0" smtClean="0"/>
+              <a:t>Scalability </a:t>
+            </a:r>
+            <a:r>
+              <a:rPr lang="fr-FR" dirty="0" err="1" smtClean="0"/>
+              <a:t>strategy</a:t>
+            </a:r>
+            <a:endParaRPr lang="fr-FR" dirty="0" smtClean="0"/>
+          </a:p>
+          <a:p>
+            <a:r>
+              <a:rPr lang="pt-BR" sz="1400" i="1" dirty="0" smtClean="0">
+                <a:solidFill>
+                  <a:schemeClr val="bg1">
+                    <a:lumMod val="50000"/>
+                  </a:schemeClr>
+                </a:solidFill>
+                <a:latin typeface="Corbel Light" panose="020B0303020204020204" pitchFamily="34" charset="0"/>
+              </a:rPr>
+              <a:t>A deeper explanation what about is involved on it</a:t>
+            </a:r>
+            <a:endParaRPr lang="fr-FR" sz="1400" i="1" dirty="0">
+              <a:solidFill>
+                <a:schemeClr val="bg1">
+                  <a:lumMod val="50000"/>
+                </a:schemeClr>
+              </a:solidFill>
+              <a:latin typeface="Corbel Light" panose="020B0303020204020204" pitchFamily="34" charset="0"/>
             </a:endParaRPr>
           </a:p>
           <a:p>
@@ -22822,6 +24401,131 @@
           </a:extLst>
         </p:spPr>
       </p:pic>
+      <p:sp>
+        <p:nvSpPr>
+          <p:cNvPr id="20" name="Espace réservé du pied de page 3"/>
+          <p:cNvSpPr txBox="1">
+            <a:spLocks/>
+          </p:cNvSpPr>
+          <p:nvPr/>
+        </p:nvSpPr>
+        <p:spPr bwMode="gray">
+          <a:xfrm>
+            <a:off x="510421" y="4551970"/>
+            <a:ext cx="6636963" cy="251805"/>
+          </a:xfrm>
+          <a:prstGeom prst="rect">
+            <a:avLst/>
+          </a:prstGeom>
+        </p:spPr>
+        <p:txBody>
+          <a:bodyPr vert="horz" lIns="0" tIns="0" rIns="0" bIns="0" rtlCol="0" anchor="b" anchorCtr="0">
+            <a:noAutofit/>
+          </a:bodyPr>
+          <a:lstStyle>
+            <a:defPPr>
+              <a:defRPr lang="fr-FR"/>
+            </a:defPPr>
+            <a:lvl1pPr marL="0" algn="l" defTabSz="914400" rtl="0" eaLnBrk="1" latinLnBrk="0" hangingPunct="1">
+              <a:defRPr sz="800" kern="1200">
+                <a:solidFill>
+                  <a:schemeClr val="accent4"/>
+                </a:solidFill>
+                <a:latin typeface="+mn-lt"/>
+                <a:ea typeface="+mn-ea"/>
+                <a:cs typeface="+mn-cs"/>
+              </a:defRPr>
+            </a:lvl1pPr>
+            <a:lvl2pPr marL="457200" algn="l" defTabSz="914400" rtl="0" eaLnBrk="1" latinLnBrk="0" hangingPunct="1">
+              <a:defRPr sz="1800" kern="1200">
+                <a:solidFill>
+                  <a:schemeClr val="tx1"/>
+                </a:solidFill>
+                <a:latin typeface="+mn-lt"/>
+                <a:ea typeface="+mn-ea"/>
+                <a:cs typeface="+mn-cs"/>
+              </a:defRPr>
+            </a:lvl2pPr>
+            <a:lvl3pPr marL="914400" algn="l" defTabSz="914400" rtl="0" eaLnBrk="1" latinLnBrk="0" hangingPunct="1">
+              <a:defRPr sz="1800" kern="1200">
+                <a:solidFill>
+                  <a:schemeClr val="tx1"/>
+                </a:solidFill>
+                <a:latin typeface="+mn-lt"/>
+                <a:ea typeface="+mn-ea"/>
+                <a:cs typeface="+mn-cs"/>
+              </a:defRPr>
+            </a:lvl3pPr>
+            <a:lvl4pPr marL="1371600" algn="l" defTabSz="914400" rtl="0" eaLnBrk="1" latinLnBrk="0" hangingPunct="1">
+              <a:defRPr sz="1800" kern="1200">
+                <a:solidFill>
+                  <a:schemeClr val="tx1"/>
+                </a:solidFill>
+                <a:latin typeface="+mn-lt"/>
+                <a:ea typeface="+mn-ea"/>
+                <a:cs typeface="+mn-cs"/>
+              </a:defRPr>
+            </a:lvl4pPr>
+            <a:lvl5pPr marL="1828800" algn="l" defTabSz="914400" rtl="0" eaLnBrk="1" latinLnBrk="0" hangingPunct="1">
+              <a:defRPr sz="1800" kern="1200">
+                <a:solidFill>
+                  <a:schemeClr val="tx1"/>
+                </a:solidFill>
+                <a:latin typeface="+mn-lt"/>
+                <a:ea typeface="+mn-ea"/>
+                <a:cs typeface="+mn-cs"/>
+              </a:defRPr>
+            </a:lvl5pPr>
+            <a:lvl6pPr marL="2286000" algn="l" defTabSz="914400" rtl="0" eaLnBrk="1" latinLnBrk="0" hangingPunct="1">
+              <a:defRPr sz="1800" kern="1200">
+                <a:solidFill>
+                  <a:schemeClr val="tx1"/>
+                </a:solidFill>
+                <a:latin typeface="+mn-lt"/>
+                <a:ea typeface="+mn-ea"/>
+                <a:cs typeface="+mn-cs"/>
+              </a:defRPr>
+            </a:lvl6pPr>
+            <a:lvl7pPr marL="2743200" algn="l" defTabSz="914400" rtl="0" eaLnBrk="1" latinLnBrk="0" hangingPunct="1">
+              <a:defRPr sz="1800" kern="1200">
+                <a:solidFill>
+                  <a:schemeClr val="tx1"/>
+                </a:solidFill>
+                <a:latin typeface="+mn-lt"/>
+                <a:ea typeface="+mn-ea"/>
+                <a:cs typeface="+mn-cs"/>
+              </a:defRPr>
+            </a:lvl7pPr>
+            <a:lvl8pPr marL="3200400" algn="l" defTabSz="914400" rtl="0" eaLnBrk="1" latinLnBrk="0" hangingPunct="1">
+              <a:defRPr sz="1800" kern="1200">
+                <a:solidFill>
+                  <a:schemeClr val="tx1"/>
+                </a:solidFill>
+                <a:latin typeface="+mn-lt"/>
+                <a:ea typeface="+mn-ea"/>
+                <a:cs typeface="+mn-cs"/>
+              </a:defRPr>
+            </a:lvl8pPr>
+            <a:lvl9pPr marL="3657600" algn="l" defTabSz="914400" rtl="0" eaLnBrk="1" latinLnBrk="0" hangingPunct="1">
+              <a:defRPr sz="1800" kern="1200">
+                <a:solidFill>
+                  <a:schemeClr val="tx1"/>
+                </a:solidFill>
+                <a:latin typeface="+mn-lt"/>
+                <a:ea typeface="+mn-ea"/>
+                <a:cs typeface="+mn-cs"/>
+              </a:defRPr>
+            </a:lvl9pPr>
+          </a:lstStyle>
+          <a:p>
+            <a:r>
+              <a:rPr lang="en-US" dirty="0" smtClean="0"/>
+              <a:t>About myself</a:t>
+            </a:r>
+            <a:endParaRPr lang="fr-FR" dirty="0"/>
+          </a:p>
+        </p:txBody>
+      </p:sp>
     </p:spTree>
     <p:extLst>
       <p:ext uri="{BB962C8B-B14F-4D97-AF65-F5344CB8AC3E}">
@@ -22869,7 +24573,12 @@
             <p:ph type="title"/>
           </p:nvPr>
         </p:nvSpPr>
-        <p:spPr/>
+        <p:spPr>
+          <a:xfrm>
+            <a:off x="358776" y="384970"/>
+            <a:ext cx="8426450" cy="891380"/>
+          </a:xfrm>
+        </p:spPr>
         <p:txBody>
           <a:bodyPr/>
           <a:lstStyle/>
@@ -22922,18 +24631,19 @@
             <p:ph type="ftr" sz="quarter" idx="11"/>
           </p:nvPr>
         </p:nvSpPr>
-        <p:spPr/>
+        <p:spPr>
+          <a:xfrm>
+            <a:off x="510421" y="4529745"/>
+            <a:ext cx="6840000" cy="251805"/>
+          </a:xfrm>
+        </p:spPr>
         <p:txBody>
           <a:bodyPr/>
           <a:lstStyle/>
           <a:p>
             <a:r>
               <a:rPr lang="en-US" dirty="0" smtClean="0"/>
-              <a:t>About </a:t>
-            </a:r>
-            <a:r>
-              <a:rPr lang="en-US" dirty="0" smtClean="0"/>
-              <a:t>Myself</a:t>
+              <a:t>About myself</a:t>
             </a:r>
             <a:endParaRPr lang="fr-FR" dirty="0"/>
           </a:p>
@@ -22973,14 +24683,14 @@
             </p:custDataLst>
             <p:extLst>
               <p:ext uri="{D42A27DB-BD31-4B8C-83A1-F6EECF244321}">
-                <p14:modId xmlns:p14="http://schemas.microsoft.com/office/powerpoint/2010/main" val="2417620774"/>
+                <p14:modId xmlns:p14="http://schemas.microsoft.com/office/powerpoint/2010/main" val="1578642918"/>
               </p:ext>
             </p:extLst>
           </p:nvPr>
         </p:nvGraphicFramePr>
         <p:xfrm>
-          <a:off x="1524000" y="539750"/>
-          <a:ext cx="6096000" cy="4064000"/>
+          <a:off x="660905" y="564637"/>
+          <a:ext cx="7340095" cy="3860800"/>
         </p:xfrm>
         <a:graphic>
           <a:graphicData uri="http://schemas.openxmlformats.org/drawingml/2006/diagram">
@@ -22990,46 +24700,13 @@
       </p:graphicFrame>
       <p:cxnSp>
         <p:nvCxnSpPr>
-          <p:cNvPr id="18" name="Straight Arrow Connector 17"/>
-          <p:cNvCxnSpPr/>
-          <p:nvPr/>
-        </p:nvCxnSpPr>
-        <p:spPr>
-          <a:xfrm>
-            <a:off x="1981200" y="3333750"/>
-            <a:ext cx="0" cy="381000"/>
-          </a:xfrm>
-          <a:prstGeom prst="straightConnector1">
-            <a:avLst/>
-          </a:prstGeom>
-          <a:ln>
-            <a:tailEnd type="triangle"/>
-          </a:ln>
-        </p:spPr>
-        <p:style>
-          <a:lnRef idx="1">
-            <a:schemeClr val="accent1"/>
-          </a:lnRef>
-          <a:fillRef idx="0">
-            <a:schemeClr val="accent1"/>
-          </a:fillRef>
-          <a:effectRef idx="0">
-            <a:schemeClr val="accent1"/>
-          </a:effectRef>
-          <a:fontRef idx="minor">
-            <a:schemeClr val="tx1"/>
-          </a:fontRef>
-        </p:style>
-      </p:cxnSp>
-      <p:cxnSp>
-        <p:nvCxnSpPr>
           <p:cNvPr id="19" name="Straight Arrow Connector 18"/>
           <p:cNvCxnSpPr/>
           <p:nvPr/>
         </p:nvCxnSpPr>
         <p:spPr>
           <a:xfrm flipV="1">
-            <a:off x="6248400" y="1657350"/>
+            <a:off x="6578847" y="1506865"/>
             <a:ext cx="0" cy="381000"/>
           </a:xfrm>
           <a:prstGeom prst="straightConnector1">
@@ -23067,7 +24744,7 @@
         </p:nvCxnSpPr>
         <p:spPr>
           <a:xfrm>
-            <a:off x="7086600" y="2114550"/>
+            <a:off x="7391400" y="1990778"/>
             <a:ext cx="0" cy="533400"/>
           </a:xfrm>
           <a:prstGeom prst="straightConnector1">
@@ -23076,42 +24753,6 @@
           <a:ln>
             <a:solidFill>
               <a:srgbClr val="FF0000"/>
-            </a:solidFill>
-            <a:tailEnd type="triangle"/>
-          </a:ln>
-        </p:spPr>
-        <p:style>
-          <a:lnRef idx="1">
-            <a:schemeClr val="accent1"/>
-          </a:lnRef>
-          <a:fillRef idx="0">
-            <a:schemeClr val="accent1"/>
-          </a:fillRef>
-          <a:effectRef idx="0">
-            <a:schemeClr val="accent1"/>
-          </a:effectRef>
-          <a:fontRef idx="minor">
-            <a:schemeClr val="tx1"/>
-          </a:fontRef>
-        </p:style>
-      </p:cxnSp>
-      <p:cxnSp>
-        <p:nvCxnSpPr>
-          <p:cNvPr id="27" name="Straight Arrow Connector 26"/>
-          <p:cNvCxnSpPr/>
-          <p:nvPr/>
-        </p:nvCxnSpPr>
-        <p:spPr>
-          <a:xfrm flipV="1">
-            <a:off x="2819400" y="2167264"/>
-            <a:ext cx="0" cy="404486"/>
-          </a:xfrm>
-          <a:prstGeom prst="straightConnector1">
-            <a:avLst/>
-          </a:prstGeom>
-          <a:ln>
-            <a:solidFill>
-              <a:srgbClr val="00B050"/>
             </a:solidFill>
             <a:tailEnd type="triangle"/>
           </a:ln>
@@ -23146,7 +24787,7 @@
         </p:blipFill>
         <p:spPr>
           <a:xfrm>
-            <a:off x="5067300" y="4019550"/>
+            <a:off x="5029200" y="3801768"/>
             <a:ext cx="990600" cy="405964"/>
           </a:xfrm>
           <a:prstGeom prst="rect">
@@ -23162,8 +24803,8 @@
         </p:nvCxnSpPr>
         <p:spPr>
           <a:xfrm>
-            <a:off x="5486400" y="3105150"/>
-            <a:ext cx="0" cy="914400"/>
+            <a:off x="5334000" y="2647092"/>
+            <a:ext cx="0" cy="1135908"/>
           </a:xfrm>
           <a:prstGeom prst="straightConnector1">
             <a:avLst/>
@@ -23198,8 +24839,8 @@
         </p:nvCxnSpPr>
         <p:spPr>
           <a:xfrm>
-            <a:off x="4267200" y="2724150"/>
-            <a:ext cx="0" cy="838200"/>
+            <a:off x="4479130" y="2665860"/>
+            <a:ext cx="0" cy="705477"/>
           </a:xfrm>
           <a:prstGeom prst="straightConnector1">
             <a:avLst/>
@@ -23247,7 +24888,7 @@
         </p:blipFill>
         <p:spPr bwMode="auto">
           <a:xfrm>
-            <a:off x="4155683" y="3624014"/>
+            <a:off x="4068630" y="3426807"/>
             <a:ext cx="1121167" cy="269080"/>
           </a:xfrm>
           <a:prstGeom prst="rect">
@@ -23273,14 +24914,14 @@
         </p:nvSpPr>
         <p:spPr>
           <a:xfrm>
-            <a:off x="1676400" y="2496530"/>
+            <a:off x="1784136" y="2334168"/>
             <a:ext cx="457200" cy="380020"/>
           </a:xfrm>
           <a:prstGeom prst="roundRect">
             <a:avLst/>
           </a:prstGeom>
           <a:solidFill>
-            <a:schemeClr val="accent1">
+            <a:schemeClr val="accent4">
               <a:lumMod val="20000"/>
               <a:lumOff val="80000"/>
             </a:schemeClr>
@@ -23336,6 +24977,20 @@
               <a:t>JAVA</a:t>
             </a:r>
           </a:p>
+          <a:p>
+            <a:r>
+              <a:rPr lang="en-US" sz="600" dirty="0" smtClean="0">
+                <a:solidFill>
+                  <a:schemeClr val="bg1">
+                    <a:lumMod val="50000"/>
+                  </a:schemeClr>
+                </a:solidFill>
+                <a:latin typeface="Arial" panose="020B0604020202020204" pitchFamily="34" charset="0"/>
+                <a:cs typeface="Arial" panose="020B0604020202020204" pitchFamily="34" charset="0"/>
+              </a:rPr>
+              <a:t>VB4</a:t>
+            </a:r>
+          </a:p>
         </p:txBody>
       </p:sp>
       <p:sp>
@@ -23346,7 +25001,7 @@
         </p:nvSpPr>
         <p:spPr>
           <a:xfrm>
-            <a:off x="2590799" y="3027970"/>
+            <a:off x="2702283" y="1937087"/>
             <a:ext cx="482849" cy="587091"/>
           </a:xfrm>
           <a:prstGeom prst="roundRect">
@@ -23403,7 +25058,7 @@
                 <a:latin typeface="Arial" panose="020B0604020202020204" pitchFamily="34" charset="0"/>
                 <a:cs typeface="Arial" panose="020B0604020202020204" pitchFamily="34" charset="0"/>
               </a:rPr>
-              <a:t>VB</a:t>
+              <a:t>VB6</a:t>
             </a:r>
           </a:p>
           <a:p>
@@ -23453,7 +25108,7 @@
         </p:nvSpPr>
         <p:spPr>
           <a:xfrm>
-            <a:off x="3341687" y="1499658"/>
+            <a:off x="3519936" y="1442754"/>
             <a:ext cx="631825" cy="764457"/>
           </a:xfrm>
           <a:prstGeom prst="roundRect">
@@ -23527,7 +25182,7 @@
                 <a:latin typeface="Arial" panose="020B0604020202020204" pitchFamily="34" charset="0"/>
                 <a:cs typeface="Arial" panose="020B0604020202020204" pitchFamily="34" charset="0"/>
               </a:rPr>
-              <a:t>VB</a:t>
+              <a:t>VB6</a:t>
             </a:r>
           </a:p>
           <a:p>
@@ -23605,7 +25260,7 @@
         </p:nvSpPr>
         <p:spPr>
           <a:xfrm>
-            <a:off x="4163218" y="1047750"/>
+            <a:off x="4425155" y="993948"/>
             <a:ext cx="631825" cy="1224057"/>
           </a:xfrm>
           <a:prstGeom prst="roundRect">
@@ -23827,7 +25482,7 @@
         </p:nvSpPr>
         <p:spPr>
           <a:xfrm>
-            <a:off x="4984749" y="1047750"/>
+            <a:off x="5232002" y="993948"/>
             <a:ext cx="708819" cy="1231511"/>
           </a:xfrm>
           <a:prstGeom prst="roundRect">
@@ -24053,7 +25708,7 @@
         </p:blipFill>
         <p:spPr bwMode="auto">
           <a:xfrm>
-            <a:off x="3352800" y="3615216"/>
+            <a:off x="3352800" y="3462303"/>
             <a:ext cx="602106" cy="968605"/>
           </a:xfrm>
           <a:prstGeom prst="rect">
@@ -24079,8 +25734,8 @@
         </p:nvCxnSpPr>
         <p:spPr>
           <a:xfrm>
-            <a:off x="3657599" y="3105150"/>
-            <a:ext cx="0" cy="457200"/>
+            <a:off x="3581400" y="2665860"/>
+            <a:ext cx="0" cy="705477"/>
           </a:xfrm>
           <a:prstGeom prst="straightConnector1">
             <a:avLst/>
@@ -24115,7 +25770,7 @@
         </p:nvSpPr>
         <p:spPr>
           <a:xfrm>
-            <a:off x="5911353" y="2489394"/>
+            <a:off x="6197450" y="2379300"/>
             <a:ext cx="762794" cy="1403700"/>
           </a:xfrm>
           <a:prstGeom prst="roundRect">
@@ -24334,6 +25989,116 @@
           </a:p>
         </p:txBody>
       </p:sp>
+      <p:sp>
+        <p:nvSpPr>
+          <p:cNvPr id="35" name="Rounded Rectangle 34"/>
+          <p:cNvSpPr/>
+          <p:nvPr/>
+        </p:nvSpPr>
+        <p:spPr>
+          <a:xfrm>
+            <a:off x="865989" y="2611273"/>
+            <a:ext cx="457200" cy="380020"/>
+          </a:xfrm>
+          <a:prstGeom prst="roundRect">
+            <a:avLst/>
+          </a:prstGeom>
+          <a:solidFill>
+            <a:schemeClr val="bg1">
+              <a:lumMod val="95000"/>
+            </a:schemeClr>
+          </a:solidFill>
+          <a:ln>
+            <a:noFill/>
+          </a:ln>
+        </p:spPr>
+        <p:style>
+          <a:lnRef idx="2">
+            <a:schemeClr val="accent1">
+              <a:shade val="50000"/>
+            </a:schemeClr>
+          </a:lnRef>
+          <a:fillRef idx="1">
+            <a:schemeClr val="accent1"/>
+          </a:fillRef>
+          <a:effectRef idx="0">
+            <a:schemeClr val="accent1"/>
+          </a:effectRef>
+          <a:fontRef idx="minor">
+            <a:schemeClr val="lt1"/>
+          </a:fontRef>
+        </p:style>
+        <p:txBody>
+          <a:bodyPr rtlCol="0" anchor="ctr"/>
+          <a:lstStyle/>
+          <a:p>
+            <a:r>
+              <a:rPr lang="en-US" sz="600" dirty="0" smtClean="0">
+                <a:solidFill>
+                  <a:schemeClr val="bg1">
+                    <a:lumMod val="50000"/>
+                  </a:schemeClr>
+                </a:solidFill>
+                <a:latin typeface="Arial" panose="020B0604020202020204" pitchFamily="34" charset="0"/>
+                <a:cs typeface="Arial" panose="020B0604020202020204" pitchFamily="34" charset="0"/>
+              </a:rPr>
+              <a:t>VB3</a:t>
+            </a:r>
+          </a:p>
+          <a:p>
+            <a:r>
+              <a:rPr lang="en-US" sz="600" dirty="0" smtClean="0">
+                <a:solidFill>
+                  <a:schemeClr val="bg1">
+                    <a:lumMod val="50000"/>
+                  </a:schemeClr>
+                </a:solidFill>
+                <a:latin typeface="Arial" panose="020B0604020202020204" pitchFamily="34" charset="0"/>
+                <a:cs typeface="Arial" panose="020B0604020202020204" pitchFamily="34" charset="0"/>
+              </a:rPr>
+              <a:t>VBA</a:t>
+            </a:r>
+          </a:p>
+        </p:txBody>
+      </p:sp>
+      <p:cxnSp>
+        <p:nvCxnSpPr>
+          <p:cNvPr id="36" name="Straight Arrow Connector 35"/>
+          <p:cNvCxnSpPr/>
+          <p:nvPr/>
+        </p:nvCxnSpPr>
+        <p:spPr>
+          <a:xfrm>
+            <a:off x="1092326" y="3426807"/>
+            <a:ext cx="2263" cy="267656"/>
+          </a:xfrm>
+          <a:prstGeom prst="straightConnector1">
+            <a:avLst/>
+          </a:prstGeom>
+          <a:ln>
+            <a:solidFill>
+              <a:schemeClr val="bg1">
+                <a:lumMod val="50000"/>
+              </a:schemeClr>
+            </a:solidFill>
+            <a:tailEnd type="triangle"/>
+          </a:ln>
+        </p:spPr>
+        <p:style>
+          <a:lnRef idx="1">
+            <a:schemeClr val="accent1"/>
+          </a:lnRef>
+          <a:fillRef idx="0">
+            <a:schemeClr val="accent1"/>
+          </a:fillRef>
+          <a:effectRef idx="0">
+            <a:schemeClr val="accent1"/>
+          </a:effectRef>
+          <a:fontRef idx="minor">
+            <a:schemeClr val="tx1"/>
+          </a:fontRef>
+        </p:style>
+      </p:cxnSp>
     </p:spTree>
     <p:extLst>
       <p:ext uri="{BB962C8B-B14F-4D97-AF65-F5344CB8AC3E}">
@@ -24691,7 +26456,7 @@
             </a:pPr>
             <a:r>
               <a:rPr lang="en-US" sz="1200" dirty="0" smtClean="0"/>
-              <a:t>It is expensive to the company apply new </a:t>
+              <a:t>It is expensive to the company to apply new </a:t>
             </a:r>
             <a:r>
               <a:rPr lang="en-US" sz="1200" dirty="0"/>
@@ -24708,7 +26473,7 @@
             </a:pPr>
             <a:r>
               <a:rPr lang="en-US" sz="1200" dirty="0" smtClean="0"/>
-              <a:t>The company realize that is too </a:t>
+              <a:t>The company realizes that is too </a:t>
             </a:r>
             <a:r>
               <a:rPr lang="en-US" sz="1200" dirty="0"/>
@@ -24716,7 +26481,7 @@
             </a:r>
             <a:r>
               <a:rPr lang="en-US" sz="1200" dirty="0" smtClean="0"/>
-              <a:t>and needs a specialist to scale the current Virtual Machine schema.</a:t>
+              <a:t>and needs a specialist to scale the current Windows Server Host schema.</a:t>
             </a:r>
             <a:endParaRPr lang="en-US" sz="1200" dirty="0"/>
           </a:p>
@@ -24734,7 +26499,7 @@
             </a:r>
             <a:r>
               <a:rPr lang="en-US" sz="1200" dirty="0" smtClean="0"/>
-              <a:t>going down and degrading performance for each day.</a:t>
+              <a:t>going down and self-degrading performance for each day.</a:t>
             </a:r>
             <a:endParaRPr lang="en-US" sz="1200" dirty="0"/>
           </a:p>
@@ -24932,8 +26697,8 @@
         </p:blipFill>
         <p:spPr bwMode="auto">
           <a:xfrm>
-            <a:off x="518041" y="1504950"/>
-            <a:ext cx="3200835" cy="2754630"/>
+            <a:off x="518041" y="1504949"/>
+            <a:ext cx="3291959" cy="2833051"/>
           </a:xfrm>
           <a:prstGeom prst="rect">
             <a:avLst/>

</xml_diff>

<commit_message>
First version Tracking Service
</commit_message>
<xml_diff>
--- a/documentation/Presentation.pptx
+++ b/documentation/Presentation.pptx
@@ -4585,7 +4585,7 @@
           <a:p>
             <a:fld id="{63772A03-8192-4C8E-851E-DA871DEC8922}" type="datetimeFigureOut">
               <a:rPr lang="fr-FR" smtClean="0"/>
-              <a:t>23/09/2020</a:t>
+              <a:t>25/09/2020</a:t>
             </a:fld>
             <a:endParaRPr lang="fr-FR"/>
           </a:p>
@@ -4755,7 +4755,7 @@
             <a:fld id="{D680E798-53FF-4C51-A981-953463752515}" type="datetimeFigureOut">
               <a:rPr lang="fr-FR" smtClean="0"/>
               <a:pPr/>
-              <a:t>23/09/2020</a:t>
+              <a:t>25/09/2020</a:t>
             </a:fld>
             <a:endParaRPr lang="fr-FR" dirty="0"/>
           </a:p>
@@ -20730,60 +20730,6 @@
           </a:extLst>
         </p:spPr>
       </p:pic>
-      <p:pic>
-        <p:nvPicPr>
-          <p:cNvPr id="6148" name="Picture 4" descr="New_Rent_TrackingEvent_SequenceDiagram"/>
-          <p:cNvPicPr>
-            <a:picLocks noChangeAspect="1" noChangeArrowheads="1"/>
-          </p:cNvPicPr>
-          <p:nvPr/>
-        </p:nvPicPr>
-        <p:blipFill>
-          <a:blip r:embed="rId4">
-            <a:extLst>
-              <a:ext uri="{28A0092B-C50C-407E-A947-70E740481C1C}">
-                <a14:useLocalDpi xmlns:a14="http://schemas.microsoft.com/office/drawing/2010/main" val="0"/>
-              </a:ext>
-            </a:extLst>
-          </a:blip>
-          <a:srcRect/>
-          <a:stretch>
-            <a:fillRect/>
-          </a:stretch>
-        </p:blipFill>
-        <p:spPr bwMode="auto">
-          <a:xfrm>
-            <a:off x="6248400" y="1878797"/>
-            <a:ext cx="2530504" cy="1792596"/>
-          </a:xfrm>
-          <a:prstGeom prst="rect">
-            <a:avLst/>
-          </a:prstGeom>
-          <a:noFill/>
-          <a:ln>
-            <a:noFill/>
-          </a:ln>
-          <a:extLst>
-            <a:ext uri="{909E8E84-426E-40DD-AFC4-6F175D3DCCD1}">
-              <a14:hiddenFill xmlns:a14="http://schemas.microsoft.com/office/drawing/2010/main">
-                <a:solidFill>
-                  <a:srgbClr val="FFFFFF"/>
-                </a:solidFill>
-              </a14:hiddenFill>
-            </a:ext>
-            <a:ext uri="{91240B29-F687-4F45-9708-019B960494DF}">
-              <a14:hiddenLine xmlns:a14="http://schemas.microsoft.com/office/drawing/2010/main" w="9525">
-                <a:solidFill>
-                  <a:srgbClr val="000000"/>
-                </a:solidFill>
-                <a:miter lim="800000"/>
-                <a:headEnd/>
-                <a:tailEnd/>
-              </a14:hiddenLine>
-            </a:ext>
-          </a:extLst>
-        </p:spPr>
-      </p:pic>
       <p:sp>
         <p:nvSpPr>
           <p:cNvPr id="13" name="Titre 6"/>
@@ -20845,6 +20791,36 @@
           </a:p>
         </p:txBody>
       </p:sp>
+      <p:pic>
+        <p:nvPicPr>
+          <p:cNvPr id="2" name="Picture 1"/>
+          <p:cNvPicPr>
+            <a:picLocks noChangeAspect="1"/>
+          </p:cNvPicPr>
+          <p:nvPr/>
+        </p:nvPicPr>
+        <p:blipFill>
+          <a:blip r:embed="rId4">
+            <a:extLst>
+              <a:ext uri="{28A0092B-C50C-407E-A947-70E740481C1C}">
+                <a14:useLocalDpi xmlns:a14="http://schemas.microsoft.com/office/drawing/2010/main" val="0"/>
+              </a:ext>
+            </a:extLst>
+          </a:blip>
+          <a:stretch>
+            <a:fillRect/>
+          </a:stretch>
+        </p:blipFill>
+        <p:spPr>
+          <a:xfrm>
+            <a:off x="6106946" y="1894220"/>
+            <a:ext cx="2678279" cy="1687316"/>
+          </a:xfrm>
+          <a:prstGeom prst="rect">
+            <a:avLst/>
+          </a:prstGeom>
+        </p:spPr>
+      </p:pic>
     </p:spTree>
     <p:extLst>
       <p:ext uri="{BB962C8B-B14F-4D97-AF65-F5344CB8AC3E}">

</xml_diff>

<commit_message>
Adjusting documentation and adding azure functions base
</commit_message>
<xml_diff>
--- a/documentation/Presentation.pptx
+++ b/documentation/Presentation.pptx
@@ -4585,7 +4585,7 @@
           <a:p>
             <a:fld id="{63772A03-8192-4C8E-851E-DA871DEC8922}" type="datetimeFigureOut">
               <a:rPr lang="fr-FR" smtClean="0"/>
-              <a:t>25/09/2020</a:t>
+              <a:t>26/09/2020</a:t>
             </a:fld>
             <a:endParaRPr lang="fr-FR"/>
           </a:p>
@@ -4755,7 +4755,7 @@
             <a:fld id="{D680E798-53FF-4C51-A981-953463752515}" type="datetimeFigureOut">
               <a:rPr lang="fr-FR" smtClean="0"/>
               <a:pPr/>
-              <a:t>25/09/2020</a:t>
+              <a:t>26/09/2020</a:t>
             </a:fld>
             <a:endParaRPr lang="fr-FR" dirty="0"/>
           </a:p>
@@ -19863,7 +19863,7 @@
         </p:nvSpPr>
         <p:spPr>
           <a:xfrm>
-            <a:off x="609600" y="1116534"/>
+            <a:off x="609600" y="1185319"/>
             <a:ext cx="2460625" cy="167231"/>
           </a:xfrm>
         </p:spPr>
@@ -19982,7 +19982,7 @@
         <p:spPr bwMode="gray">
           <a:xfrm>
             <a:off x="511176" y="591063"/>
-            <a:ext cx="8426450" cy="380487"/>
+            <a:ext cx="8426450" cy="525471"/>
           </a:xfrm>
           <a:prstGeom prst="rect">
             <a:avLst/>
@@ -20014,9 +20014,19 @@
           <a:p>
             <a:r>
               <a:rPr lang="fr-FR" dirty="0" smtClean="0"/>
-              <a:t>Use Cases</a:t>
-            </a:r>
-            <a:endParaRPr lang="fr-FR" dirty="0"/>
+              <a:t>Use </a:t>
+            </a:r>
+            <a:r>
+              <a:rPr lang="fr-FR" dirty="0" smtClean="0"/>
+              <a:t>Cases</a:t>
+            </a:r>
+          </a:p>
+          <a:p>
+            <a:r>
+              <a:rPr lang="fr-FR" sz="1100" i="1" dirty="0" smtClean="0"/>
+              <a:t>Scooter Service</a:t>
+            </a:r>
+            <a:endParaRPr lang="fr-FR" sz="1100" i="1" dirty="0"/>
           </a:p>
         </p:txBody>
       </p:sp>
@@ -20030,7 +20040,7 @@
         </p:nvSpPr>
         <p:spPr bwMode="gray">
           <a:xfrm>
-            <a:off x="4889796" y="1116534"/>
+            <a:off x="4889796" y="1185319"/>
             <a:ext cx="2460625" cy="167231"/>
           </a:xfrm>
           <a:prstGeom prst="rect">
@@ -20096,7 +20106,7 @@
         </p:blipFill>
         <p:spPr bwMode="auto">
           <a:xfrm>
-            <a:off x="431552" y="1525520"/>
+            <a:off x="431552" y="1593327"/>
             <a:ext cx="3810000" cy="2658453"/>
           </a:xfrm>
           <a:prstGeom prst="rect">
@@ -20150,7 +20160,7 @@
         </p:blipFill>
         <p:spPr bwMode="auto">
           <a:xfrm>
-            <a:off x="4648200" y="1556785"/>
+            <a:off x="4648200" y="1624592"/>
             <a:ext cx="3962400" cy="2699758"/>
           </a:xfrm>
           <a:prstGeom prst="rect">
@@ -20422,11 +20432,15 @@
           <a:p>
             <a:r>
               <a:rPr lang="fr-FR" sz="1200" dirty="0" err="1" smtClean="0"/>
-              <a:t>Tracking</a:t>
+              <a:t>Looking</a:t>
             </a:r>
             <a:r>
               <a:rPr lang="fr-FR" sz="1200" dirty="0" smtClean="0"/>
-              <a:t> a Scooter</a:t>
+              <a:t> for a</a:t>
+            </a:r>
+            <a:r>
+              <a:rPr lang="fr-FR" sz="1200" dirty="0" smtClean="0"/>
+              <a:t> Scooter</a:t>
             </a:r>
             <a:endParaRPr lang="fr-FR" sz="1200" dirty="0"/>
           </a:p>
@@ -20563,9 +20577,23 @@
           <a:p>
             <a:r>
               <a:rPr lang="fr-FR" dirty="0" smtClean="0"/>
-              <a:t>Use Cases</a:t>
-            </a:r>
-            <a:endParaRPr lang="fr-FR" dirty="0"/>
+              <a:t>Use </a:t>
+            </a:r>
+            <a:r>
+              <a:rPr lang="fr-FR" dirty="0" smtClean="0"/>
+              <a:t>Cases</a:t>
+            </a:r>
+          </a:p>
+          <a:p>
+            <a:r>
+              <a:rPr lang="fr-FR" sz="1100" i="1" dirty="0" err="1" smtClean="0"/>
+              <a:t>Tracking</a:t>
+            </a:r>
+            <a:r>
+              <a:rPr lang="fr-FR" sz="1100" i="1" dirty="0" smtClean="0"/>
+              <a:t> Service</a:t>
+            </a:r>
+            <a:endParaRPr lang="fr-FR" sz="1100" i="1" dirty="0"/>
           </a:p>
         </p:txBody>
       </p:sp>
@@ -20616,7 +20644,11 @@
             </a:r>
             <a:r>
               <a:rPr lang="fr-FR" sz="1200" dirty="0" smtClean="0"/>
-              <a:t> Job Scooters</a:t>
+              <a:t> </a:t>
+            </a:r>
+            <a:r>
+              <a:rPr lang="fr-FR" sz="1200" dirty="0" smtClean="0"/>
+              <a:t>Scooters</a:t>
             </a:r>
             <a:endParaRPr lang="fr-FR" sz="1200" dirty="0"/>
           </a:p>
@@ -20645,62 +20677,8 @@
         </p:blipFill>
         <p:spPr bwMode="auto">
           <a:xfrm>
-            <a:off x="510421" y="1676937"/>
+            <a:off x="462458" y="1637853"/>
             <a:ext cx="2576356" cy="2495508"/>
-          </a:xfrm>
-          <a:prstGeom prst="rect">
-            <a:avLst/>
-          </a:prstGeom>
-          <a:noFill/>
-          <a:ln>
-            <a:noFill/>
-          </a:ln>
-          <a:extLst>
-            <a:ext uri="{909E8E84-426E-40DD-AFC4-6F175D3DCCD1}">
-              <a14:hiddenFill xmlns:a14="http://schemas.microsoft.com/office/drawing/2010/main">
-                <a:solidFill>
-                  <a:srgbClr val="FFFFFF"/>
-                </a:solidFill>
-              </a14:hiddenFill>
-            </a:ext>
-            <a:ext uri="{91240B29-F687-4F45-9708-019B960494DF}">
-              <a14:hiddenLine xmlns:a14="http://schemas.microsoft.com/office/drawing/2010/main" w="9525">
-                <a:solidFill>
-                  <a:srgbClr val="000000"/>
-                </a:solidFill>
-                <a:miter lim="800000"/>
-                <a:headEnd/>
-                <a:tailEnd/>
-              </a14:hiddenLine>
-            </a:ext>
-          </a:extLst>
-        </p:spPr>
-      </p:pic>
-      <p:pic>
-        <p:nvPicPr>
-          <p:cNvPr id="6147" name="Picture 3" descr="New_JobTracking_SequenceDiagram"/>
-          <p:cNvPicPr>
-            <a:picLocks noChangeAspect="1" noChangeArrowheads="1"/>
-          </p:cNvPicPr>
-          <p:nvPr/>
-        </p:nvPicPr>
-        <p:blipFill>
-          <a:blip r:embed="rId3">
-            <a:extLst>
-              <a:ext uri="{28A0092B-C50C-407E-A947-70E740481C1C}">
-                <a14:useLocalDpi xmlns:a14="http://schemas.microsoft.com/office/drawing/2010/main" val="0"/>
-              </a:ext>
-            </a:extLst>
-          </a:blip>
-          <a:srcRect/>
-          <a:stretch>
-            <a:fillRect/>
-          </a:stretch>
-        </p:blipFill>
-        <p:spPr bwMode="auto">
-          <a:xfrm>
-            <a:off x="3352800" y="1888839"/>
-            <a:ext cx="2514600" cy="1755884"/>
           </a:xfrm>
           <a:prstGeom prst="rect">
             <a:avLst/>
@@ -20780,20 +20758,60 @@
               <a:t> Event </a:t>
             </a:r>
             <a:r>
-              <a:rPr lang="fr-FR" sz="1200" dirty="0"/>
-              <a:t>P</a:t>
-            </a:r>
-            <a:r>
               <a:rPr lang="fr-FR" sz="1200" dirty="0" smtClean="0"/>
-              <a:t>rocessor</a:t>
-            </a:r>
-            <a:endParaRPr lang="fr-FR" sz="1200" dirty="0"/>
+              <a:t>Processor</a:t>
+            </a:r>
+          </a:p>
+          <a:p>
+            <a:r>
+              <a:rPr lang="fr-FR" sz="900" i="1" dirty="0" smtClean="0"/>
+              <a:t>Queue Trigger Azure </a:t>
+            </a:r>
+            <a:r>
+              <a:rPr lang="fr-FR" sz="900" i="1" dirty="0" err="1" smtClean="0"/>
+              <a:t>Function</a:t>
+            </a:r>
+            <a:r>
+              <a:rPr lang="fr-FR" sz="900" i="1" dirty="0" smtClean="0"/>
+              <a:t> </a:t>
+            </a:r>
+            <a:endParaRPr lang="fr-FR" sz="900" i="1" dirty="0"/>
           </a:p>
         </p:txBody>
       </p:sp>
       <p:pic>
         <p:nvPicPr>
           <p:cNvPr id="2" name="Picture 1"/>
+          <p:cNvPicPr>
+            <a:picLocks noChangeAspect="1"/>
+          </p:cNvPicPr>
+          <p:nvPr/>
+        </p:nvPicPr>
+        <p:blipFill>
+          <a:blip r:embed="rId3">
+            <a:extLst>
+              <a:ext uri="{28A0092B-C50C-407E-A947-70E740481C1C}">
+                <a14:useLocalDpi xmlns:a14="http://schemas.microsoft.com/office/drawing/2010/main" val="0"/>
+              </a:ext>
+            </a:extLst>
+          </a:blip>
+          <a:stretch>
+            <a:fillRect/>
+          </a:stretch>
+        </p:blipFill>
+        <p:spPr>
+          <a:xfrm>
+            <a:off x="6106946" y="1894220"/>
+            <a:ext cx="2678279" cy="1687316"/>
+          </a:xfrm>
+          <a:prstGeom prst="rect">
+            <a:avLst/>
+          </a:prstGeom>
+        </p:spPr>
+      </p:pic>
+      <p:pic>
+        <p:nvPicPr>
+          <p:cNvPr id="9" name="Picture 8"/>
           <p:cNvPicPr>
             <a:picLocks noChangeAspect="1"/>
           </p:cNvPicPr>
@@ -20813,8 +20831,8 @@
         </p:blipFill>
         <p:spPr>
           <a:xfrm>
-            <a:off x="6106946" y="1894220"/>
-            <a:ext cx="2678279" cy="1687316"/>
+            <a:off x="3276600" y="1729683"/>
+            <a:ext cx="2659491" cy="2016390"/>
           </a:xfrm>
           <a:prstGeom prst="rect">
             <a:avLst/>

</xml_diff>